<commit_message>
CISC 879 Ch8 Presentation work; SPIE2017 created images with heatmaps and models
</commit_message>
<xml_diff>
--- a/CISC879/ChapterPresentation/LectureSlidesCh8.pptx
+++ b/CISC879/ChapterPresentation/LectureSlidesCh8.pptx
@@ -6,11 +6,16 @@
   </p:sldMasterIdLst>
   <p:sldIdLst>
     <p:sldId id="256" r:id="rId2"/>
-    <p:sldId id="257" r:id="rId3"/>
-    <p:sldId id="258" r:id="rId4"/>
-    <p:sldId id="259" r:id="rId5"/>
-    <p:sldId id="260" r:id="rId6"/>
-    <p:sldId id="261" r:id="rId7"/>
+    <p:sldId id="262" r:id="rId3"/>
+    <p:sldId id="263" r:id="rId4"/>
+    <p:sldId id="257" r:id="rId5"/>
+    <p:sldId id="264" r:id="rId6"/>
+    <p:sldId id="259" r:id="rId7"/>
+    <p:sldId id="258" r:id="rId8"/>
+    <p:sldId id="265" r:id="rId9"/>
+    <p:sldId id="261" r:id="rId10"/>
+    <p:sldId id="260" r:id="rId11"/>
+    <p:sldId id="266" r:id="rId12"/>
   </p:sldIdLst>
   <p:sldSz cx="12192000" cy="6858000"/>
   <p:notesSz cx="6858000" cy="9144000"/>
@@ -159,7 +164,7 @@
           </a:lstStyle>
           <a:p>
             <a:r>
-              <a:rPr lang="en-US" smtClean="0"/>
+              <a:rPr lang="en-US"/>
               <a:t>Click to edit Master title style</a:t>
             </a:r>
             <a:endParaRPr lang="en-CA"/>
@@ -224,7 +229,7 @@
           </a:lstStyle>
           <a:p>
             <a:r>
-              <a:rPr lang="en-US" smtClean="0"/>
+              <a:rPr lang="en-US"/>
               <a:t>Click to edit Master subtitle style</a:t>
             </a:r>
             <a:endParaRPr lang="en-CA"/>
@@ -248,7 +253,7 @@
           <a:p>
             <a:fld id="{A16762DA-0EF7-46B5-B462-6D59499F3413}" type="datetimeFigureOut">
               <a:rPr lang="en-CA" smtClean="0"/>
-              <a:t>20/10/2016</a:t>
+              <a:t>24/10/2016</a:t>
             </a:fld>
             <a:endParaRPr lang="en-CA"/>
           </a:p>
@@ -342,7 +347,7 @@
           <a:lstStyle/>
           <a:p>
             <a:r>
-              <a:rPr lang="en-US" smtClean="0"/>
+              <a:rPr lang="en-US"/>
               <a:t>Click to edit Master title style</a:t>
             </a:r>
             <a:endParaRPr lang="en-CA"/>
@@ -366,35 +371,35 @@
           <a:p>
             <a:pPr lvl="0"/>
             <a:r>
-              <a:rPr lang="en-US" smtClean="0"/>
+              <a:rPr lang="en-US"/>
               <a:t>Click to edit Master text styles</a:t>
             </a:r>
           </a:p>
           <a:p>
             <a:pPr lvl="1"/>
             <a:r>
-              <a:rPr lang="en-US" smtClean="0"/>
+              <a:rPr lang="en-US"/>
               <a:t>Second level</a:t>
             </a:r>
           </a:p>
           <a:p>
             <a:pPr lvl="2"/>
             <a:r>
-              <a:rPr lang="en-US" smtClean="0"/>
+              <a:rPr lang="en-US"/>
               <a:t>Third level</a:t>
             </a:r>
           </a:p>
           <a:p>
             <a:pPr lvl="3"/>
             <a:r>
-              <a:rPr lang="en-US" smtClean="0"/>
+              <a:rPr lang="en-US"/>
               <a:t>Fourth level</a:t>
             </a:r>
           </a:p>
           <a:p>
             <a:pPr lvl="4"/>
             <a:r>
-              <a:rPr lang="en-US" smtClean="0"/>
+              <a:rPr lang="en-US"/>
               <a:t>Fifth level</a:t>
             </a:r>
             <a:endParaRPr lang="en-CA"/>
@@ -418,7 +423,7 @@
           <a:p>
             <a:fld id="{A16762DA-0EF7-46B5-B462-6D59499F3413}" type="datetimeFigureOut">
               <a:rPr lang="en-CA" smtClean="0"/>
-              <a:t>20/10/2016</a:t>
+              <a:t>24/10/2016</a:t>
             </a:fld>
             <a:endParaRPr lang="en-CA"/>
           </a:p>
@@ -517,7 +522,7 @@
           <a:lstStyle/>
           <a:p>
             <a:r>
-              <a:rPr lang="en-US" smtClean="0"/>
+              <a:rPr lang="en-US"/>
               <a:t>Click to edit Master title style</a:t>
             </a:r>
             <a:endParaRPr lang="en-CA"/>
@@ -546,35 +551,35 @@
           <a:p>
             <a:pPr lvl="0"/>
             <a:r>
-              <a:rPr lang="en-US" smtClean="0"/>
+              <a:rPr lang="en-US"/>
               <a:t>Click to edit Master text styles</a:t>
             </a:r>
           </a:p>
           <a:p>
             <a:pPr lvl="1"/>
             <a:r>
-              <a:rPr lang="en-US" smtClean="0"/>
+              <a:rPr lang="en-US"/>
               <a:t>Second level</a:t>
             </a:r>
           </a:p>
           <a:p>
             <a:pPr lvl="2"/>
             <a:r>
-              <a:rPr lang="en-US" smtClean="0"/>
+              <a:rPr lang="en-US"/>
               <a:t>Third level</a:t>
             </a:r>
           </a:p>
           <a:p>
             <a:pPr lvl="3"/>
             <a:r>
-              <a:rPr lang="en-US" smtClean="0"/>
+              <a:rPr lang="en-US"/>
               <a:t>Fourth level</a:t>
             </a:r>
           </a:p>
           <a:p>
             <a:pPr lvl="4"/>
             <a:r>
-              <a:rPr lang="en-US" smtClean="0"/>
+              <a:rPr lang="en-US"/>
               <a:t>Fifth level</a:t>
             </a:r>
             <a:endParaRPr lang="en-CA"/>
@@ -598,7 +603,7 @@
           <a:p>
             <a:fld id="{A16762DA-0EF7-46B5-B462-6D59499F3413}" type="datetimeFigureOut">
               <a:rPr lang="en-CA" smtClean="0"/>
-              <a:t>20/10/2016</a:t>
+              <a:t>24/10/2016</a:t>
             </a:fld>
             <a:endParaRPr lang="en-CA"/>
           </a:p>
@@ -692,7 +697,7 @@
           <a:lstStyle/>
           <a:p>
             <a:r>
-              <a:rPr lang="en-US" smtClean="0"/>
+              <a:rPr lang="en-US"/>
               <a:t>Click to edit Master title style</a:t>
             </a:r>
             <a:endParaRPr lang="en-CA"/>
@@ -716,35 +721,35 @@
           <a:p>
             <a:pPr lvl="0"/>
             <a:r>
-              <a:rPr lang="en-US" smtClean="0"/>
+              <a:rPr lang="en-US"/>
               <a:t>Click to edit Master text styles</a:t>
             </a:r>
           </a:p>
           <a:p>
             <a:pPr lvl="1"/>
             <a:r>
-              <a:rPr lang="en-US" smtClean="0"/>
+              <a:rPr lang="en-US"/>
               <a:t>Second level</a:t>
             </a:r>
           </a:p>
           <a:p>
             <a:pPr lvl="2"/>
             <a:r>
-              <a:rPr lang="en-US" smtClean="0"/>
+              <a:rPr lang="en-US"/>
               <a:t>Third level</a:t>
             </a:r>
           </a:p>
           <a:p>
             <a:pPr lvl="3"/>
             <a:r>
-              <a:rPr lang="en-US" smtClean="0"/>
+              <a:rPr lang="en-US"/>
               <a:t>Fourth level</a:t>
             </a:r>
           </a:p>
           <a:p>
             <a:pPr lvl="4"/>
             <a:r>
-              <a:rPr lang="en-US" smtClean="0"/>
+              <a:rPr lang="en-US"/>
               <a:t>Fifth level</a:t>
             </a:r>
             <a:endParaRPr lang="en-CA"/>
@@ -768,7 +773,7 @@
           <a:p>
             <a:fld id="{A16762DA-0EF7-46B5-B462-6D59499F3413}" type="datetimeFigureOut">
               <a:rPr lang="en-CA" smtClean="0"/>
-              <a:t>20/10/2016</a:t>
+              <a:t>24/10/2016</a:t>
             </a:fld>
             <a:endParaRPr lang="en-CA"/>
           </a:p>
@@ -871,7 +876,7 @@
           </a:lstStyle>
           <a:p>
             <a:r>
-              <a:rPr lang="en-US" smtClean="0"/>
+              <a:rPr lang="en-US"/>
               <a:t>Click to edit Master title style</a:t>
             </a:r>
             <a:endParaRPr lang="en-CA"/>
@@ -991,7 +996,7 @@
           <a:p>
             <a:pPr lvl="0"/>
             <a:r>
-              <a:rPr lang="en-US" smtClean="0"/>
+              <a:rPr lang="en-US"/>
               <a:t>Click to edit Master text styles</a:t>
             </a:r>
           </a:p>
@@ -1014,7 +1019,7 @@
           <a:p>
             <a:fld id="{A16762DA-0EF7-46B5-B462-6D59499F3413}" type="datetimeFigureOut">
               <a:rPr lang="en-CA" smtClean="0"/>
-              <a:t>20/10/2016</a:t>
+              <a:t>24/10/2016</a:t>
             </a:fld>
             <a:endParaRPr lang="en-CA"/>
           </a:p>
@@ -1108,7 +1113,7 @@
           <a:lstStyle/>
           <a:p>
             <a:r>
-              <a:rPr lang="en-US" smtClean="0"/>
+              <a:rPr lang="en-US"/>
               <a:t>Click to edit Master title style</a:t>
             </a:r>
             <a:endParaRPr lang="en-CA"/>
@@ -1137,35 +1142,35 @@
           <a:p>
             <a:pPr lvl="0"/>
             <a:r>
-              <a:rPr lang="en-US" smtClean="0"/>
+              <a:rPr lang="en-US"/>
               <a:t>Click to edit Master text styles</a:t>
             </a:r>
           </a:p>
           <a:p>
             <a:pPr lvl="1"/>
             <a:r>
-              <a:rPr lang="en-US" smtClean="0"/>
+              <a:rPr lang="en-US"/>
               <a:t>Second level</a:t>
             </a:r>
           </a:p>
           <a:p>
             <a:pPr lvl="2"/>
             <a:r>
-              <a:rPr lang="en-US" smtClean="0"/>
+              <a:rPr lang="en-US"/>
               <a:t>Third level</a:t>
             </a:r>
           </a:p>
           <a:p>
             <a:pPr lvl="3"/>
             <a:r>
-              <a:rPr lang="en-US" smtClean="0"/>
+              <a:rPr lang="en-US"/>
               <a:t>Fourth level</a:t>
             </a:r>
           </a:p>
           <a:p>
             <a:pPr lvl="4"/>
             <a:r>
-              <a:rPr lang="en-US" smtClean="0"/>
+              <a:rPr lang="en-US"/>
               <a:t>Fifth level</a:t>
             </a:r>
             <a:endParaRPr lang="en-CA"/>
@@ -1194,35 +1199,35 @@
           <a:p>
             <a:pPr lvl="0"/>
             <a:r>
-              <a:rPr lang="en-US" smtClean="0"/>
+              <a:rPr lang="en-US"/>
               <a:t>Click to edit Master text styles</a:t>
             </a:r>
           </a:p>
           <a:p>
             <a:pPr lvl="1"/>
             <a:r>
-              <a:rPr lang="en-US" smtClean="0"/>
+              <a:rPr lang="en-US"/>
               <a:t>Second level</a:t>
             </a:r>
           </a:p>
           <a:p>
             <a:pPr lvl="2"/>
             <a:r>
-              <a:rPr lang="en-US" smtClean="0"/>
+              <a:rPr lang="en-US"/>
               <a:t>Third level</a:t>
             </a:r>
           </a:p>
           <a:p>
             <a:pPr lvl="3"/>
             <a:r>
-              <a:rPr lang="en-US" smtClean="0"/>
+              <a:rPr lang="en-US"/>
               <a:t>Fourth level</a:t>
             </a:r>
           </a:p>
           <a:p>
             <a:pPr lvl="4"/>
             <a:r>
-              <a:rPr lang="en-US" smtClean="0"/>
+              <a:rPr lang="en-US"/>
               <a:t>Fifth level</a:t>
             </a:r>
             <a:endParaRPr lang="en-CA"/>
@@ -1246,7 +1251,7 @@
           <a:p>
             <a:fld id="{A16762DA-0EF7-46B5-B462-6D59499F3413}" type="datetimeFigureOut">
               <a:rPr lang="en-CA" smtClean="0"/>
-              <a:t>20/10/2016</a:t>
+              <a:t>24/10/2016</a:t>
             </a:fld>
             <a:endParaRPr lang="en-CA"/>
           </a:p>
@@ -1345,7 +1350,7 @@
           <a:lstStyle/>
           <a:p>
             <a:r>
-              <a:rPr lang="en-US" smtClean="0"/>
+              <a:rPr lang="en-US"/>
               <a:t>Click to edit Master title style</a:t>
             </a:r>
             <a:endParaRPr lang="en-CA"/>
@@ -1411,7 +1416,7 @@
           <a:p>
             <a:pPr lvl="0"/>
             <a:r>
-              <a:rPr lang="en-US" smtClean="0"/>
+              <a:rPr lang="en-US"/>
               <a:t>Click to edit Master text styles</a:t>
             </a:r>
           </a:p>
@@ -1439,35 +1444,35 @@
           <a:p>
             <a:pPr lvl="0"/>
             <a:r>
-              <a:rPr lang="en-US" smtClean="0"/>
+              <a:rPr lang="en-US"/>
               <a:t>Click to edit Master text styles</a:t>
             </a:r>
           </a:p>
           <a:p>
             <a:pPr lvl="1"/>
             <a:r>
-              <a:rPr lang="en-US" smtClean="0"/>
+              <a:rPr lang="en-US"/>
               <a:t>Second level</a:t>
             </a:r>
           </a:p>
           <a:p>
             <a:pPr lvl="2"/>
             <a:r>
-              <a:rPr lang="en-US" smtClean="0"/>
+              <a:rPr lang="en-US"/>
               <a:t>Third level</a:t>
             </a:r>
           </a:p>
           <a:p>
             <a:pPr lvl="3"/>
             <a:r>
-              <a:rPr lang="en-US" smtClean="0"/>
+              <a:rPr lang="en-US"/>
               <a:t>Fourth level</a:t>
             </a:r>
           </a:p>
           <a:p>
             <a:pPr lvl="4"/>
             <a:r>
-              <a:rPr lang="en-US" smtClean="0"/>
+              <a:rPr lang="en-US"/>
               <a:t>Fifth level</a:t>
             </a:r>
             <a:endParaRPr lang="en-CA"/>
@@ -1533,7 +1538,7 @@
           <a:p>
             <a:pPr lvl="0"/>
             <a:r>
-              <a:rPr lang="en-US" smtClean="0"/>
+              <a:rPr lang="en-US"/>
               <a:t>Click to edit Master text styles</a:t>
             </a:r>
           </a:p>
@@ -1561,35 +1566,35 @@
           <a:p>
             <a:pPr lvl="0"/>
             <a:r>
-              <a:rPr lang="en-US" smtClean="0"/>
+              <a:rPr lang="en-US"/>
               <a:t>Click to edit Master text styles</a:t>
             </a:r>
           </a:p>
           <a:p>
             <a:pPr lvl="1"/>
             <a:r>
-              <a:rPr lang="en-US" smtClean="0"/>
+              <a:rPr lang="en-US"/>
               <a:t>Second level</a:t>
             </a:r>
           </a:p>
           <a:p>
             <a:pPr lvl="2"/>
             <a:r>
-              <a:rPr lang="en-US" smtClean="0"/>
+              <a:rPr lang="en-US"/>
               <a:t>Third level</a:t>
             </a:r>
           </a:p>
           <a:p>
             <a:pPr lvl="3"/>
             <a:r>
-              <a:rPr lang="en-US" smtClean="0"/>
+              <a:rPr lang="en-US"/>
               <a:t>Fourth level</a:t>
             </a:r>
           </a:p>
           <a:p>
             <a:pPr lvl="4"/>
             <a:r>
-              <a:rPr lang="en-US" smtClean="0"/>
+              <a:rPr lang="en-US"/>
               <a:t>Fifth level</a:t>
             </a:r>
             <a:endParaRPr lang="en-CA"/>
@@ -1613,7 +1618,7 @@
           <a:p>
             <a:fld id="{A16762DA-0EF7-46B5-B462-6D59499F3413}" type="datetimeFigureOut">
               <a:rPr lang="en-CA" smtClean="0"/>
-              <a:t>20/10/2016</a:t>
+              <a:t>24/10/2016</a:t>
             </a:fld>
             <a:endParaRPr lang="en-CA"/>
           </a:p>
@@ -1707,7 +1712,7 @@
           <a:lstStyle/>
           <a:p>
             <a:r>
-              <a:rPr lang="en-US" smtClean="0"/>
+              <a:rPr lang="en-US"/>
               <a:t>Click to edit Master title style</a:t>
             </a:r>
             <a:endParaRPr lang="en-CA"/>
@@ -1731,7 +1736,7 @@
           <a:p>
             <a:fld id="{A16762DA-0EF7-46B5-B462-6D59499F3413}" type="datetimeFigureOut">
               <a:rPr lang="en-CA" smtClean="0"/>
-              <a:t>20/10/2016</a:t>
+              <a:t>24/10/2016</a:t>
             </a:fld>
             <a:endParaRPr lang="en-CA"/>
           </a:p>
@@ -1826,7 +1831,7 @@
           <a:p>
             <a:fld id="{A16762DA-0EF7-46B5-B462-6D59499F3413}" type="datetimeFigureOut">
               <a:rPr lang="en-CA" smtClean="0"/>
-              <a:t>20/10/2016</a:t>
+              <a:t>24/10/2016</a:t>
             </a:fld>
             <a:endParaRPr lang="en-CA"/>
           </a:p>
@@ -1929,7 +1934,7 @@
           </a:lstStyle>
           <a:p>
             <a:r>
-              <a:rPr lang="en-US" smtClean="0"/>
+              <a:rPr lang="en-US"/>
               <a:t>Click to edit Master title style</a:t>
             </a:r>
             <a:endParaRPr lang="en-CA"/>
@@ -1986,35 +1991,35 @@
           <a:p>
             <a:pPr lvl="0"/>
             <a:r>
-              <a:rPr lang="en-US" smtClean="0"/>
+              <a:rPr lang="en-US"/>
               <a:t>Click to edit Master text styles</a:t>
             </a:r>
           </a:p>
           <a:p>
             <a:pPr lvl="1"/>
             <a:r>
-              <a:rPr lang="en-US" smtClean="0"/>
+              <a:rPr lang="en-US"/>
               <a:t>Second level</a:t>
             </a:r>
           </a:p>
           <a:p>
             <a:pPr lvl="2"/>
             <a:r>
-              <a:rPr lang="en-US" smtClean="0"/>
+              <a:rPr lang="en-US"/>
               <a:t>Third level</a:t>
             </a:r>
           </a:p>
           <a:p>
             <a:pPr lvl="3"/>
             <a:r>
-              <a:rPr lang="en-US" smtClean="0"/>
+              <a:rPr lang="en-US"/>
               <a:t>Fourth level</a:t>
             </a:r>
           </a:p>
           <a:p>
             <a:pPr lvl="4"/>
             <a:r>
-              <a:rPr lang="en-US" smtClean="0"/>
+              <a:rPr lang="en-US"/>
               <a:t>Fifth level</a:t>
             </a:r>
             <a:endParaRPr lang="en-CA"/>
@@ -2080,7 +2085,7 @@
           <a:p>
             <a:pPr lvl="0"/>
             <a:r>
-              <a:rPr lang="en-US" smtClean="0"/>
+              <a:rPr lang="en-US"/>
               <a:t>Click to edit Master text styles</a:t>
             </a:r>
           </a:p>
@@ -2103,7 +2108,7 @@
           <a:p>
             <a:fld id="{A16762DA-0EF7-46B5-B462-6D59499F3413}" type="datetimeFigureOut">
               <a:rPr lang="en-CA" smtClean="0"/>
-              <a:t>20/10/2016</a:t>
+              <a:t>24/10/2016</a:t>
             </a:fld>
             <a:endParaRPr lang="en-CA"/>
           </a:p>
@@ -2206,7 +2211,7 @@
           </a:lstStyle>
           <a:p>
             <a:r>
-              <a:rPr lang="en-US" smtClean="0"/>
+              <a:rPr lang="en-US"/>
               <a:t>Click to edit Master title style</a:t>
             </a:r>
             <a:endParaRPr lang="en-CA"/>
@@ -2333,7 +2338,7 @@
           <a:p>
             <a:pPr lvl="0"/>
             <a:r>
-              <a:rPr lang="en-US" smtClean="0"/>
+              <a:rPr lang="en-US"/>
               <a:t>Click to edit Master text styles</a:t>
             </a:r>
           </a:p>
@@ -2356,7 +2361,7 @@
           <a:p>
             <a:fld id="{A16762DA-0EF7-46B5-B462-6D59499F3413}" type="datetimeFigureOut">
               <a:rPr lang="en-CA" smtClean="0"/>
-              <a:t>20/10/2016</a:t>
+              <a:t>24/10/2016</a:t>
             </a:fld>
             <a:endParaRPr lang="en-CA"/>
           </a:p>
@@ -2465,7 +2470,7 @@
           <a:lstStyle/>
           <a:p>
             <a:r>
-              <a:rPr lang="en-US" smtClean="0"/>
+              <a:rPr lang="en-US"/>
               <a:t>Click to edit Master title style</a:t>
             </a:r>
             <a:endParaRPr lang="en-CA"/>
@@ -2499,35 +2504,35 @@
           <a:p>
             <a:pPr lvl="0"/>
             <a:r>
-              <a:rPr lang="en-US" smtClean="0"/>
+              <a:rPr lang="en-US"/>
               <a:t>Click to edit Master text styles</a:t>
             </a:r>
           </a:p>
           <a:p>
             <a:pPr lvl="1"/>
             <a:r>
-              <a:rPr lang="en-US" smtClean="0"/>
+              <a:rPr lang="en-US"/>
               <a:t>Second level</a:t>
             </a:r>
           </a:p>
           <a:p>
             <a:pPr lvl="2"/>
             <a:r>
-              <a:rPr lang="en-US" smtClean="0"/>
+              <a:rPr lang="en-US"/>
               <a:t>Third level</a:t>
             </a:r>
           </a:p>
           <a:p>
             <a:pPr lvl="3"/>
             <a:r>
-              <a:rPr lang="en-US" smtClean="0"/>
+              <a:rPr lang="en-US"/>
               <a:t>Fourth level</a:t>
             </a:r>
           </a:p>
           <a:p>
             <a:pPr lvl="4"/>
             <a:r>
-              <a:rPr lang="en-US" smtClean="0"/>
+              <a:rPr lang="en-US"/>
               <a:t>Fifth level</a:t>
             </a:r>
             <a:endParaRPr lang="en-CA"/>
@@ -2569,7 +2574,7 @@
           <a:p>
             <a:fld id="{A16762DA-0EF7-46B5-B462-6D59499F3413}" type="datetimeFigureOut">
               <a:rPr lang="en-CA" smtClean="0"/>
-              <a:t>20/10/2016</a:t>
+              <a:t>24/10/2016</a:t>
             </a:fld>
             <a:endParaRPr lang="en-CA"/>
           </a:p>
@@ -2990,10 +2995,9 @@
           <a:lstStyle/>
           <a:p>
             <a:r>
-              <a:rPr lang="en-CA" dirty="0" smtClean="0"/>
+              <a:rPr lang="en-CA" dirty="0"/>
               <a:t>Chapter 8 – Artificial Life</a:t>
             </a:r>
-            <a:endParaRPr lang="en-CA" dirty="0"/>
           </a:p>
         </p:txBody>
       </p:sp>
@@ -3013,19 +3017,19 @@
           <a:lstStyle/>
           <a:p>
             <a:r>
-              <a:rPr lang="en-CA" dirty="0" smtClean="0"/>
+              <a:rPr lang="en-CA" dirty="0"/>
               <a:t>Ben Church &amp; </a:t>
             </a:r>
             <a:r>
-              <a:rPr lang="en-CA" dirty="0" err="1" smtClean="0"/>
+              <a:rPr lang="en-CA" dirty="0" err="1"/>
               <a:t>Itamar</a:t>
             </a:r>
             <a:r>
-              <a:rPr lang="en-CA" dirty="0" smtClean="0"/>
+              <a:rPr lang="en-CA" dirty="0"/>
               <a:t> </a:t>
             </a:r>
             <a:r>
-              <a:rPr lang="en-CA" dirty="0" err="1" smtClean="0"/>
+              <a:rPr lang="en-CA" dirty="0" err="1"/>
               <a:t>Tzadok</a:t>
             </a:r>
             <a:endParaRPr lang="en-CA" dirty="0"/>
@@ -3042,6 +3046,280 @@
   <p:clrMapOvr>
     <a:masterClrMapping/>
   </p:clrMapOvr>
+  <p:timing>
+    <p:tnLst>
+      <p:par>
+        <p:cTn id="1" dur="indefinite" restart="never" nodeType="tmRoot"/>
+      </p:par>
+    </p:tnLst>
+  </p:timing>
+</p:sld>
+</file>
+
+<file path=ppt/slides/slide10.xml><?xml version="1.0" encoding="utf-8"?>
+<p:sld xmlns:a="http://schemas.openxmlformats.org/drawingml/2006/main" xmlns:r="http://schemas.openxmlformats.org/officeDocument/2006/relationships" xmlns:p="http://schemas.openxmlformats.org/presentationml/2006/main">
+  <p:cSld>
+    <p:spTree>
+      <p:nvGrpSpPr>
+        <p:cNvPr id="1" name=""/>
+        <p:cNvGrpSpPr/>
+        <p:nvPr/>
+      </p:nvGrpSpPr>
+      <p:grpSpPr>
+        <a:xfrm>
+          <a:off x="0" y="0"/>
+          <a:ext cx="0" cy="0"/>
+          <a:chOff x="0" y="0"/>
+          <a:chExt cx="0" cy="0"/>
+        </a:xfrm>
+      </p:grpSpPr>
+      <p:sp>
+        <p:nvSpPr>
+          <p:cNvPr id="2" name="Title 1"/>
+          <p:cNvSpPr>
+            <a:spLocks noGrp="1"/>
+          </p:cNvSpPr>
+          <p:nvPr>
+            <p:ph type="title"/>
+          </p:nvPr>
+        </p:nvSpPr>
+        <p:spPr/>
+        <p:txBody>
+          <a:bodyPr/>
+          <a:lstStyle/>
+          <a:p>
+            <a:r>
+              <a:rPr lang="en-CA" dirty="0"/>
+              <a:t>The meaning of life</a:t>
+            </a:r>
+          </a:p>
+        </p:txBody>
+      </p:sp>
+      <p:sp>
+        <p:nvSpPr>
+          <p:cNvPr id="3" name="Content Placeholder 2"/>
+          <p:cNvSpPr>
+            <a:spLocks noGrp="1"/>
+          </p:cNvSpPr>
+          <p:nvPr>
+            <p:ph idx="1"/>
+          </p:nvPr>
+        </p:nvSpPr>
+        <p:spPr>
+          <a:xfrm>
+            <a:off x="838200" y="1825625"/>
+            <a:ext cx="5599545" cy="4351338"/>
+          </a:xfrm>
+        </p:spPr>
+        <p:txBody>
+          <a:bodyPr/>
+          <a:lstStyle/>
+          <a:p>
+            <a:r>
+              <a:rPr lang="en-CA" dirty="0"/>
+              <a:t>AL asks us to consider an age old question: </a:t>
+            </a:r>
+            <a:br>
+              <a:rPr lang="en-CA" dirty="0"/>
+            </a:br>
+            <a:r>
+              <a:rPr lang="en-CA" dirty="0"/>
+              <a:t>	What does it mean to be alive?</a:t>
+            </a:r>
+          </a:p>
+          <a:p>
+            <a:r>
+              <a:rPr lang="en-CA" dirty="0"/>
+              <a:t>To see past the details of life’s </a:t>
+            </a:r>
+            <a:r>
+              <a:rPr lang="en-CA" dirty="0" smtClean="0"/>
+              <a:t>various implementations </a:t>
+            </a:r>
+            <a:r>
+              <a:rPr lang="en-CA" dirty="0"/>
+              <a:t>is to know </a:t>
+            </a:r>
+            <a:r>
+              <a:rPr lang="en-CA" dirty="0" smtClean="0"/>
+              <a:t>this.</a:t>
+            </a:r>
+            <a:endParaRPr lang="en-CA" dirty="0"/>
+          </a:p>
+        </p:txBody>
+      </p:sp>
+    </p:spTree>
+    <p:extLst>
+      <p:ext uri="{BB962C8B-B14F-4D97-AF65-F5344CB8AC3E}">
+        <p14:creationId xmlns:p14="http://schemas.microsoft.com/office/powerpoint/2010/main" val="1754329738"/>
+      </p:ext>
+    </p:extLst>
+  </p:cSld>
+  <p:clrMapOvr>
+    <a:masterClrMapping/>
+  </p:clrMapOvr>
+  <p:timing>
+    <p:tnLst>
+      <p:par>
+        <p:cTn id="1" dur="indefinite" restart="never" nodeType="tmRoot"/>
+      </p:par>
+    </p:tnLst>
+  </p:timing>
+</p:sld>
+</file>
+
+<file path=ppt/slides/slide11.xml><?xml version="1.0" encoding="utf-8"?>
+<p:sld xmlns:a="http://schemas.openxmlformats.org/drawingml/2006/main" xmlns:r="http://schemas.openxmlformats.org/officeDocument/2006/relationships" xmlns:p="http://schemas.openxmlformats.org/presentationml/2006/main">
+  <p:cSld>
+    <p:spTree>
+      <p:nvGrpSpPr>
+        <p:cNvPr id="1" name=""/>
+        <p:cNvGrpSpPr/>
+        <p:nvPr/>
+      </p:nvGrpSpPr>
+      <p:grpSpPr>
+        <a:xfrm>
+          <a:off x="0" y="0"/>
+          <a:ext cx="0" cy="0"/>
+          <a:chOff x="0" y="0"/>
+          <a:chExt cx="0" cy="0"/>
+        </a:xfrm>
+      </p:grpSpPr>
+      <p:sp>
+        <p:nvSpPr>
+          <p:cNvPr id="2" name="Title 1"/>
+          <p:cNvSpPr>
+            <a:spLocks noGrp="1"/>
+          </p:cNvSpPr>
+          <p:nvPr>
+            <p:ph type="title"/>
+          </p:nvPr>
+        </p:nvSpPr>
+        <p:spPr/>
+        <p:txBody>
+          <a:bodyPr/>
+          <a:lstStyle/>
+          <a:p>
+            <a:r>
+              <a:rPr lang="en-CA" dirty="0" smtClean="0"/>
+              <a:t>Some case studies</a:t>
+            </a:r>
+            <a:endParaRPr lang="en-CA" dirty="0"/>
+          </a:p>
+        </p:txBody>
+      </p:sp>
+      <p:sp>
+        <p:nvSpPr>
+          <p:cNvPr id="3" name="Content Placeholder 2"/>
+          <p:cNvSpPr>
+            <a:spLocks noGrp="1"/>
+          </p:cNvSpPr>
+          <p:nvPr>
+            <p:ph idx="1"/>
+          </p:nvPr>
+        </p:nvSpPr>
+        <p:spPr/>
+        <p:txBody>
+          <a:bodyPr/>
+          <a:lstStyle/>
+          <a:p>
+            <a:r>
+              <a:rPr lang="en-CA" dirty="0" smtClean="0"/>
+              <a:t>Reynolds’ </a:t>
+            </a:r>
+            <a:r>
+              <a:rPr lang="en-CA" dirty="0" err="1" smtClean="0"/>
+              <a:t>boids</a:t>
+            </a:r>
+            <a:endParaRPr lang="en-CA" dirty="0"/>
+          </a:p>
+          <a:p>
+            <a:r>
+              <a:rPr lang="en-CA" dirty="0" smtClean="0"/>
+              <a:t>Dawkins’ </a:t>
+            </a:r>
+            <a:r>
+              <a:rPr lang="en-CA" dirty="0" err="1" smtClean="0"/>
+              <a:t>biomorphs</a:t>
+            </a:r>
+            <a:endParaRPr lang="en-CA" dirty="0" smtClean="0"/>
+          </a:p>
+          <a:p>
+            <a:r>
+              <a:rPr lang="en-CA" dirty="0" smtClean="0"/>
+              <a:t>Computer viruses</a:t>
+            </a:r>
+          </a:p>
+          <a:p>
+            <a:r>
+              <a:rPr lang="en-CA" dirty="0" smtClean="0"/>
+              <a:t>Synthesizing emotional behaviour</a:t>
+            </a:r>
+          </a:p>
+          <a:p>
+            <a:r>
+              <a:rPr lang="en-CA" dirty="0" smtClean="0"/>
+              <a:t>Sony’s AIBO</a:t>
+            </a:r>
+          </a:p>
+          <a:p>
+            <a:r>
+              <a:rPr lang="en-CA" dirty="0" err="1" smtClean="0"/>
+              <a:t>Theraulaz</a:t>
+            </a:r>
+            <a:r>
+              <a:rPr lang="en-CA" dirty="0" smtClean="0"/>
+              <a:t> and </a:t>
+            </a:r>
+            <a:r>
+              <a:rPr lang="en-CA" dirty="0" err="1" smtClean="0"/>
+              <a:t>Bonabeau’s</a:t>
+            </a:r>
+            <a:r>
+              <a:rPr lang="en-CA" dirty="0" smtClean="0"/>
+              <a:t> nest building</a:t>
+            </a:r>
+          </a:p>
+          <a:p>
+            <a:r>
+              <a:rPr lang="en-CA" dirty="0" smtClean="0"/>
+              <a:t>+ Any others</a:t>
+            </a:r>
+          </a:p>
+          <a:p>
+            <a:r>
+              <a:rPr lang="en-CA" dirty="0" smtClean="0"/>
+              <a:t>+ </a:t>
+            </a:r>
+            <a:r>
+              <a:rPr lang="en-CA" dirty="0" err="1" smtClean="0"/>
+              <a:t>Itamar’s</a:t>
+            </a:r>
+            <a:r>
+              <a:rPr lang="en-CA" smtClean="0"/>
+              <a:t> studies</a:t>
+            </a:r>
+            <a:endParaRPr lang="en-CA" dirty="0"/>
+          </a:p>
+        </p:txBody>
+      </p:sp>
+    </p:spTree>
+    <p:extLst>
+      <p:ext uri="{BB962C8B-B14F-4D97-AF65-F5344CB8AC3E}">
+        <p14:creationId xmlns:p14="http://schemas.microsoft.com/office/powerpoint/2010/main" val="1781542368"/>
+      </p:ext>
+    </p:extLst>
+  </p:cSld>
+  <p:clrMapOvr>
+    <a:masterClrMapping/>
+  </p:clrMapOvr>
+  <p:timing>
+    <p:tnLst>
+      <p:par>
+        <p:cTn id="1" dur="indefinite" restart="never" nodeType="tmRoot"/>
+      </p:par>
+    </p:tnLst>
+  </p:timing>
 </p:sld>
 </file>
 
@@ -3078,10 +3356,1436 @@
           <a:lstStyle/>
           <a:p>
             <a:r>
+              <a:rPr lang="en-CA" dirty="0"/>
+              <a:t>What is artificial life (AL)?</a:t>
+            </a:r>
+          </a:p>
+        </p:txBody>
+      </p:sp>
+      <p:sp>
+        <p:nvSpPr>
+          <p:cNvPr id="3" name="Content Placeholder 2"/>
+          <p:cNvSpPr>
+            <a:spLocks noGrp="1"/>
+          </p:cNvSpPr>
+          <p:nvPr>
+            <p:ph idx="1"/>
+          </p:nvPr>
+        </p:nvSpPr>
+        <p:spPr>
+          <a:xfrm>
+            <a:off x="838200" y="1513114"/>
+            <a:ext cx="10515600" cy="5094515"/>
+          </a:xfrm>
+        </p:spPr>
+        <p:txBody>
+          <a:bodyPr/>
+          <a:lstStyle/>
+          <a:p>
+            <a:pPr marL="0" indent="0">
+              <a:buNone/>
+            </a:pPr>
+            <a:r>
               <a:rPr lang="en-CA" dirty="0" smtClean="0"/>
+              <a:t>So far we’ve seen evolutionary computing, </a:t>
+            </a:r>
+            <a:r>
+              <a:rPr lang="en-CA" dirty="0" err="1" smtClean="0"/>
+              <a:t>neurocomputing</a:t>
+            </a:r>
+            <a:r>
+              <a:rPr lang="en-CA" dirty="0" smtClean="0"/>
+              <a:t>, swarm intelligence, and </a:t>
+            </a:r>
+            <a:r>
+              <a:rPr lang="en-CA" dirty="0" err="1" smtClean="0"/>
+              <a:t>immunocomputing</a:t>
+            </a:r>
+            <a:endParaRPr lang="en-CA" dirty="0" smtClean="0"/>
+          </a:p>
+          <a:p>
+            <a:pPr marL="457200" lvl="1" indent="0">
+              <a:buNone/>
+            </a:pPr>
+            <a:r>
+              <a:rPr lang="en-CA" dirty="0" smtClean="0"/>
+              <a:t>All fields using algorithms inspired by life.</a:t>
+            </a:r>
+          </a:p>
+          <a:p>
+            <a:pPr marL="457200" lvl="1" indent="0">
+              <a:buNone/>
+            </a:pPr>
+            <a:endParaRPr lang="en-CA" dirty="0" smtClean="0"/>
+          </a:p>
+          <a:p>
+            <a:pPr marL="457200" lvl="1" indent="0">
+              <a:buNone/>
+            </a:pPr>
+            <a:endParaRPr lang="en-CA" dirty="0"/>
+          </a:p>
+          <a:p>
+            <a:pPr marL="457200" lvl="1" indent="0">
+              <a:buNone/>
+            </a:pPr>
+            <a:endParaRPr lang="en-CA" dirty="0" smtClean="0"/>
+          </a:p>
+          <a:p>
+            <a:pPr marL="457200" lvl="1" indent="0">
+              <a:buNone/>
+            </a:pPr>
+            <a:endParaRPr lang="en-CA" dirty="0"/>
+          </a:p>
+          <a:p>
+            <a:pPr marL="457200" lvl="1" indent="0">
+              <a:buNone/>
+            </a:pPr>
+            <a:endParaRPr lang="en-CA" dirty="0" smtClean="0"/>
+          </a:p>
+          <a:p>
+            <a:pPr marL="457200" lvl="1" indent="0">
+              <a:buNone/>
+            </a:pPr>
+            <a:endParaRPr lang="en-CA" dirty="0" smtClean="0"/>
+          </a:p>
+          <a:p>
+            <a:pPr marL="457200" lvl="1" indent="0">
+              <a:buNone/>
+            </a:pPr>
+            <a:endParaRPr lang="en-CA" dirty="0" smtClean="0"/>
+          </a:p>
+          <a:p>
+            <a:pPr marL="0" indent="0">
+              <a:buNone/>
+            </a:pPr>
+            <a:endParaRPr lang="en-CA" dirty="0" smtClean="0"/>
+          </a:p>
+          <a:p>
+            <a:pPr marL="0" indent="0">
+              <a:spcBef>
+                <a:spcPts val="0"/>
+              </a:spcBef>
+              <a:buNone/>
+            </a:pPr>
+            <a:r>
+              <a:rPr lang="en-CA" dirty="0" smtClean="0"/>
+              <a:t>What makes AL a field in its own right?</a:t>
+            </a:r>
+            <a:endParaRPr lang="en-CA" dirty="0"/>
+          </a:p>
+        </p:txBody>
+      </p:sp>
+      <p:grpSp>
+        <p:nvGrpSpPr>
+          <p:cNvPr id="8" name="Group 7"/>
+          <p:cNvGrpSpPr/>
+          <p:nvPr/>
+        </p:nvGrpSpPr>
+        <p:grpSpPr>
+          <a:xfrm>
+            <a:off x="598129" y="3008114"/>
+            <a:ext cx="2943566" cy="2601886"/>
+            <a:chOff x="1203891" y="2906486"/>
+            <a:chExt cx="2812938" cy="2545936"/>
+          </a:xfrm>
+        </p:grpSpPr>
+        <p:grpSp>
+          <p:nvGrpSpPr>
+            <p:cNvPr id="6" name="Group 5"/>
+            <p:cNvGrpSpPr/>
+            <p:nvPr/>
+          </p:nvGrpSpPr>
+          <p:grpSpPr>
+            <a:xfrm>
+              <a:off x="1203891" y="2906486"/>
+              <a:ext cx="2812938" cy="2545936"/>
+              <a:chOff x="1203891" y="3196431"/>
+              <a:chExt cx="2273072" cy="2247892"/>
+            </a:xfrm>
+          </p:grpSpPr>
+          <p:pic>
+            <p:nvPicPr>
+              <p:cNvPr id="4" name="Picture 3"/>
+              <p:cNvPicPr>
+                <a:picLocks noChangeAspect="1"/>
+              </p:cNvPicPr>
+              <p:nvPr/>
+            </p:nvPicPr>
+            <p:blipFill>
+              <a:blip r:embed="rId2">
+                <a:extLst>
+                  <a:ext uri="{28A0092B-C50C-407E-A947-70E740481C1C}">
+                    <a14:useLocalDpi xmlns:a14="http://schemas.microsoft.com/office/drawing/2010/main" val="0"/>
+                  </a:ext>
+                </a:extLst>
+              </a:blip>
+              <a:stretch>
+                <a:fillRect/>
+              </a:stretch>
+            </p:blipFill>
+            <p:spPr>
+              <a:xfrm>
+                <a:off x="1297440" y="3196431"/>
+                <a:ext cx="2085975" cy="1609725"/>
+              </a:xfrm>
+              <a:prstGeom prst="rect">
+                <a:avLst/>
+              </a:prstGeom>
+            </p:spPr>
+          </p:pic>
+          <p:sp>
+            <p:nvSpPr>
+              <p:cNvPr id="5" name="TextBox 4"/>
+              <p:cNvSpPr txBox="1"/>
+              <p:nvPr/>
+            </p:nvSpPr>
+            <p:spPr>
+              <a:xfrm>
+                <a:off x="1203891" y="4806156"/>
+                <a:ext cx="2273072" cy="638167"/>
+              </a:xfrm>
+              <a:prstGeom prst="rect">
+                <a:avLst/>
+              </a:prstGeom>
+              <a:noFill/>
+            </p:spPr>
+            <p:txBody>
+              <a:bodyPr wrap="square" rtlCol="0">
+                <a:spAutoFit/>
+              </a:bodyPr>
+              <a:lstStyle/>
+              <a:p>
+                <a:r>
+                  <a:rPr lang="en-CA" sz="1050" dirty="0">
+                    <a:solidFill>
+                      <a:schemeClr val="bg1">
+                        <a:lumMod val="50000"/>
+                      </a:schemeClr>
+                    </a:solidFill>
+                  </a:rPr>
+                  <a:t>http://</a:t>
+                </a:r>
+                <a:r>
+                  <a:rPr lang="en-CA" sz="1050" dirty="0" smtClean="0">
+                    <a:solidFill>
+                      <a:schemeClr val="bg1">
+                        <a:lumMod val="50000"/>
+                      </a:schemeClr>
+                    </a:solidFill>
+                  </a:rPr>
+                  <a:t>www.lakeshorelearning.com/media/images/free_resources/clip_art/school/computer.jpg</a:t>
+                </a:r>
+              </a:p>
+              <a:p>
+                <a:r>
+                  <a:rPr lang="en-CA" sz="1050" dirty="0">
+                    <a:solidFill>
+                      <a:schemeClr val="bg1">
+                        <a:lumMod val="50000"/>
+                      </a:schemeClr>
+                    </a:solidFill>
+                  </a:rPr>
+                  <a:t>http://images.fanpop.com/images/image_uploads/Darwin-Fish-debate-761620_500_306.jpg</a:t>
+                </a:r>
+              </a:p>
+            </p:txBody>
+          </p:sp>
+        </p:grpSp>
+        <p:pic>
+          <p:nvPicPr>
+            <p:cNvPr id="7" name="Picture 6"/>
+            <p:cNvPicPr>
+              <a:picLocks noChangeAspect="1"/>
+            </p:cNvPicPr>
+            <p:nvPr/>
+          </p:nvPicPr>
+          <p:blipFill>
+            <a:blip r:embed="rId3" cstate="print">
+              <a:extLst>
+                <a:ext uri="{28A0092B-C50C-407E-A947-70E740481C1C}">
+                  <a14:useLocalDpi xmlns:a14="http://schemas.microsoft.com/office/drawing/2010/main" val="0"/>
+                </a:ext>
+              </a:extLst>
+            </a:blip>
+            <a:stretch>
+              <a:fillRect/>
+            </a:stretch>
+          </p:blipFill>
+          <p:spPr>
+            <a:xfrm>
+              <a:off x="1788887" y="3118061"/>
+              <a:ext cx="1052286" cy="643998"/>
+            </a:xfrm>
+            <a:prstGeom prst="rect">
+              <a:avLst/>
+            </a:prstGeom>
+          </p:spPr>
+        </p:pic>
+      </p:grpSp>
+      <p:grpSp>
+        <p:nvGrpSpPr>
+          <p:cNvPr id="16" name="Group 15"/>
+          <p:cNvGrpSpPr/>
+          <p:nvPr/>
+        </p:nvGrpSpPr>
+        <p:grpSpPr>
+          <a:xfrm>
+            <a:off x="3470714" y="2561275"/>
+            <a:ext cx="2907094" cy="3042906"/>
+            <a:chOff x="3470714" y="2561275"/>
+            <a:chExt cx="2907094" cy="3042906"/>
+          </a:xfrm>
+        </p:grpSpPr>
+        <p:sp>
+          <p:nvSpPr>
+            <p:cNvPr id="10" name="TextBox 9"/>
+            <p:cNvSpPr txBox="1"/>
+            <p:nvPr/>
+          </p:nvSpPr>
+          <p:spPr>
+            <a:xfrm>
+              <a:off x="3470714" y="4896295"/>
+              <a:ext cx="2699657" cy="707886"/>
+            </a:xfrm>
+            <a:prstGeom prst="rect">
+              <a:avLst/>
+            </a:prstGeom>
+            <a:noFill/>
+          </p:spPr>
+          <p:txBody>
+            <a:bodyPr wrap="square" rtlCol="0">
+              <a:spAutoFit/>
+            </a:bodyPr>
+            <a:lstStyle/>
+            <a:p>
+              <a:r>
+                <a:rPr lang="en-CA" sz="1000" dirty="0">
+                  <a:solidFill>
+                    <a:schemeClr val="bg1">
+                      <a:lumMod val="50000"/>
+                    </a:schemeClr>
+                  </a:solidFill>
+                </a:rPr>
+                <a:t>http://</a:t>
+              </a:r>
+              <a:r>
+                <a:rPr lang="en-CA" sz="1000" dirty="0" smtClean="0">
+                  <a:solidFill>
+                    <a:schemeClr val="bg1">
+                      <a:lumMod val="50000"/>
+                    </a:schemeClr>
+                  </a:solidFill>
+                </a:rPr>
+                <a:t>www.clker.com/cliparts/o/R/Q/f/z/T/brain-hi.png</a:t>
+              </a:r>
+            </a:p>
+            <a:p>
+              <a:r>
+                <a:rPr lang="en-CA" sz="1000" dirty="0">
+                  <a:solidFill>
+                    <a:schemeClr val="bg1">
+                      <a:lumMod val="50000"/>
+                    </a:schemeClr>
+                  </a:solidFill>
+                </a:rPr>
+                <a:t>http://images.clipartpanda.com/clipart-computer-clip-art-computers-420136.jpg</a:t>
+              </a:r>
+            </a:p>
+          </p:txBody>
+        </p:sp>
+        <p:grpSp>
+          <p:nvGrpSpPr>
+            <p:cNvPr id="13" name="Group 12"/>
+            <p:cNvGrpSpPr/>
+            <p:nvPr/>
+          </p:nvGrpSpPr>
+          <p:grpSpPr>
+            <a:xfrm>
+              <a:off x="3477675" y="2561275"/>
+              <a:ext cx="2900133" cy="2525764"/>
+              <a:chOff x="5790749" y="1370574"/>
+              <a:chExt cx="4667250" cy="4314825"/>
+            </a:xfrm>
+          </p:grpSpPr>
+          <p:pic>
+            <p:nvPicPr>
+              <p:cNvPr id="12" name="Picture 11"/>
+              <p:cNvPicPr>
+                <a:picLocks noChangeAspect="1"/>
+              </p:cNvPicPr>
+              <p:nvPr/>
+            </p:nvPicPr>
+            <p:blipFill>
+              <a:blip r:embed="rId4">
+                <a:extLst>
+                  <a:ext uri="{28A0092B-C50C-407E-A947-70E740481C1C}">
+                    <a14:useLocalDpi xmlns:a14="http://schemas.microsoft.com/office/drawing/2010/main" val="0"/>
+                  </a:ext>
+                </a:extLst>
+              </a:blip>
+              <a:stretch>
+                <a:fillRect/>
+              </a:stretch>
+            </p:blipFill>
+            <p:spPr>
+              <a:xfrm>
+                <a:off x="5790749" y="1370574"/>
+                <a:ext cx="4667250" cy="4314825"/>
+              </a:xfrm>
+              <a:prstGeom prst="rect">
+                <a:avLst/>
+              </a:prstGeom>
+            </p:spPr>
+          </p:pic>
+          <p:pic>
+            <p:nvPicPr>
+              <p:cNvPr id="11" name="Picture 10"/>
+              <p:cNvPicPr>
+                <a:picLocks noChangeAspect="1"/>
+              </p:cNvPicPr>
+              <p:nvPr/>
+            </p:nvPicPr>
+            <p:blipFill>
+              <a:blip r:embed="rId5" cstate="print">
+                <a:extLst>
+                  <a:ext uri="{28A0092B-C50C-407E-A947-70E740481C1C}">
+                    <a14:useLocalDpi xmlns:a14="http://schemas.microsoft.com/office/drawing/2010/main" val="0"/>
+                  </a:ext>
+                </a:extLst>
+              </a:blip>
+              <a:stretch>
+                <a:fillRect/>
+              </a:stretch>
+            </p:blipFill>
+            <p:spPr>
+              <a:xfrm rot="5400000">
+                <a:off x="7509739" y="2146253"/>
+                <a:ext cx="884236" cy="1099769"/>
+              </a:xfrm>
+              <a:prstGeom prst="rect">
+                <a:avLst/>
+              </a:prstGeom>
+            </p:spPr>
+          </p:pic>
+        </p:grpSp>
+      </p:grpSp>
+      <p:grpSp>
+        <p:nvGrpSpPr>
+          <p:cNvPr id="19" name="Group 18"/>
+          <p:cNvGrpSpPr/>
+          <p:nvPr/>
+        </p:nvGrpSpPr>
+        <p:grpSpPr>
+          <a:xfrm>
+            <a:off x="5943118" y="2009068"/>
+            <a:ext cx="3635829" cy="3435423"/>
+            <a:chOff x="5889504" y="1948157"/>
+            <a:chExt cx="3635829" cy="3435423"/>
+          </a:xfrm>
+        </p:grpSpPr>
+        <p:sp>
+          <p:nvSpPr>
+            <p:cNvPr id="15" name="TextBox 14"/>
+            <p:cNvSpPr txBox="1"/>
+            <p:nvPr/>
+          </p:nvSpPr>
+          <p:spPr>
+            <a:xfrm>
+              <a:off x="6227493" y="4983470"/>
+              <a:ext cx="3124200" cy="400110"/>
+            </a:xfrm>
+            <a:prstGeom prst="rect">
+              <a:avLst/>
+            </a:prstGeom>
+            <a:noFill/>
+          </p:spPr>
+          <p:txBody>
+            <a:bodyPr wrap="square" rtlCol="0">
+              <a:spAutoFit/>
+            </a:bodyPr>
+            <a:lstStyle/>
+            <a:p>
+              <a:r>
+                <a:rPr lang="en-CA" sz="1000" dirty="0">
+                  <a:solidFill>
+                    <a:schemeClr val="bg1">
+                      <a:lumMod val="50000"/>
+                    </a:schemeClr>
+                  </a:solidFill>
+                </a:rPr>
+                <a:t>http://www.clipartbest.com/cliparts/LiK/rk9/LiKrk9RaT.jpeg</a:t>
+              </a:r>
+            </a:p>
+          </p:txBody>
+        </p:sp>
+        <p:grpSp>
+          <p:nvGrpSpPr>
+            <p:cNvPr id="18" name="Group 17"/>
+            <p:cNvGrpSpPr/>
+            <p:nvPr/>
+          </p:nvGrpSpPr>
+          <p:grpSpPr>
+            <a:xfrm>
+              <a:off x="5889504" y="1948157"/>
+              <a:ext cx="3635829" cy="2970015"/>
+              <a:chOff x="5889504" y="1948157"/>
+              <a:chExt cx="3635829" cy="2970015"/>
+            </a:xfrm>
+          </p:grpSpPr>
+          <p:pic>
+            <p:nvPicPr>
+              <p:cNvPr id="14" name="Picture 13"/>
+              <p:cNvPicPr>
+                <a:picLocks noChangeAspect="1"/>
+              </p:cNvPicPr>
+              <p:nvPr/>
+            </p:nvPicPr>
+            <p:blipFill rotWithShape="1">
+              <a:blip r:embed="rId6" cstate="print">
+                <a:extLst>
+                  <a:ext uri="{28A0092B-C50C-407E-A947-70E740481C1C}">
+                    <a14:useLocalDpi xmlns:a14="http://schemas.microsoft.com/office/drawing/2010/main" val="0"/>
+                  </a:ext>
+                </a:extLst>
+              </a:blip>
+              <a:srcRect t="15747" b="26257"/>
+              <a:stretch/>
+            </p:blipFill>
+            <p:spPr>
+              <a:xfrm>
+                <a:off x="5889504" y="2730142"/>
+                <a:ext cx="3635829" cy="2188030"/>
+              </a:xfrm>
+              <a:prstGeom prst="rect">
+                <a:avLst/>
+              </a:prstGeom>
+            </p:spPr>
+          </p:pic>
+          <p:sp>
+            <p:nvSpPr>
+              <p:cNvPr id="17" name="Cloud Callout 16"/>
+              <p:cNvSpPr/>
+              <p:nvPr/>
+            </p:nvSpPr>
+            <p:spPr>
+              <a:xfrm flipH="1">
+                <a:off x="6496736" y="1948157"/>
+                <a:ext cx="2073431" cy="888570"/>
+              </a:xfrm>
+              <a:prstGeom prst="cloudCallout">
+                <a:avLst/>
+              </a:prstGeom>
+              <a:noFill/>
+              <a:ln w="28575">
+                <a:solidFill>
+                  <a:schemeClr val="tx1"/>
+                </a:solidFill>
+              </a:ln>
+            </p:spPr>
+            <p:style>
+              <a:lnRef idx="2">
+                <a:schemeClr val="accent1">
+                  <a:shade val="50000"/>
+                </a:schemeClr>
+              </a:lnRef>
+              <a:fillRef idx="1">
+                <a:schemeClr val="accent1"/>
+              </a:fillRef>
+              <a:effectRef idx="0">
+                <a:schemeClr val="accent1"/>
+              </a:effectRef>
+              <a:fontRef idx="minor">
+                <a:schemeClr val="lt1"/>
+              </a:fontRef>
+            </p:style>
+            <p:txBody>
+              <a:bodyPr rtlCol="0" anchor="ctr"/>
+              <a:lstStyle/>
+              <a:p>
+                <a:pPr algn="ctr"/>
+                <a:endParaRPr lang="en-CA"/>
+              </a:p>
+            </p:txBody>
+          </p:sp>
+        </p:grpSp>
+      </p:grpSp>
+      <p:grpSp>
+        <p:nvGrpSpPr>
+          <p:cNvPr id="22" name="Group 21"/>
+          <p:cNvGrpSpPr/>
+          <p:nvPr/>
+        </p:nvGrpSpPr>
+        <p:grpSpPr>
+          <a:xfrm>
+            <a:off x="9351693" y="2270269"/>
+            <a:ext cx="2401176" cy="3338912"/>
+            <a:chOff x="9351693" y="2143498"/>
+            <a:chExt cx="2401176" cy="3338912"/>
+          </a:xfrm>
+        </p:grpSpPr>
+        <p:pic>
+          <p:nvPicPr>
+            <p:cNvPr id="20" name="Picture 19"/>
+            <p:cNvPicPr>
+              <a:picLocks noChangeAspect="1"/>
+            </p:cNvPicPr>
+            <p:nvPr/>
+          </p:nvPicPr>
+          <p:blipFill>
+            <a:blip r:embed="rId7">
+              <a:extLst>
+                <a:ext uri="{28A0092B-C50C-407E-A947-70E740481C1C}">
+                  <a14:useLocalDpi xmlns:a14="http://schemas.microsoft.com/office/drawing/2010/main" val="0"/>
+                </a:ext>
+              </a:extLst>
+            </a:blip>
+            <a:stretch>
+              <a:fillRect/>
+            </a:stretch>
+          </p:blipFill>
+          <p:spPr>
+            <a:xfrm>
+              <a:off x="9503928" y="2143498"/>
+              <a:ext cx="2008060" cy="2644359"/>
+            </a:xfrm>
+            <a:prstGeom prst="rect">
+              <a:avLst/>
+            </a:prstGeom>
+          </p:spPr>
+        </p:pic>
+        <p:sp>
+          <p:nvSpPr>
+            <p:cNvPr id="21" name="TextBox 20"/>
+            <p:cNvSpPr txBox="1"/>
+            <p:nvPr/>
+          </p:nvSpPr>
+          <p:spPr>
+            <a:xfrm>
+              <a:off x="9351693" y="4928412"/>
+              <a:ext cx="2401176" cy="553998"/>
+            </a:xfrm>
+            <a:prstGeom prst="rect">
+              <a:avLst/>
+            </a:prstGeom>
+            <a:noFill/>
+          </p:spPr>
+          <p:txBody>
+            <a:bodyPr wrap="square" rtlCol="0">
+              <a:spAutoFit/>
+            </a:bodyPr>
+            <a:lstStyle/>
+            <a:p>
+              <a:r>
+                <a:rPr lang="en-CA" sz="1000" dirty="0">
+                  <a:solidFill>
+                    <a:schemeClr val="bg1">
+                      <a:lumMod val="50000"/>
+                    </a:schemeClr>
+                  </a:solidFill>
+                </a:rPr>
+                <a:t>http://4.bp.blogspot.com/_tgM9xSZdl34/TQN7Fg1wEWI/AAAAAAAAGKk/_J2FFfLgQtQ/s320/computer%2Bvirus.jpg</a:t>
+              </a:r>
+            </a:p>
+          </p:txBody>
+        </p:sp>
+      </p:grpSp>
+    </p:spTree>
+    <p:extLst>
+      <p:ext uri="{BB962C8B-B14F-4D97-AF65-F5344CB8AC3E}">
+        <p14:creationId xmlns:p14="http://schemas.microsoft.com/office/powerpoint/2010/main" val="1674726484"/>
+      </p:ext>
+    </p:extLst>
+  </p:cSld>
+  <p:clrMapOvr>
+    <a:masterClrMapping/>
+  </p:clrMapOvr>
+  <p:timing>
+    <p:tnLst>
+      <p:par>
+        <p:cTn id="1" dur="indefinite" restart="never" nodeType="tmRoot">
+          <p:childTnLst>
+            <p:seq concurrent="1" nextAc="seek">
+              <p:cTn id="2" dur="indefinite" nodeType="mainSeq">
+                <p:childTnLst>
+                  <p:par>
+                    <p:cTn id="3" fill="hold">
+                      <p:stCondLst>
+                        <p:cond delay="indefinite"/>
+                      </p:stCondLst>
+                      <p:childTnLst>
+                        <p:par>
+                          <p:cTn id="4" fill="hold">
+                            <p:stCondLst>
+                              <p:cond delay="0"/>
+                            </p:stCondLst>
+                            <p:childTnLst>
+                              <p:par>
+                                <p:cTn id="5" presetID="10" presetClass="entr" presetSubtype="0" fill="hold" nodeType="clickEffect">
+                                  <p:stCondLst>
+                                    <p:cond delay="0"/>
+                                  </p:stCondLst>
+                                  <p:childTnLst>
+                                    <p:set>
+                                      <p:cBhvr>
+                                        <p:cTn id="6" dur="1" fill="hold">
+                                          <p:stCondLst>
+                                            <p:cond delay="0"/>
+                                          </p:stCondLst>
+                                        </p:cTn>
+                                        <p:tgtEl>
+                                          <p:spTgt spid="3">
+                                            <p:txEl>
+                                              <p:pRg st="0" end="0"/>
+                                            </p:txEl>
+                                          </p:spTgt>
+                                        </p:tgtEl>
+                                        <p:attrNameLst>
+                                          <p:attrName>style.visibility</p:attrName>
+                                        </p:attrNameLst>
+                                      </p:cBhvr>
+                                      <p:to>
+                                        <p:strVal val="visible"/>
+                                      </p:to>
+                                    </p:set>
+                                    <p:animEffect transition="in" filter="fade">
+                                      <p:cBhvr>
+                                        <p:cTn id="7" dur="1000"/>
+                                        <p:tgtEl>
+                                          <p:spTgt spid="3">
+                                            <p:txEl>
+                                              <p:pRg st="0" end="0"/>
+                                            </p:txEl>
+                                          </p:spTgt>
+                                        </p:tgtEl>
+                                      </p:cBhvr>
+                                    </p:animEffect>
+                                  </p:childTnLst>
+                                </p:cTn>
+                              </p:par>
+                              <p:par>
+                                <p:cTn id="8" presetID="10" presetClass="entr" presetSubtype="0" fill="hold" nodeType="withEffect">
+                                  <p:stCondLst>
+                                    <p:cond delay="0"/>
+                                  </p:stCondLst>
+                                  <p:childTnLst>
+                                    <p:set>
+                                      <p:cBhvr>
+                                        <p:cTn id="9" dur="1" fill="hold">
+                                          <p:stCondLst>
+                                            <p:cond delay="0"/>
+                                          </p:stCondLst>
+                                        </p:cTn>
+                                        <p:tgtEl>
+                                          <p:spTgt spid="8"/>
+                                        </p:tgtEl>
+                                        <p:attrNameLst>
+                                          <p:attrName>style.visibility</p:attrName>
+                                        </p:attrNameLst>
+                                      </p:cBhvr>
+                                      <p:to>
+                                        <p:strVal val="visible"/>
+                                      </p:to>
+                                    </p:set>
+                                    <p:animEffect transition="in" filter="fade">
+                                      <p:cBhvr>
+                                        <p:cTn id="10" dur="1000"/>
+                                        <p:tgtEl>
+                                          <p:spTgt spid="8"/>
+                                        </p:tgtEl>
+                                      </p:cBhvr>
+                                    </p:animEffect>
+                                  </p:childTnLst>
+                                </p:cTn>
+                              </p:par>
+                              <p:par>
+                                <p:cTn id="11" presetID="10" presetClass="entr" presetSubtype="0" fill="hold" nodeType="withEffect">
+                                  <p:stCondLst>
+                                    <p:cond delay="0"/>
+                                  </p:stCondLst>
+                                  <p:childTnLst>
+                                    <p:set>
+                                      <p:cBhvr>
+                                        <p:cTn id="12" dur="1" fill="hold">
+                                          <p:stCondLst>
+                                            <p:cond delay="0"/>
+                                          </p:stCondLst>
+                                        </p:cTn>
+                                        <p:tgtEl>
+                                          <p:spTgt spid="16"/>
+                                        </p:tgtEl>
+                                        <p:attrNameLst>
+                                          <p:attrName>style.visibility</p:attrName>
+                                        </p:attrNameLst>
+                                      </p:cBhvr>
+                                      <p:to>
+                                        <p:strVal val="visible"/>
+                                      </p:to>
+                                    </p:set>
+                                    <p:animEffect transition="in" filter="fade">
+                                      <p:cBhvr>
+                                        <p:cTn id="13" dur="1000"/>
+                                        <p:tgtEl>
+                                          <p:spTgt spid="16"/>
+                                        </p:tgtEl>
+                                      </p:cBhvr>
+                                    </p:animEffect>
+                                  </p:childTnLst>
+                                </p:cTn>
+                              </p:par>
+                              <p:par>
+                                <p:cTn id="14" presetID="10" presetClass="entr" presetSubtype="0" fill="hold" nodeType="withEffect">
+                                  <p:stCondLst>
+                                    <p:cond delay="0"/>
+                                  </p:stCondLst>
+                                  <p:childTnLst>
+                                    <p:set>
+                                      <p:cBhvr>
+                                        <p:cTn id="15" dur="1" fill="hold">
+                                          <p:stCondLst>
+                                            <p:cond delay="0"/>
+                                          </p:stCondLst>
+                                        </p:cTn>
+                                        <p:tgtEl>
+                                          <p:spTgt spid="19"/>
+                                        </p:tgtEl>
+                                        <p:attrNameLst>
+                                          <p:attrName>style.visibility</p:attrName>
+                                        </p:attrNameLst>
+                                      </p:cBhvr>
+                                      <p:to>
+                                        <p:strVal val="visible"/>
+                                      </p:to>
+                                    </p:set>
+                                    <p:animEffect transition="in" filter="fade">
+                                      <p:cBhvr>
+                                        <p:cTn id="16" dur="1000"/>
+                                        <p:tgtEl>
+                                          <p:spTgt spid="19"/>
+                                        </p:tgtEl>
+                                      </p:cBhvr>
+                                    </p:animEffect>
+                                  </p:childTnLst>
+                                </p:cTn>
+                              </p:par>
+                              <p:par>
+                                <p:cTn id="17" presetID="10" presetClass="entr" presetSubtype="0" fill="hold" nodeType="withEffect">
+                                  <p:stCondLst>
+                                    <p:cond delay="0"/>
+                                  </p:stCondLst>
+                                  <p:childTnLst>
+                                    <p:set>
+                                      <p:cBhvr>
+                                        <p:cTn id="18" dur="1" fill="hold">
+                                          <p:stCondLst>
+                                            <p:cond delay="0"/>
+                                          </p:stCondLst>
+                                        </p:cTn>
+                                        <p:tgtEl>
+                                          <p:spTgt spid="22"/>
+                                        </p:tgtEl>
+                                        <p:attrNameLst>
+                                          <p:attrName>style.visibility</p:attrName>
+                                        </p:attrNameLst>
+                                      </p:cBhvr>
+                                      <p:to>
+                                        <p:strVal val="visible"/>
+                                      </p:to>
+                                    </p:set>
+                                    <p:animEffect transition="in" filter="fade">
+                                      <p:cBhvr>
+                                        <p:cTn id="19" dur="1000"/>
+                                        <p:tgtEl>
+                                          <p:spTgt spid="22"/>
+                                        </p:tgtEl>
+                                      </p:cBhvr>
+                                    </p:animEffect>
+                                  </p:childTnLst>
+                                </p:cTn>
+                              </p:par>
+                            </p:childTnLst>
+                          </p:cTn>
+                        </p:par>
+                      </p:childTnLst>
+                    </p:cTn>
+                  </p:par>
+                  <p:par>
+                    <p:cTn id="20" fill="hold">
+                      <p:stCondLst>
+                        <p:cond delay="indefinite"/>
+                      </p:stCondLst>
+                      <p:childTnLst>
+                        <p:par>
+                          <p:cTn id="21" fill="hold">
+                            <p:stCondLst>
+                              <p:cond delay="0"/>
+                            </p:stCondLst>
+                            <p:childTnLst>
+                              <p:par>
+                                <p:cTn id="22" presetID="10" presetClass="entr" presetSubtype="0" fill="hold" nodeType="clickEffect">
+                                  <p:stCondLst>
+                                    <p:cond delay="0"/>
+                                  </p:stCondLst>
+                                  <p:childTnLst>
+                                    <p:set>
+                                      <p:cBhvr>
+                                        <p:cTn id="23" dur="1" fill="hold">
+                                          <p:stCondLst>
+                                            <p:cond delay="0"/>
+                                          </p:stCondLst>
+                                        </p:cTn>
+                                        <p:tgtEl>
+                                          <p:spTgt spid="3">
+                                            <p:txEl>
+                                              <p:pRg st="1" end="1"/>
+                                            </p:txEl>
+                                          </p:spTgt>
+                                        </p:tgtEl>
+                                        <p:attrNameLst>
+                                          <p:attrName>style.visibility</p:attrName>
+                                        </p:attrNameLst>
+                                      </p:cBhvr>
+                                      <p:to>
+                                        <p:strVal val="visible"/>
+                                      </p:to>
+                                    </p:set>
+                                    <p:animEffect transition="in" filter="fade">
+                                      <p:cBhvr>
+                                        <p:cTn id="24" dur="1000"/>
+                                        <p:tgtEl>
+                                          <p:spTgt spid="3">
+                                            <p:txEl>
+                                              <p:pRg st="1" end="1"/>
+                                            </p:txEl>
+                                          </p:spTgt>
+                                        </p:tgtEl>
+                                      </p:cBhvr>
+                                    </p:animEffect>
+                                  </p:childTnLst>
+                                </p:cTn>
+                              </p:par>
+                            </p:childTnLst>
+                          </p:cTn>
+                        </p:par>
+                      </p:childTnLst>
+                    </p:cTn>
+                  </p:par>
+                  <p:par>
+                    <p:cTn id="25" fill="hold">
+                      <p:stCondLst>
+                        <p:cond delay="indefinite"/>
+                      </p:stCondLst>
+                      <p:childTnLst>
+                        <p:par>
+                          <p:cTn id="26" fill="hold">
+                            <p:stCondLst>
+                              <p:cond delay="0"/>
+                            </p:stCondLst>
+                            <p:childTnLst>
+                              <p:par>
+                                <p:cTn id="27" presetID="10" presetClass="entr" presetSubtype="0" fill="hold" nodeType="clickEffect">
+                                  <p:stCondLst>
+                                    <p:cond delay="0"/>
+                                  </p:stCondLst>
+                                  <p:childTnLst>
+                                    <p:set>
+                                      <p:cBhvr>
+                                        <p:cTn id="28" dur="1" fill="hold">
+                                          <p:stCondLst>
+                                            <p:cond delay="0"/>
+                                          </p:stCondLst>
+                                        </p:cTn>
+                                        <p:tgtEl>
+                                          <p:spTgt spid="3">
+                                            <p:txEl>
+                                              <p:pRg st="10" end="10"/>
+                                            </p:txEl>
+                                          </p:spTgt>
+                                        </p:tgtEl>
+                                        <p:attrNameLst>
+                                          <p:attrName>style.visibility</p:attrName>
+                                        </p:attrNameLst>
+                                      </p:cBhvr>
+                                      <p:to>
+                                        <p:strVal val="visible"/>
+                                      </p:to>
+                                    </p:set>
+                                    <p:animEffect transition="in" filter="fade">
+                                      <p:cBhvr>
+                                        <p:cTn id="29" dur="1000"/>
+                                        <p:tgtEl>
+                                          <p:spTgt spid="3">
+                                            <p:txEl>
+                                              <p:pRg st="10" end="10"/>
+                                            </p:txEl>
+                                          </p:spTgt>
+                                        </p:tgtEl>
+                                      </p:cBhvr>
+                                    </p:animEffect>
+                                  </p:childTnLst>
+                                </p:cTn>
+                              </p:par>
+                            </p:childTnLst>
+                          </p:cTn>
+                        </p:par>
+                      </p:childTnLst>
+                    </p:cTn>
+                  </p:par>
+                </p:childTnLst>
+              </p:cTn>
+              <p:prevCondLst>
+                <p:cond evt="onPrev" delay="0">
+                  <p:tgtEl>
+                    <p:sldTgt/>
+                  </p:tgtEl>
+                </p:cond>
+              </p:prevCondLst>
+              <p:nextCondLst>
+                <p:cond evt="onNext" delay="0">
+                  <p:tgtEl>
+                    <p:sldTgt/>
+                  </p:tgtEl>
+                </p:cond>
+              </p:nextCondLst>
+            </p:seq>
+          </p:childTnLst>
+        </p:cTn>
+      </p:par>
+    </p:tnLst>
+  </p:timing>
+</p:sld>
+</file>
+
+<file path=ppt/slides/slide3.xml><?xml version="1.0" encoding="utf-8"?>
+<p:sld xmlns:a="http://schemas.openxmlformats.org/drawingml/2006/main" xmlns:r="http://schemas.openxmlformats.org/officeDocument/2006/relationships" xmlns:p="http://schemas.openxmlformats.org/presentationml/2006/main">
+  <p:cSld>
+    <p:spTree>
+      <p:nvGrpSpPr>
+        <p:cNvPr id="1" name=""/>
+        <p:cNvGrpSpPr/>
+        <p:nvPr/>
+      </p:nvGrpSpPr>
+      <p:grpSpPr>
+        <a:xfrm>
+          <a:off x="0" y="0"/>
+          <a:ext cx="0" cy="0"/>
+          <a:chOff x="0" y="0"/>
+          <a:chExt cx="0" cy="0"/>
+        </a:xfrm>
+      </p:grpSpPr>
+      <p:sp>
+        <p:nvSpPr>
+          <p:cNvPr id="2" name="Title 1"/>
+          <p:cNvSpPr>
+            <a:spLocks noGrp="1"/>
+          </p:cNvSpPr>
+          <p:nvPr>
+            <p:ph type="title"/>
+          </p:nvPr>
+        </p:nvSpPr>
+        <p:spPr/>
+        <p:txBody>
+          <a:bodyPr/>
+          <a:lstStyle/>
+          <a:p>
+            <a:r>
+              <a:rPr lang="en-CA" dirty="0"/>
               <a:t>What is artificial life (AL)?</a:t>
             </a:r>
-            <a:endParaRPr lang="en-CA" dirty="0"/>
+          </a:p>
+        </p:txBody>
+      </p:sp>
+      <p:sp>
+        <p:nvSpPr>
+          <p:cNvPr id="3" name="Content Placeholder 2"/>
+          <p:cNvSpPr>
+            <a:spLocks noGrp="1"/>
+          </p:cNvSpPr>
+          <p:nvPr>
+            <p:ph idx="1"/>
+          </p:nvPr>
+        </p:nvSpPr>
+        <p:spPr>
+          <a:xfrm>
+            <a:off x="838200" y="1825625"/>
+            <a:ext cx="10515600" cy="743404"/>
+          </a:xfrm>
+        </p:spPr>
+        <p:txBody>
+          <a:bodyPr>
+            <a:normAutofit/>
+          </a:bodyPr>
+          <a:lstStyle/>
+          <a:p>
+            <a:pPr marL="0" indent="0">
+              <a:buNone/>
+            </a:pPr>
+            <a:r>
+              <a:rPr lang="en-CA" sz="3200" dirty="0" smtClean="0"/>
+              <a:t>AL differs from the listed fields mainly by intention.</a:t>
+            </a:r>
+            <a:endParaRPr lang="en-CA" sz="3200" dirty="0"/>
+          </a:p>
+        </p:txBody>
+      </p:sp>
+      <p:sp>
+        <p:nvSpPr>
+          <p:cNvPr id="4" name="TextBox 3"/>
+          <p:cNvSpPr txBox="1"/>
+          <p:nvPr/>
+        </p:nvSpPr>
+        <p:spPr>
+          <a:xfrm>
+            <a:off x="949234" y="2569029"/>
+            <a:ext cx="4267200" cy="2000548"/>
+          </a:xfrm>
+          <a:prstGeom prst="rect">
+            <a:avLst/>
+          </a:prstGeom>
+          <a:noFill/>
+        </p:spPr>
+        <p:txBody>
+          <a:bodyPr wrap="square" rtlCol="0">
+            <a:spAutoFit/>
+          </a:bodyPr>
+          <a:lstStyle/>
+          <a:p>
+            <a:r>
+              <a:rPr lang="en-CA" sz="4000" dirty="0" smtClean="0">
+                <a:solidFill>
+                  <a:sysClr val="windowText" lastClr="000000"/>
+                </a:solidFill>
+              </a:rPr>
+              <a:t>Other fields:</a:t>
+            </a:r>
+          </a:p>
+          <a:p>
+            <a:r>
+              <a:rPr lang="en-CA" sz="2800" dirty="0" smtClean="0">
+                <a:solidFill>
+                  <a:sysClr val="windowText" lastClr="000000"/>
+                </a:solidFill>
+              </a:rPr>
+              <a:t>Seek mainly to solve other problems using algorithms inspired by nature.</a:t>
+            </a:r>
+            <a:endParaRPr lang="en-CA" sz="2400" dirty="0">
+              <a:solidFill>
+                <a:sysClr val="windowText" lastClr="000000"/>
+              </a:solidFill>
+            </a:endParaRPr>
+          </a:p>
+        </p:txBody>
+      </p:sp>
+      <p:sp>
+        <p:nvSpPr>
+          <p:cNvPr id="5" name="TextBox 4"/>
+          <p:cNvSpPr txBox="1"/>
+          <p:nvPr/>
+        </p:nvSpPr>
+        <p:spPr>
+          <a:xfrm>
+            <a:off x="6683829" y="2569029"/>
+            <a:ext cx="4267200" cy="2554545"/>
+          </a:xfrm>
+          <a:prstGeom prst="rect">
+            <a:avLst/>
+          </a:prstGeom>
+          <a:noFill/>
+        </p:spPr>
+        <p:txBody>
+          <a:bodyPr wrap="square" rtlCol="0">
+            <a:spAutoFit/>
+          </a:bodyPr>
+          <a:lstStyle/>
+          <a:p>
+            <a:r>
+              <a:rPr lang="en-CA" sz="4000" dirty="0" smtClean="0">
+                <a:solidFill>
+                  <a:sysClr val="windowText" lastClr="000000"/>
+                </a:solidFill>
+              </a:rPr>
+              <a:t>Artificial life:</a:t>
+            </a:r>
+            <a:endParaRPr lang="en-CA" sz="3600" dirty="0" smtClean="0">
+              <a:solidFill>
+                <a:sysClr val="windowText" lastClr="000000"/>
+              </a:solidFill>
+            </a:endParaRPr>
+          </a:p>
+          <a:p>
+            <a:r>
+              <a:rPr lang="en-CA" sz="2800" dirty="0" smtClean="0">
+                <a:solidFill>
+                  <a:sysClr val="windowText" lastClr="000000"/>
+                </a:solidFill>
+              </a:rPr>
+              <a:t>Develops and studies models of life for the sake of understanding life and those models.</a:t>
+            </a:r>
+            <a:r>
+              <a:rPr lang="en-CA" sz="3200" dirty="0" smtClean="0">
+                <a:solidFill>
+                  <a:sysClr val="windowText" lastClr="000000"/>
+                </a:solidFill>
+              </a:rPr>
+              <a:t>	</a:t>
+            </a:r>
+            <a:endParaRPr lang="en-CA" sz="3200" dirty="0">
+              <a:solidFill>
+                <a:sysClr val="windowText" lastClr="000000"/>
+              </a:solidFill>
+            </a:endParaRPr>
+          </a:p>
+        </p:txBody>
+      </p:sp>
+    </p:spTree>
+    <p:extLst>
+      <p:ext uri="{BB962C8B-B14F-4D97-AF65-F5344CB8AC3E}">
+        <p14:creationId xmlns:p14="http://schemas.microsoft.com/office/powerpoint/2010/main" val="496347590"/>
+      </p:ext>
+    </p:extLst>
+  </p:cSld>
+  <p:clrMapOvr>
+    <a:masterClrMapping/>
+  </p:clrMapOvr>
+  <p:timing>
+    <p:tnLst>
+      <p:par>
+        <p:cTn id="1" dur="indefinite" restart="never" nodeType="tmRoot">
+          <p:childTnLst>
+            <p:seq concurrent="1" nextAc="seek">
+              <p:cTn id="2" dur="indefinite" nodeType="mainSeq">
+                <p:childTnLst>
+                  <p:par>
+                    <p:cTn id="3" fill="hold">
+                      <p:stCondLst>
+                        <p:cond delay="indefinite"/>
+                      </p:stCondLst>
+                      <p:childTnLst>
+                        <p:par>
+                          <p:cTn id="4" fill="hold">
+                            <p:stCondLst>
+                              <p:cond delay="0"/>
+                            </p:stCondLst>
+                            <p:childTnLst>
+                              <p:par>
+                                <p:cTn id="5" presetID="10" presetClass="entr" presetSubtype="0" fill="hold" nodeType="clickEffect">
+                                  <p:stCondLst>
+                                    <p:cond delay="0"/>
+                                  </p:stCondLst>
+                                  <p:childTnLst>
+                                    <p:set>
+                                      <p:cBhvr>
+                                        <p:cTn id="6" dur="1" fill="hold">
+                                          <p:stCondLst>
+                                            <p:cond delay="0"/>
+                                          </p:stCondLst>
+                                        </p:cTn>
+                                        <p:tgtEl>
+                                          <p:spTgt spid="3">
+                                            <p:txEl>
+                                              <p:pRg st="0" end="0"/>
+                                            </p:txEl>
+                                          </p:spTgt>
+                                        </p:tgtEl>
+                                        <p:attrNameLst>
+                                          <p:attrName>style.visibility</p:attrName>
+                                        </p:attrNameLst>
+                                      </p:cBhvr>
+                                      <p:to>
+                                        <p:strVal val="visible"/>
+                                      </p:to>
+                                    </p:set>
+                                    <p:animEffect transition="in" filter="fade">
+                                      <p:cBhvr>
+                                        <p:cTn id="7" dur="1000"/>
+                                        <p:tgtEl>
+                                          <p:spTgt spid="3">
+                                            <p:txEl>
+                                              <p:pRg st="0" end="0"/>
+                                            </p:txEl>
+                                          </p:spTgt>
+                                        </p:tgtEl>
+                                      </p:cBhvr>
+                                    </p:animEffect>
+                                  </p:childTnLst>
+                                </p:cTn>
+                              </p:par>
+                            </p:childTnLst>
+                          </p:cTn>
+                        </p:par>
+                      </p:childTnLst>
+                    </p:cTn>
+                  </p:par>
+                  <p:par>
+                    <p:cTn id="8" fill="hold">
+                      <p:stCondLst>
+                        <p:cond delay="indefinite"/>
+                      </p:stCondLst>
+                      <p:childTnLst>
+                        <p:par>
+                          <p:cTn id="9" fill="hold">
+                            <p:stCondLst>
+                              <p:cond delay="0"/>
+                            </p:stCondLst>
+                            <p:childTnLst>
+                              <p:par>
+                                <p:cTn id="10" presetID="10" presetClass="entr" presetSubtype="0" fill="hold" grpId="0" nodeType="clickEffect">
+                                  <p:stCondLst>
+                                    <p:cond delay="0"/>
+                                  </p:stCondLst>
+                                  <p:childTnLst>
+                                    <p:set>
+                                      <p:cBhvr>
+                                        <p:cTn id="11" dur="1" fill="hold">
+                                          <p:stCondLst>
+                                            <p:cond delay="0"/>
+                                          </p:stCondLst>
+                                        </p:cTn>
+                                        <p:tgtEl>
+                                          <p:spTgt spid="4"/>
+                                        </p:tgtEl>
+                                        <p:attrNameLst>
+                                          <p:attrName>style.visibility</p:attrName>
+                                        </p:attrNameLst>
+                                      </p:cBhvr>
+                                      <p:to>
+                                        <p:strVal val="visible"/>
+                                      </p:to>
+                                    </p:set>
+                                    <p:animEffect transition="in" filter="fade">
+                                      <p:cBhvr>
+                                        <p:cTn id="12" dur="1000"/>
+                                        <p:tgtEl>
+                                          <p:spTgt spid="4"/>
+                                        </p:tgtEl>
+                                      </p:cBhvr>
+                                    </p:animEffect>
+                                  </p:childTnLst>
+                                </p:cTn>
+                              </p:par>
+                            </p:childTnLst>
+                          </p:cTn>
+                        </p:par>
+                      </p:childTnLst>
+                    </p:cTn>
+                  </p:par>
+                  <p:par>
+                    <p:cTn id="13" fill="hold">
+                      <p:stCondLst>
+                        <p:cond delay="indefinite"/>
+                      </p:stCondLst>
+                      <p:childTnLst>
+                        <p:par>
+                          <p:cTn id="14" fill="hold">
+                            <p:stCondLst>
+                              <p:cond delay="0"/>
+                            </p:stCondLst>
+                            <p:childTnLst>
+                              <p:par>
+                                <p:cTn id="15" presetID="10" presetClass="entr" presetSubtype="0" fill="hold" grpId="0" nodeType="clickEffect">
+                                  <p:stCondLst>
+                                    <p:cond delay="0"/>
+                                  </p:stCondLst>
+                                  <p:childTnLst>
+                                    <p:set>
+                                      <p:cBhvr>
+                                        <p:cTn id="16" dur="1" fill="hold">
+                                          <p:stCondLst>
+                                            <p:cond delay="0"/>
+                                          </p:stCondLst>
+                                        </p:cTn>
+                                        <p:tgtEl>
+                                          <p:spTgt spid="5"/>
+                                        </p:tgtEl>
+                                        <p:attrNameLst>
+                                          <p:attrName>style.visibility</p:attrName>
+                                        </p:attrNameLst>
+                                      </p:cBhvr>
+                                      <p:to>
+                                        <p:strVal val="visible"/>
+                                      </p:to>
+                                    </p:set>
+                                    <p:animEffect transition="in" filter="fade">
+                                      <p:cBhvr>
+                                        <p:cTn id="17" dur="1000"/>
+                                        <p:tgtEl>
+                                          <p:spTgt spid="5"/>
+                                        </p:tgtEl>
+                                      </p:cBhvr>
+                                    </p:animEffect>
+                                  </p:childTnLst>
+                                </p:cTn>
+                              </p:par>
+                            </p:childTnLst>
+                          </p:cTn>
+                        </p:par>
+                      </p:childTnLst>
+                    </p:cTn>
+                  </p:par>
+                </p:childTnLst>
+              </p:cTn>
+              <p:prevCondLst>
+                <p:cond evt="onPrev" delay="0">
+                  <p:tgtEl>
+                    <p:sldTgt/>
+                  </p:tgtEl>
+                </p:cond>
+              </p:prevCondLst>
+              <p:nextCondLst>
+                <p:cond evt="onNext" delay="0">
+                  <p:tgtEl>
+                    <p:sldTgt/>
+                  </p:tgtEl>
+                </p:cond>
+              </p:nextCondLst>
+            </p:seq>
+          </p:childTnLst>
+        </p:cTn>
+      </p:par>
+    </p:tnLst>
+    <p:bldLst>
+      <p:bldP spid="4" grpId="0"/>
+      <p:bldP spid="5" grpId="0"/>
+    </p:bldLst>
+  </p:timing>
+</p:sld>
+</file>
+
+<file path=ppt/slides/slide4.xml><?xml version="1.0" encoding="utf-8"?>
+<p:sld xmlns:a="http://schemas.openxmlformats.org/drawingml/2006/main" xmlns:r="http://schemas.openxmlformats.org/officeDocument/2006/relationships" xmlns:p="http://schemas.openxmlformats.org/presentationml/2006/main">
+  <p:cSld>
+    <p:spTree>
+      <p:nvGrpSpPr>
+        <p:cNvPr id="1" name=""/>
+        <p:cNvGrpSpPr/>
+        <p:nvPr/>
+      </p:nvGrpSpPr>
+      <p:grpSpPr>
+        <a:xfrm>
+          <a:off x="0" y="0"/>
+          <a:ext cx="0" cy="0"/>
+          <a:chOff x="0" y="0"/>
+          <a:chExt cx="0" cy="0"/>
+        </a:xfrm>
+      </p:grpSpPr>
+      <p:sp>
+        <p:nvSpPr>
+          <p:cNvPr id="2" name="Title 1"/>
+          <p:cNvSpPr>
+            <a:spLocks noGrp="1"/>
+          </p:cNvSpPr>
+          <p:nvPr>
+            <p:ph type="title"/>
+          </p:nvPr>
+        </p:nvSpPr>
+        <p:spPr/>
+        <p:txBody>
+          <a:bodyPr/>
+          <a:lstStyle/>
+          <a:p>
+            <a:r>
+              <a:rPr lang="en-CA" dirty="0"/>
+              <a:t>What is artificial life (AL)?</a:t>
+            </a:r>
           </a:p>
         </p:txBody>
       </p:sp>
@@ -3111,7 +4815,7 @@
               <a:buNone/>
             </a:pPr>
             <a:r>
-              <a:rPr lang="en-CA" dirty="0" smtClean="0"/>
+              <a:rPr lang="en-CA" dirty="0"/>
               <a:t>Natural life sciences employ reductionist method to explain life</a:t>
             </a:r>
           </a:p>
@@ -3183,7 +4887,7 @@
             <a:lstStyle/>
             <a:p>
               <a:r>
-                <a:rPr lang="en-CA" sz="1000" dirty="0" smtClean="0">
+                <a:rPr lang="en-CA" sz="1000" dirty="0">
                   <a:solidFill>
                     <a:schemeClr val="tx1">
                       <a:lumMod val="50000"/>
@@ -3193,14 +4897,6 @@
                 </a:rPr>
                 <a:t>By Unknown - [1], Public Domain, https://commons.wikimedia.org/w/index.php?curid=1493624</a:t>
               </a:r>
-              <a:endParaRPr lang="en-CA" sz="1000" dirty="0">
-                <a:solidFill>
-                  <a:schemeClr val="tx1">
-                    <a:lumMod val="50000"/>
-                    <a:lumOff val="50000"/>
-                  </a:schemeClr>
-                </a:solidFill>
-              </a:endParaRPr>
             </a:p>
           </p:txBody>
         </p:sp>
@@ -3273,7 +4969,7 @@
             <a:p>
               <a:pPr algn="ctr"/>
               <a:r>
-                <a:rPr lang="en-CA" sz="1000" dirty="0" smtClean="0">
+                <a:rPr lang="en-CA" sz="1000" dirty="0">
                   <a:solidFill>
                     <a:schemeClr val="tx1">
                       <a:lumMod val="50000"/>
@@ -3283,14 +4979,6 @@
                 </a:rPr>
                 <a:t>By Universal Studios - Dr. Macro, Public Domain, https://commons.wikimedia.org/w/index.php?curid=3558176</a:t>
               </a:r>
-              <a:endParaRPr lang="en-CA" sz="1000" dirty="0">
-                <a:solidFill>
-                  <a:schemeClr val="tx1">
-                    <a:lumMod val="50000"/>
-                    <a:lumOff val="50000"/>
-                  </a:schemeClr>
-                </a:solidFill>
-              </a:endParaRPr>
             </a:p>
           </p:txBody>
         </p:sp>
@@ -3485,10 +5173,9 @@
               <a:buNone/>
             </a:pPr>
             <a:r>
-              <a:rPr lang="en-CA" dirty="0" smtClean="0"/>
+              <a:rPr lang="en-CA" dirty="0"/>
               <a:t>Artificial life uses a constructive approach to explain and explore life</a:t>
             </a:r>
-            <a:endParaRPr lang="en-CA" dirty="0"/>
           </a:p>
         </p:txBody>
       </p:sp>
@@ -3739,184 +5426,6 @@
 </p:sld>
 </file>
 
-<file path=ppt/slides/slide3.xml><?xml version="1.0" encoding="utf-8"?>
-<p:sld xmlns:a="http://schemas.openxmlformats.org/drawingml/2006/main" xmlns:r="http://schemas.openxmlformats.org/officeDocument/2006/relationships" xmlns:p="http://schemas.openxmlformats.org/presentationml/2006/main">
-  <p:cSld>
-    <p:spTree>
-      <p:nvGrpSpPr>
-        <p:cNvPr id="1" name=""/>
-        <p:cNvGrpSpPr/>
-        <p:nvPr/>
-      </p:nvGrpSpPr>
-      <p:grpSpPr>
-        <a:xfrm>
-          <a:off x="0" y="0"/>
-          <a:ext cx="0" cy="0"/>
-          <a:chOff x="0" y="0"/>
-          <a:chExt cx="0" cy="0"/>
-        </a:xfrm>
-      </p:grpSpPr>
-      <p:sp>
-        <p:nvSpPr>
-          <p:cNvPr id="2" name="Title 1"/>
-          <p:cNvSpPr>
-            <a:spLocks noGrp="1"/>
-          </p:cNvSpPr>
-          <p:nvPr>
-            <p:ph type="title"/>
-          </p:nvPr>
-        </p:nvSpPr>
-        <p:spPr/>
-        <p:txBody>
-          <a:bodyPr/>
-          <a:lstStyle/>
-          <a:p>
-            <a:r>
-              <a:rPr lang="en-CA" dirty="0" smtClean="0"/>
-              <a:t>A few ideas behind AL</a:t>
-            </a:r>
-            <a:endParaRPr lang="en-CA" dirty="0"/>
-          </a:p>
-        </p:txBody>
-      </p:sp>
-      <p:sp>
-        <p:nvSpPr>
-          <p:cNvPr id="3" name="Content Placeholder 2"/>
-          <p:cNvSpPr>
-            <a:spLocks noGrp="1"/>
-          </p:cNvSpPr>
-          <p:nvPr>
-            <p:ph idx="1"/>
-          </p:nvPr>
-        </p:nvSpPr>
-        <p:spPr/>
-        <p:txBody>
-          <a:bodyPr/>
-          <a:lstStyle/>
-          <a:p>
-            <a:r>
-              <a:rPr lang="en-CA" dirty="0" smtClean="0"/>
-              <a:t>Life is a process</a:t>
-            </a:r>
-          </a:p>
-          <a:p>
-            <a:r>
-              <a:rPr lang="en-CA" dirty="0" smtClean="0"/>
-              <a:t>Life can be explored constructively</a:t>
-            </a:r>
-          </a:p>
-          <a:p>
-            <a:r>
-              <a:rPr lang="en-CA" dirty="0" smtClean="0"/>
-              <a:t>‘Life’ is independent of substrate</a:t>
-            </a:r>
-            <a:endParaRPr lang="en-CA" dirty="0"/>
-          </a:p>
-        </p:txBody>
-      </p:sp>
-    </p:spTree>
-    <p:extLst>
-      <p:ext uri="{BB962C8B-B14F-4D97-AF65-F5344CB8AC3E}">
-        <p14:creationId xmlns:p14="http://schemas.microsoft.com/office/powerpoint/2010/main" val="198058602"/>
-      </p:ext>
-    </p:extLst>
-  </p:cSld>
-  <p:clrMapOvr>
-    <a:masterClrMapping/>
-  </p:clrMapOvr>
-  <p:timing>
-    <p:tnLst>
-      <p:par>
-        <p:cTn id="1" dur="indefinite" restart="never" nodeType="tmRoot"/>
-      </p:par>
-    </p:tnLst>
-  </p:timing>
-</p:sld>
-</file>
-
-<file path=ppt/slides/slide4.xml><?xml version="1.0" encoding="utf-8"?>
-<p:sld xmlns:a="http://schemas.openxmlformats.org/drawingml/2006/main" xmlns:r="http://schemas.openxmlformats.org/officeDocument/2006/relationships" xmlns:p="http://schemas.openxmlformats.org/presentationml/2006/main">
-  <p:cSld>
-    <p:spTree>
-      <p:nvGrpSpPr>
-        <p:cNvPr id="1" name=""/>
-        <p:cNvGrpSpPr/>
-        <p:nvPr/>
-      </p:nvGrpSpPr>
-      <p:grpSpPr>
-        <a:xfrm>
-          <a:off x="0" y="0"/>
-          <a:ext cx="0" cy="0"/>
-          <a:chOff x="0" y="0"/>
-          <a:chExt cx="0" cy="0"/>
-        </a:xfrm>
-      </p:grpSpPr>
-      <p:sp>
-        <p:nvSpPr>
-          <p:cNvPr id="2" name="Title 1"/>
-          <p:cNvSpPr>
-            <a:spLocks noGrp="1"/>
-          </p:cNvSpPr>
-          <p:nvPr>
-            <p:ph type="title"/>
-          </p:nvPr>
-        </p:nvSpPr>
-        <p:spPr/>
-        <p:txBody>
-          <a:bodyPr/>
-          <a:lstStyle/>
-          <a:p>
-            <a:r>
-              <a:rPr lang="en-CA" dirty="0" smtClean="0"/>
-              <a:t>Life-as-it-could-be</a:t>
-            </a:r>
-            <a:endParaRPr lang="en-CA" dirty="0"/>
-          </a:p>
-        </p:txBody>
-      </p:sp>
-      <p:sp>
-        <p:nvSpPr>
-          <p:cNvPr id="3" name="Content Placeholder 2"/>
-          <p:cNvSpPr>
-            <a:spLocks noGrp="1"/>
-          </p:cNvSpPr>
-          <p:nvPr>
-            <p:ph idx="1"/>
-          </p:nvPr>
-        </p:nvSpPr>
-        <p:spPr/>
-        <p:txBody>
-          <a:bodyPr/>
-          <a:lstStyle/>
-          <a:p>
-            <a:r>
-              <a:rPr lang="en-CA" dirty="0" smtClean="0"/>
-              <a:t>The constructive nature of AL allows us investigate novel forms of life</a:t>
-            </a:r>
-            <a:endParaRPr lang="en-CA" dirty="0"/>
-          </a:p>
-        </p:txBody>
-      </p:sp>
-    </p:spTree>
-    <p:extLst>
-      <p:ext uri="{BB962C8B-B14F-4D97-AF65-F5344CB8AC3E}">
-        <p14:creationId xmlns:p14="http://schemas.microsoft.com/office/powerpoint/2010/main" val="2241344431"/>
-      </p:ext>
-    </p:extLst>
-  </p:cSld>
-  <p:clrMapOvr>
-    <a:masterClrMapping/>
-  </p:clrMapOvr>
-  <p:timing>
-    <p:tnLst>
-      <p:par>
-        <p:cTn id="1" dur="indefinite" restart="never" nodeType="tmRoot"/>
-      </p:par>
-    </p:tnLst>
-  </p:timing>
-</p:sld>
-</file>
-
 <file path=ppt/slides/slide5.xml><?xml version="1.0" encoding="utf-8"?>
 <p:sld xmlns:a="http://schemas.openxmlformats.org/drawingml/2006/main" xmlns:r="http://schemas.openxmlformats.org/officeDocument/2006/relationships" xmlns:p="http://schemas.openxmlformats.org/presentationml/2006/main">
   <p:cSld>
@@ -3951,7 +5460,7 @@
           <a:p>
             <a:r>
               <a:rPr lang="en-CA" dirty="0" smtClean="0"/>
-              <a:t>The meaning of life</a:t>
+              <a:t>Life-as-it-is</a:t>
             </a:r>
             <a:endParaRPr lang="en-CA" dirty="0"/>
           </a:p>
@@ -3967,33 +5476,11 @@
             <p:ph idx="1"/>
           </p:nvPr>
         </p:nvSpPr>
-        <p:spPr>
-          <a:xfrm>
-            <a:off x="838200" y="1825625"/>
-            <a:ext cx="5599545" cy="4351338"/>
-          </a:xfrm>
-        </p:spPr>
-        <p:txBody>
-          <a:bodyPr/>
-          <a:lstStyle/>
-          <a:p>
-            <a:r>
-              <a:rPr lang="en-CA" dirty="0" smtClean="0"/>
-              <a:t>AL asks us to consider an age old question: </a:t>
-            </a:r>
-            <a:br>
-              <a:rPr lang="en-CA" dirty="0" smtClean="0"/>
-            </a:br>
-            <a:r>
-              <a:rPr lang="en-CA" dirty="0" smtClean="0"/>
-              <a:t>	What does it mean to be alive?</a:t>
-            </a:r>
-          </a:p>
-          <a:p>
-            <a:r>
-              <a:rPr lang="en-CA" dirty="0" smtClean="0"/>
-              <a:t>To see past the details of life’s implementations is to know this</a:t>
-            </a:r>
+        <p:spPr/>
+        <p:txBody>
+          <a:bodyPr/>
+          <a:lstStyle/>
+          <a:p>
             <a:endParaRPr lang="en-CA" dirty="0"/>
           </a:p>
         </p:txBody>
@@ -4001,7 +5488,7 @@
     </p:spTree>
     <p:extLst>
       <p:ext uri="{BB962C8B-B14F-4D97-AF65-F5344CB8AC3E}">
-        <p14:creationId xmlns:p14="http://schemas.microsoft.com/office/powerpoint/2010/main" val="1754329738"/>
+        <p14:creationId xmlns:p14="http://schemas.microsoft.com/office/powerpoint/2010/main" val="2279785290"/>
       </p:ext>
     </p:extLst>
   </p:cSld>
@@ -4051,10 +5538,811 @@
           <a:lstStyle/>
           <a:p>
             <a:r>
+              <a:rPr lang="en-CA" dirty="0"/>
+              <a:t>Life-as-it-could-be</a:t>
+            </a:r>
+          </a:p>
+        </p:txBody>
+      </p:sp>
+      <p:sp>
+        <p:nvSpPr>
+          <p:cNvPr id="3" name="Content Placeholder 2"/>
+          <p:cNvSpPr>
+            <a:spLocks noGrp="1"/>
+          </p:cNvSpPr>
+          <p:nvPr>
+            <p:ph idx="1"/>
+          </p:nvPr>
+        </p:nvSpPr>
+        <p:spPr/>
+        <p:txBody>
+          <a:bodyPr/>
+          <a:lstStyle/>
+          <a:p>
+            <a:r>
+              <a:rPr lang="en-CA" dirty="0"/>
+              <a:t>The constructive nature of AL allows us to investigate novel forms of </a:t>
+            </a:r>
+            <a:r>
               <a:rPr lang="en-CA" dirty="0" smtClean="0"/>
+              <a:t>life.</a:t>
+            </a:r>
+            <a:endParaRPr lang="en-CA" dirty="0"/>
+          </a:p>
+        </p:txBody>
+      </p:sp>
+    </p:spTree>
+    <p:extLst>
+      <p:ext uri="{BB962C8B-B14F-4D97-AF65-F5344CB8AC3E}">
+        <p14:creationId xmlns:p14="http://schemas.microsoft.com/office/powerpoint/2010/main" val="2241344431"/>
+      </p:ext>
+    </p:extLst>
+  </p:cSld>
+  <p:clrMapOvr>
+    <a:masterClrMapping/>
+  </p:clrMapOvr>
+  <p:timing>
+    <p:tnLst>
+      <p:par>
+        <p:cTn id="1" dur="indefinite" restart="never" nodeType="tmRoot"/>
+      </p:par>
+    </p:tnLst>
+  </p:timing>
+</p:sld>
+</file>
+
+<file path=ppt/slides/slide7.xml><?xml version="1.0" encoding="utf-8"?>
+<p:sld xmlns:a="http://schemas.openxmlformats.org/drawingml/2006/main" xmlns:r="http://schemas.openxmlformats.org/officeDocument/2006/relationships" xmlns:p="http://schemas.openxmlformats.org/presentationml/2006/main">
+  <p:cSld>
+    <p:spTree>
+      <p:nvGrpSpPr>
+        <p:cNvPr id="1" name=""/>
+        <p:cNvGrpSpPr/>
+        <p:nvPr/>
+      </p:nvGrpSpPr>
+      <p:grpSpPr>
+        <a:xfrm>
+          <a:off x="0" y="0"/>
+          <a:ext cx="0" cy="0"/>
+          <a:chOff x="0" y="0"/>
+          <a:chExt cx="0" cy="0"/>
+        </a:xfrm>
+      </p:grpSpPr>
+      <p:sp>
+        <p:nvSpPr>
+          <p:cNvPr id="2" name="Title 1"/>
+          <p:cNvSpPr>
+            <a:spLocks noGrp="1"/>
+          </p:cNvSpPr>
+          <p:nvPr>
+            <p:ph type="title"/>
+          </p:nvPr>
+        </p:nvSpPr>
+        <p:spPr/>
+        <p:txBody>
+          <a:bodyPr/>
+          <a:lstStyle/>
+          <a:p>
+            <a:r>
+              <a:rPr lang="en-CA" dirty="0"/>
+              <a:t>A few ideas behind AL</a:t>
+            </a:r>
+          </a:p>
+        </p:txBody>
+      </p:sp>
+      <p:sp>
+        <p:nvSpPr>
+          <p:cNvPr id="3" name="Content Placeholder 2"/>
+          <p:cNvSpPr>
+            <a:spLocks noGrp="1"/>
+          </p:cNvSpPr>
+          <p:nvPr>
+            <p:ph idx="1"/>
+          </p:nvPr>
+        </p:nvSpPr>
+        <p:spPr/>
+        <p:txBody>
+          <a:bodyPr/>
+          <a:lstStyle/>
+          <a:p>
+            <a:r>
+              <a:rPr lang="en-CA" dirty="0"/>
+              <a:t>Life is a process</a:t>
+            </a:r>
+          </a:p>
+          <a:p>
+            <a:r>
+              <a:rPr lang="en-CA" dirty="0"/>
+              <a:t>Life can be explored constructively</a:t>
+            </a:r>
+          </a:p>
+          <a:p>
+            <a:r>
+              <a:rPr lang="en-CA" dirty="0"/>
+              <a:t>‘Life’ is independent of substrate</a:t>
+            </a:r>
+          </a:p>
+        </p:txBody>
+      </p:sp>
+    </p:spTree>
+    <p:extLst>
+      <p:ext uri="{BB962C8B-B14F-4D97-AF65-F5344CB8AC3E}">
+        <p14:creationId xmlns:p14="http://schemas.microsoft.com/office/powerpoint/2010/main" val="198058602"/>
+      </p:ext>
+    </p:extLst>
+  </p:cSld>
+  <p:clrMapOvr>
+    <a:masterClrMapping/>
+  </p:clrMapOvr>
+  <p:timing>
+    <p:tnLst>
+      <p:par>
+        <p:cTn id="1" dur="indefinite" restart="never" nodeType="tmRoot"/>
+      </p:par>
+    </p:tnLst>
+  </p:timing>
+</p:sld>
+</file>
+
+<file path=ppt/slides/slide8.xml><?xml version="1.0" encoding="utf-8"?>
+<p:sld xmlns:a="http://schemas.openxmlformats.org/drawingml/2006/main" xmlns:r="http://schemas.openxmlformats.org/officeDocument/2006/relationships" xmlns:p="http://schemas.openxmlformats.org/presentationml/2006/main">
+  <p:cSld>
+    <p:spTree>
+      <p:nvGrpSpPr>
+        <p:cNvPr id="1" name=""/>
+        <p:cNvGrpSpPr/>
+        <p:nvPr/>
+      </p:nvGrpSpPr>
+      <p:grpSpPr>
+        <a:xfrm>
+          <a:off x="0" y="0"/>
+          <a:ext cx="0" cy="0"/>
+          <a:chOff x="0" y="0"/>
+          <a:chExt cx="0" cy="0"/>
+        </a:xfrm>
+      </p:grpSpPr>
+      <p:sp>
+        <p:nvSpPr>
+          <p:cNvPr id="2" name="Title 1"/>
+          <p:cNvSpPr>
+            <a:spLocks noGrp="1"/>
+          </p:cNvSpPr>
+          <p:nvPr>
+            <p:ph type="title"/>
+          </p:nvPr>
+        </p:nvSpPr>
+        <p:spPr/>
+        <p:txBody>
+          <a:bodyPr/>
+          <a:lstStyle/>
+          <a:p>
+            <a:r>
+              <a:rPr lang="en-CA" dirty="0" smtClean="0"/>
+              <a:t>Two categories of AL</a:t>
+            </a:r>
+            <a:endParaRPr lang="en-CA" dirty="0"/>
+          </a:p>
+        </p:txBody>
+      </p:sp>
+      <p:sp>
+        <p:nvSpPr>
+          <p:cNvPr id="3" name="Content Placeholder 2"/>
+          <p:cNvSpPr>
+            <a:spLocks noGrp="1"/>
+          </p:cNvSpPr>
+          <p:nvPr>
+            <p:ph sz="half" idx="1"/>
+          </p:nvPr>
+        </p:nvSpPr>
+        <p:spPr/>
+        <p:txBody>
+          <a:bodyPr>
+            <a:normAutofit/>
+          </a:bodyPr>
+          <a:lstStyle/>
+          <a:p>
+            <a:pPr marL="0" indent="0" algn="ctr">
+              <a:buNone/>
+            </a:pPr>
+            <a:r>
+              <a:rPr lang="en-CA" sz="4000" dirty="0" smtClean="0"/>
+              <a:t>Virtual</a:t>
+            </a:r>
+          </a:p>
+          <a:p>
+            <a:pPr lvl="1" algn="ctr"/>
+            <a:r>
+              <a:rPr lang="en-CA" sz="2800" dirty="0" smtClean="0"/>
+              <a:t>Abstract</a:t>
+            </a:r>
+            <a:endParaRPr lang="en-CA" sz="4000" dirty="0"/>
+          </a:p>
+        </p:txBody>
+      </p:sp>
+      <p:sp>
+        <p:nvSpPr>
+          <p:cNvPr id="4" name="Content Placeholder 3"/>
+          <p:cNvSpPr>
+            <a:spLocks noGrp="1"/>
+          </p:cNvSpPr>
+          <p:nvPr>
+            <p:ph sz="half" idx="2"/>
+          </p:nvPr>
+        </p:nvSpPr>
+        <p:spPr/>
+        <p:txBody>
+          <a:bodyPr/>
+          <a:lstStyle/>
+          <a:p>
+            <a:pPr marL="0" indent="0" algn="ctr">
+              <a:buNone/>
+            </a:pPr>
+            <a:r>
+              <a:rPr lang="en-CA" sz="4000" dirty="0" smtClean="0"/>
+              <a:t>Synthetic</a:t>
+            </a:r>
+          </a:p>
+          <a:p>
+            <a:pPr lvl="1" algn="ctr"/>
+            <a:r>
+              <a:rPr lang="en-CA" sz="2800" dirty="0" smtClean="0"/>
+              <a:t>Concrete</a:t>
+            </a:r>
+            <a:endParaRPr lang="en-CA" sz="1800" dirty="0"/>
+          </a:p>
+        </p:txBody>
+      </p:sp>
+      <p:grpSp>
+        <p:nvGrpSpPr>
+          <p:cNvPr id="7" name="Group 6"/>
+          <p:cNvGrpSpPr/>
+          <p:nvPr/>
+        </p:nvGrpSpPr>
+        <p:grpSpPr>
+          <a:xfrm>
+            <a:off x="2389414" y="3181239"/>
+            <a:ext cx="2677885" cy="3039653"/>
+            <a:chOff x="963386" y="3048000"/>
+            <a:chExt cx="2677885" cy="3039653"/>
+          </a:xfrm>
+        </p:grpSpPr>
+        <p:pic>
+          <p:nvPicPr>
+            <p:cNvPr id="5" name="Picture 4"/>
+            <p:cNvPicPr>
+              <a:picLocks noChangeAspect="1"/>
+            </p:cNvPicPr>
+            <p:nvPr/>
+          </p:nvPicPr>
+          <p:blipFill rotWithShape="1">
+            <a:blip r:embed="rId2">
+              <a:extLst>
+                <a:ext uri="{28A0092B-C50C-407E-A947-70E740481C1C}">
+                  <a14:useLocalDpi xmlns:a14="http://schemas.microsoft.com/office/drawing/2010/main" val="0"/>
+                </a:ext>
+              </a:extLst>
+            </a:blip>
+            <a:srcRect l="26304" t="18062" r="26095" b="14931"/>
+            <a:stretch/>
+          </p:blipFill>
+          <p:spPr>
+            <a:xfrm>
+              <a:off x="1066800" y="3048000"/>
+              <a:ext cx="2471058" cy="2329543"/>
+            </a:xfrm>
+            <a:prstGeom prst="rect">
+              <a:avLst/>
+            </a:prstGeom>
+          </p:spPr>
+        </p:pic>
+        <p:sp>
+          <p:nvSpPr>
+            <p:cNvPr id="6" name="TextBox 5"/>
+            <p:cNvSpPr txBox="1"/>
+            <p:nvPr/>
+          </p:nvSpPr>
+          <p:spPr>
+            <a:xfrm>
+              <a:off x="963386" y="5379767"/>
+              <a:ext cx="2677885" cy="707886"/>
+            </a:xfrm>
+            <a:prstGeom prst="rect">
+              <a:avLst/>
+            </a:prstGeom>
+            <a:noFill/>
+          </p:spPr>
+          <p:txBody>
+            <a:bodyPr wrap="square" rtlCol="0">
+              <a:spAutoFit/>
+            </a:bodyPr>
+            <a:lstStyle/>
+            <a:p>
+              <a:r>
+                <a:rPr lang="en-CA" sz="1000" dirty="0">
+                  <a:solidFill>
+                    <a:schemeClr val="bg1">
+                      <a:lumMod val="50000"/>
+                    </a:schemeClr>
+                  </a:solidFill>
+                </a:rPr>
+                <a:t>https://www.thestar.com/content/dam/thestar/life/technology/2013/02/14/tamagotchi_returns_electronic_pet_reborn_as_mobile_app/tamagotchi.jpg.size.xxlarge.promo.jpg</a:t>
+              </a:r>
+            </a:p>
+          </p:txBody>
+        </p:sp>
+      </p:grpSp>
+      <p:grpSp>
+        <p:nvGrpSpPr>
+          <p:cNvPr id="11" name="Group 10"/>
+          <p:cNvGrpSpPr/>
+          <p:nvPr/>
+        </p:nvGrpSpPr>
+        <p:grpSpPr>
+          <a:xfrm>
+            <a:off x="7364185" y="3181239"/>
+            <a:ext cx="3145972" cy="2814432"/>
+            <a:chOff x="5687785" y="3203010"/>
+            <a:chExt cx="3145972" cy="2814432"/>
+          </a:xfrm>
+        </p:grpSpPr>
+        <p:sp>
+          <p:nvSpPr>
+            <p:cNvPr id="9" name="TextBox 8"/>
+            <p:cNvSpPr txBox="1"/>
+            <p:nvPr/>
+          </p:nvSpPr>
+          <p:spPr>
+            <a:xfrm>
+              <a:off x="5949042" y="5771221"/>
+              <a:ext cx="2623457" cy="246221"/>
+            </a:xfrm>
+            <a:prstGeom prst="rect">
+              <a:avLst/>
+            </a:prstGeom>
+            <a:noFill/>
+          </p:spPr>
+          <p:txBody>
+            <a:bodyPr wrap="square" rtlCol="0">
+              <a:spAutoFit/>
+            </a:bodyPr>
+            <a:lstStyle/>
+            <a:p>
+              <a:r>
+                <a:rPr lang="en-CA" sz="1000" dirty="0">
+                  <a:solidFill>
+                    <a:schemeClr val="bg1">
+                      <a:lumMod val="50000"/>
+                    </a:schemeClr>
+                  </a:solidFill>
+                </a:rPr>
+                <a:t>http://www.eurostemcell.org/files/dolly1.jpg</a:t>
+              </a:r>
+            </a:p>
+          </p:txBody>
+        </p:sp>
+        <p:pic>
+          <p:nvPicPr>
+            <p:cNvPr id="10" name="Picture 9"/>
+            <p:cNvPicPr>
+              <a:picLocks noChangeAspect="1"/>
+            </p:cNvPicPr>
+            <p:nvPr/>
+          </p:nvPicPr>
+          <p:blipFill rotWithShape="1">
+            <a:blip r:embed="rId3" cstate="print">
+              <a:extLst>
+                <a:ext uri="{28A0092B-C50C-407E-A947-70E740481C1C}">
+                  <a14:useLocalDpi xmlns:a14="http://schemas.microsoft.com/office/drawing/2010/main" val="0"/>
+                </a:ext>
+              </a:extLst>
+            </a:blip>
+            <a:srcRect l="14746" t="11428" r="18664" b="8648"/>
+            <a:stretch/>
+          </p:blipFill>
+          <p:spPr>
+            <a:xfrm>
+              <a:off x="5687785" y="3203010"/>
+              <a:ext cx="3145972" cy="2503714"/>
+            </a:xfrm>
+            <a:prstGeom prst="rect">
+              <a:avLst/>
+            </a:prstGeom>
+          </p:spPr>
+        </p:pic>
+      </p:grpSp>
+    </p:spTree>
+    <p:extLst>
+      <p:ext uri="{BB962C8B-B14F-4D97-AF65-F5344CB8AC3E}">
+        <p14:creationId xmlns:p14="http://schemas.microsoft.com/office/powerpoint/2010/main" val="1451404266"/>
+      </p:ext>
+    </p:extLst>
+  </p:cSld>
+  <p:clrMapOvr>
+    <a:masterClrMapping/>
+  </p:clrMapOvr>
+  <p:timing>
+    <p:tnLst>
+      <p:par>
+        <p:cTn id="1" dur="indefinite" restart="never" nodeType="tmRoot">
+          <p:childTnLst>
+            <p:seq concurrent="1" nextAc="seek">
+              <p:cTn id="2" dur="indefinite" nodeType="mainSeq">
+                <p:childTnLst>
+                  <p:par>
+                    <p:cTn id="3" fill="hold">
+                      <p:stCondLst>
+                        <p:cond delay="indefinite"/>
+                      </p:stCondLst>
+                      <p:childTnLst>
+                        <p:par>
+                          <p:cTn id="4" fill="hold">
+                            <p:stCondLst>
+                              <p:cond delay="0"/>
+                            </p:stCondLst>
+                            <p:childTnLst>
+                              <p:par>
+                                <p:cTn id="5" presetID="10" presetClass="entr" presetSubtype="0" fill="hold" nodeType="clickEffect">
+                                  <p:stCondLst>
+                                    <p:cond delay="0"/>
+                                  </p:stCondLst>
+                                  <p:childTnLst>
+                                    <p:set>
+                                      <p:cBhvr>
+                                        <p:cTn id="6" dur="1" fill="hold">
+                                          <p:stCondLst>
+                                            <p:cond delay="0"/>
+                                          </p:stCondLst>
+                                        </p:cTn>
+                                        <p:tgtEl>
+                                          <p:spTgt spid="7"/>
+                                        </p:tgtEl>
+                                        <p:attrNameLst>
+                                          <p:attrName>style.visibility</p:attrName>
+                                        </p:attrNameLst>
+                                      </p:cBhvr>
+                                      <p:to>
+                                        <p:strVal val="visible"/>
+                                      </p:to>
+                                    </p:set>
+                                    <p:animEffect transition="in" filter="fade">
+                                      <p:cBhvr>
+                                        <p:cTn id="7" dur="1000"/>
+                                        <p:tgtEl>
+                                          <p:spTgt spid="7"/>
+                                        </p:tgtEl>
+                                      </p:cBhvr>
+                                    </p:animEffect>
+                                  </p:childTnLst>
+                                </p:cTn>
+                              </p:par>
+                              <p:par>
+                                <p:cTn id="8" presetID="10" presetClass="entr" presetSubtype="0" fill="hold" nodeType="withEffect">
+                                  <p:stCondLst>
+                                    <p:cond delay="0"/>
+                                  </p:stCondLst>
+                                  <p:childTnLst>
+                                    <p:set>
+                                      <p:cBhvr>
+                                        <p:cTn id="9" dur="1" fill="hold">
+                                          <p:stCondLst>
+                                            <p:cond delay="0"/>
+                                          </p:stCondLst>
+                                        </p:cTn>
+                                        <p:tgtEl>
+                                          <p:spTgt spid="3">
+                                            <p:txEl>
+                                              <p:pRg st="0" end="0"/>
+                                            </p:txEl>
+                                          </p:spTgt>
+                                        </p:tgtEl>
+                                        <p:attrNameLst>
+                                          <p:attrName>style.visibility</p:attrName>
+                                        </p:attrNameLst>
+                                      </p:cBhvr>
+                                      <p:to>
+                                        <p:strVal val="visible"/>
+                                      </p:to>
+                                    </p:set>
+                                    <p:animEffect transition="in" filter="fade">
+                                      <p:cBhvr>
+                                        <p:cTn id="10" dur="1000"/>
+                                        <p:tgtEl>
+                                          <p:spTgt spid="3">
+                                            <p:txEl>
+                                              <p:pRg st="0" end="0"/>
+                                            </p:txEl>
+                                          </p:spTgt>
+                                        </p:tgtEl>
+                                      </p:cBhvr>
+                                    </p:animEffect>
+                                  </p:childTnLst>
+                                </p:cTn>
+                              </p:par>
+                            </p:childTnLst>
+                          </p:cTn>
+                        </p:par>
+                      </p:childTnLst>
+                    </p:cTn>
+                  </p:par>
+                  <p:par>
+                    <p:cTn id="11" fill="hold">
+                      <p:stCondLst>
+                        <p:cond delay="indefinite"/>
+                      </p:stCondLst>
+                      <p:childTnLst>
+                        <p:par>
+                          <p:cTn id="12" fill="hold">
+                            <p:stCondLst>
+                              <p:cond delay="0"/>
+                            </p:stCondLst>
+                            <p:childTnLst>
+                              <p:par>
+                                <p:cTn id="13" presetID="10" presetClass="entr" presetSubtype="0" fill="hold" nodeType="clickEffect">
+                                  <p:stCondLst>
+                                    <p:cond delay="0"/>
+                                  </p:stCondLst>
+                                  <p:childTnLst>
+                                    <p:set>
+                                      <p:cBhvr>
+                                        <p:cTn id="14" dur="1" fill="hold">
+                                          <p:stCondLst>
+                                            <p:cond delay="0"/>
+                                          </p:stCondLst>
+                                        </p:cTn>
+                                        <p:tgtEl>
+                                          <p:spTgt spid="3">
+                                            <p:txEl>
+                                              <p:pRg st="1" end="1"/>
+                                            </p:txEl>
+                                          </p:spTgt>
+                                        </p:tgtEl>
+                                        <p:attrNameLst>
+                                          <p:attrName>style.visibility</p:attrName>
+                                        </p:attrNameLst>
+                                      </p:cBhvr>
+                                      <p:to>
+                                        <p:strVal val="visible"/>
+                                      </p:to>
+                                    </p:set>
+                                    <p:animEffect transition="in" filter="fade">
+                                      <p:cBhvr>
+                                        <p:cTn id="15" dur="1000"/>
+                                        <p:tgtEl>
+                                          <p:spTgt spid="3">
+                                            <p:txEl>
+                                              <p:pRg st="1" end="1"/>
+                                            </p:txEl>
+                                          </p:spTgt>
+                                        </p:tgtEl>
+                                      </p:cBhvr>
+                                    </p:animEffect>
+                                  </p:childTnLst>
+                                </p:cTn>
+                              </p:par>
+                            </p:childTnLst>
+                          </p:cTn>
+                        </p:par>
+                      </p:childTnLst>
+                    </p:cTn>
+                  </p:par>
+                  <p:par>
+                    <p:cTn id="16" fill="hold">
+                      <p:stCondLst>
+                        <p:cond delay="indefinite"/>
+                      </p:stCondLst>
+                      <p:childTnLst>
+                        <p:par>
+                          <p:cTn id="17" fill="hold">
+                            <p:stCondLst>
+                              <p:cond delay="0"/>
+                            </p:stCondLst>
+                            <p:childTnLst>
+                              <p:par>
+                                <p:cTn id="18" presetID="10" presetClass="entr" presetSubtype="0" fill="hold" nodeType="clickEffect">
+                                  <p:stCondLst>
+                                    <p:cond delay="0"/>
+                                  </p:stCondLst>
+                                  <p:childTnLst>
+                                    <p:set>
+                                      <p:cBhvr>
+                                        <p:cTn id="19" dur="1" fill="hold">
+                                          <p:stCondLst>
+                                            <p:cond delay="0"/>
+                                          </p:stCondLst>
+                                        </p:cTn>
+                                        <p:tgtEl>
+                                          <p:spTgt spid="11"/>
+                                        </p:tgtEl>
+                                        <p:attrNameLst>
+                                          <p:attrName>style.visibility</p:attrName>
+                                        </p:attrNameLst>
+                                      </p:cBhvr>
+                                      <p:to>
+                                        <p:strVal val="visible"/>
+                                      </p:to>
+                                    </p:set>
+                                    <p:animEffect transition="in" filter="fade">
+                                      <p:cBhvr>
+                                        <p:cTn id="20" dur="1000"/>
+                                        <p:tgtEl>
+                                          <p:spTgt spid="11"/>
+                                        </p:tgtEl>
+                                      </p:cBhvr>
+                                    </p:animEffect>
+                                  </p:childTnLst>
+                                </p:cTn>
+                              </p:par>
+                              <p:par>
+                                <p:cTn id="21" presetID="10" presetClass="entr" presetSubtype="0" fill="hold" nodeType="withEffect">
+                                  <p:stCondLst>
+                                    <p:cond delay="0"/>
+                                  </p:stCondLst>
+                                  <p:childTnLst>
+                                    <p:set>
+                                      <p:cBhvr>
+                                        <p:cTn id="22" dur="1" fill="hold">
+                                          <p:stCondLst>
+                                            <p:cond delay="0"/>
+                                          </p:stCondLst>
+                                        </p:cTn>
+                                        <p:tgtEl>
+                                          <p:spTgt spid="4">
+                                            <p:txEl>
+                                              <p:pRg st="0" end="0"/>
+                                            </p:txEl>
+                                          </p:spTgt>
+                                        </p:tgtEl>
+                                        <p:attrNameLst>
+                                          <p:attrName>style.visibility</p:attrName>
+                                        </p:attrNameLst>
+                                      </p:cBhvr>
+                                      <p:to>
+                                        <p:strVal val="visible"/>
+                                      </p:to>
+                                    </p:set>
+                                    <p:animEffect transition="in" filter="fade">
+                                      <p:cBhvr>
+                                        <p:cTn id="23" dur="1000"/>
+                                        <p:tgtEl>
+                                          <p:spTgt spid="4">
+                                            <p:txEl>
+                                              <p:pRg st="0" end="0"/>
+                                            </p:txEl>
+                                          </p:spTgt>
+                                        </p:tgtEl>
+                                      </p:cBhvr>
+                                    </p:animEffect>
+                                  </p:childTnLst>
+                                </p:cTn>
+                              </p:par>
+                            </p:childTnLst>
+                          </p:cTn>
+                        </p:par>
+                      </p:childTnLst>
+                    </p:cTn>
+                  </p:par>
+                  <p:par>
+                    <p:cTn id="24" fill="hold">
+                      <p:stCondLst>
+                        <p:cond delay="indefinite"/>
+                      </p:stCondLst>
+                      <p:childTnLst>
+                        <p:par>
+                          <p:cTn id="25" fill="hold">
+                            <p:stCondLst>
+                              <p:cond delay="0"/>
+                            </p:stCondLst>
+                            <p:childTnLst>
+                              <p:par>
+                                <p:cTn id="26" presetID="10" presetClass="entr" presetSubtype="0" fill="hold" nodeType="clickEffect">
+                                  <p:stCondLst>
+                                    <p:cond delay="0"/>
+                                  </p:stCondLst>
+                                  <p:childTnLst>
+                                    <p:set>
+                                      <p:cBhvr>
+                                        <p:cTn id="27" dur="1" fill="hold">
+                                          <p:stCondLst>
+                                            <p:cond delay="0"/>
+                                          </p:stCondLst>
+                                        </p:cTn>
+                                        <p:tgtEl>
+                                          <p:spTgt spid="4">
+                                            <p:txEl>
+                                              <p:pRg st="1" end="1"/>
+                                            </p:txEl>
+                                          </p:spTgt>
+                                        </p:tgtEl>
+                                        <p:attrNameLst>
+                                          <p:attrName>style.visibility</p:attrName>
+                                        </p:attrNameLst>
+                                      </p:cBhvr>
+                                      <p:to>
+                                        <p:strVal val="visible"/>
+                                      </p:to>
+                                    </p:set>
+                                    <p:animEffect transition="in" filter="fade">
+                                      <p:cBhvr>
+                                        <p:cTn id="28" dur="1000"/>
+                                        <p:tgtEl>
+                                          <p:spTgt spid="4">
+                                            <p:txEl>
+                                              <p:pRg st="1" end="1"/>
+                                            </p:txEl>
+                                          </p:spTgt>
+                                        </p:tgtEl>
+                                      </p:cBhvr>
+                                    </p:animEffect>
+                                  </p:childTnLst>
+                                </p:cTn>
+                              </p:par>
+                            </p:childTnLst>
+                          </p:cTn>
+                        </p:par>
+                      </p:childTnLst>
+                    </p:cTn>
+                  </p:par>
+                </p:childTnLst>
+              </p:cTn>
+              <p:prevCondLst>
+                <p:cond evt="onPrev" delay="0">
+                  <p:tgtEl>
+                    <p:sldTgt/>
+                  </p:tgtEl>
+                </p:cond>
+              </p:prevCondLst>
+              <p:nextCondLst>
+                <p:cond evt="onNext" delay="0">
+                  <p:tgtEl>
+                    <p:sldTgt/>
+                  </p:tgtEl>
+                </p:cond>
+              </p:nextCondLst>
+            </p:seq>
+          </p:childTnLst>
+        </p:cTn>
+      </p:par>
+    </p:tnLst>
+  </p:timing>
+</p:sld>
+</file>
+
+<file path=ppt/slides/slide9.xml><?xml version="1.0" encoding="utf-8"?>
+<p:sld xmlns:a="http://schemas.openxmlformats.org/drawingml/2006/main" xmlns:r="http://schemas.openxmlformats.org/officeDocument/2006/relationships" xmlns:p="http://schemas.openxmlformats.org/presentationml/2006/main">
+  <p:cSld>
+    <p:spTree>
+      <p:nvGrpSpPr>
+        <p:cNvPr id="1" name=""/>
+        <p:cNvGrpSpPr/>
+        <p:nvPr/>
+      </p:nvGrpSpPr>
+      <p:grpSpPr>
+        <a:xfrm>
+          <a:off x="0" y="0"/>
+          <a:ext cx="0" cy="0"/>
+          <a:chOff x="0" y="0"/>
+          <a:chExt cx="0" cy="0"/>
+        </a:xfrm>
+      </p:grpSpPr>
+      <p:sp>
+        <p:nvSpPr>
+          <p:cNvPr id="2" name="Title 1"/>
+          <p:cNvSpPr>
+            <a:spLocks noGrp="1"/>
+          </p:cNvSpPr>
+          <p:nvPr>
+            <p:ph type="title"/>
+          </p:nvPr>
+        </p:nvSpPr>
+        <p:spPr/>
+        <p:txBody>
+          <a:bodyPr/>
+          <a:lstStyle/>
+          <a:p>
+            <a:r>
+              <a:rPr lang="en-CA" dirty="0"/>
               <a:t>Some criteria for life [Farmer and Belin, 1991]</a:t>
             </a:r>
-            <a:endParaRPr lang="en-CA" dirty="0"/>
           </a:p>
         </p:txBody>
       </p:sp>
@@ -4074,53 +6362,51 @@
           <a:lstStyle/>
           <a:p>
             <a:r>
-              <a:rPr lang="en-CA" dirty="0" smtClean="0"/>
+              <a:rPr lang="en-CA" dirty="0"/>
               <a:t>Life is a pattern, not an object</a:t>
             </a:r>
           </a:p>
           <a:p>
             <a:r>
-              <a:rPr lang="en-CA" dirty="0" smtClean="0"/>
+              <a:rPr lang="en-CA" dirty="0"/>
               <a:t>Life involves self-reproduction</a:t>
             </a:r>
-            <a:endParaRPr lang="en-CA" dirty="0"/>
-          </a:p>
-          <a:p>
-            <a:r>
-              <a:rPr lang="en-CA" dirty="0" smtClean="0"/>
+          </a:p>
+          <a:p>
+            <a:r>
+              <a:rPr lang="en-CA" dirty="0"/>
               <a:t>Information storage of a self-representation</a:t>
             </a:r>
           </a:p>
           <a:p>
             <a:r>
-              <a:rPr lang="en-CA" dirty="0" smtClean="0"/>
+              <a:rPr lang="en-CA" dirty="0"/>
               <a:t>Metabolism</a:t>
             </a:r>
           </a:p>
           <a:p>
             <a:r>
-              <a:rPr lang="en-CA" dirty="0" smtClean="0"/>
+              <a:rPr lang="en-CA" dirty="0"/>
               <a:t>Interaction with the environment</a:t>
             </a:r>
           </a:p>
           <a:p>
             <a:r>
-              <a:rPr lang="en-CA" dirty="0" smtClean="0"/>
+              <a:rPr lang="en-CA" dirty="0"/>
               <a:t>Interdependence of parts</a:t>
             </a:r>
           </a:p>
           <a:p>
             <a:r>
-              <a:rPr lang="en-CA" dirty="0" smtClean="0"/>
+              <a:rPr lang="en-CA" dirty="0"/>
               <a:t>Stability under perturbation</a:t>
             </a:r>
           </a:p>
           <a:p>
             <a:r>
-              <a:rPr lang="en-CA" dirty="0" smtClean="0"/>
+              <a:rPr lang="en-CA" dirty="0"/>
               <a:t>The ability to evolve</a:t>
             </a:r>
-            <a:endParaRPr lang="en-CA" dirty="0"/>
           </a:p>
         </p:txBody>
       </p:sp>

</xml_diff>

<commit_message>
CISC 879 Ch8 Presentation - Some work
</commit_message>
<xml_diff>
--- a/CISC879/ChapterPresentation/LectureSlidesCh8.pptx
+++ b/CISC879/ChapterPresentation/LectureSlidesCh8.pptx
@@ -9,13 +9,17 @@
     <p:sldId id="262" r:id="rId3"/>
     <p:sldId id="263" r:id="rId4"/>
     <p:sldId id="257" r:id="rId5"/>
-    <p:sldId id="264" r:id="rId6"/>
-    <p:sldId id="259" r:id="rId7"/>
-    <p:sldId id="258" r:id="rId8"/>
-    <p:sldId id="265" r:id="rId9"/>
-    <p:sldId id="261" r:id="rId10"/>
+    <p:sldId id="258" r:id="rId6"/>
+    <p:sldId id="264" r:id="rId7"/>
+    <p:sldId id="259" r:id="rId8"/>
+    <p:sldId id="268" r:id="rId9"/>
+    <p:sldId id="265" r:id="rId10"/>
     <p:sldId id="260" r:id="rId11"/>
-    <p:sldId id="266" r:id="rId12"/>
+    <p:sldId id="261" r:id="rId12"/>
+    <p:sldId id="266" r:id="rId13"/>
+    <p:sldId id="270" r:id="rId14"/>
+    <p:sldId id="267" r:id="rId15"/>
+    <p:sldId id="269" r:id="rId16"/>
   </p:sldIdLst>
   <p:sldSz cx="12192000" cy="6858000"/>
   <p:notesSz cx="6858000" cy="9144000"/>
@@ -253,7 +257,7 @@
           <a:p>
             <a:fld id="{A16762DA-0EF7-46B5-B462-6D59499F3413}" type="datetimeFigureOut">
               <a:rPr lang="en-CA" smtClean="0"/>
-              <a:t>24/10/2016</a:t>
+              <a:t>28/10/2016</a:t>
             </a:fld>
             <a:endParaRPr lang="en-CA"/>
           </a:p>
@@ -423,7 +427,7 @@
           <a:p>
             <a:fld id="{A16762DA-0EF7-46B5-B462-6D59499F3413}" type="datetimeFigureOut">
               <a:rPr lang="en-CA" smtClean="0"/>
-              <a:t>24/10/2016</a:t>
+              <a:t>28/10/2016</a:t>
             </a:fld>
             <a:endParaRPr lang="en-CA"/>
           </a:p>
@@ -603,7 +607,7 @@
           <a:p>
             <a:fld id="{A16762DA-0EF7-46B5-B462-6D59499F3413}" type="datetimeFigureOut">
               <a:rPr lang="en-CA" smtClean="0"/>
-              <a:t>24/10/2016</a:t>
+              <a:t>28/10/2016</a:t>
             </a:fld>
             <a:endParaRPr lang="en-CA"/>
           </a:p>
@@ -773,7 +777,7 @@
           <a:p>
             <a:fld id="{A16762DA-0EF7-46B5-B462-6D59499F3413}" type="datetimeFigureOut">
               <a:rPr lang="en-CA" smtClean="0"/>
-              <a:t>24/10/2016</a:t>
+              <a:t>28/10/2016</a:t>
             </a:fld>
             <a:endParaRPr lang="en-CA"/>
           </a:p>
@@ -1019,7 +1023,7 @@
           <a:p>
             <a:fld id="{A16762DA-0EF7-46B5-B462-6D59499F3413}" type="datetimeFigureOut">
               <a:rPr lang="en-CA" smtClean="0"/>
-              <a:t>24/10/2016</a:t>
+              <a:t>28/10/2016</a:t>
             </a:fld>
             <a:endParaRPr lang="en-CA"/>
           </a:p>
@@ -1251,7 +1255,7 @@
           <a:p>
             <a:fld id="{A16762DA-0EF7-46B5-B462-6D59499F3413}" type="datetimeFigureOut">
               <a:rPr lang="en-CA" smtClean="0"/>
-              <a:t>24/10/2016</a:t>
+              <a:t>28/10/2016</a:t>
             </a:fld>
             <a:endParaRPr lang="en-CA"/>
           </a:p>
@@ -1618,7 +1622,7 @@
           <a:p>
             <a:fld id="{A16762DA-0EF7-46B5-B462-6D59499F3413}" type="datetimeFigureOut">
               <a:rPr lang="en-CA" smtClean="0"/>
-              <a:t>24/10/2016</a:t>
+              <a:t>28/10/2016</a:t>
             </a:fld>
             <a:endParaRPr lang="en-CA"/>
           </a:p>
@@ -1736,7 +1740,7 @@
           <a:p>
             <a:fld id="{A16762DA-0EF7-46B5-B462-6D59499F3413}" type="datetimeFigureOut">
               <a:rPr lang="en-CA" smtClean="0"/>
-              <a:t>24/10/2016</a:t>
+              <a:t>28/10/2016</a:t>
             </a:fld>
             <a:endParaRPr lang="en-CA"/>
           </a:p>
@@ -1831,7 +1835,7 @@
           <a:p>
             <a:fld id="{A16762DA-0EF7-46B5-B462-6D59499F3413}" type="datetimeFigureOut">
               <a:rPr lang="en-CA" smtClean="0"/>
-              <a:t>24/10/2016</a:t>
+              <a:t>28/10/2016</a:t>
             </a:fld>
             <a:endParaRPr lang="en-CA"/>
           </a:p>
@@ -2108,7 +2112,7 @@
           <a:p>
             <a:fld id="{A16762DA-0EF7-46B5-B462-6D59499F3413}" type="datetimeFigureOut">
               <a:rPr lang="en-CA" smtClean="0"/>
-              <a:t>24/10/2016</a:t>
+              <a:t>28/10/2016</a:t>
             </a:fld>
             <a:endParaRPr lang="en-CA"/>
           </a:p>
@@ -2361,7 +2365,7 @@
           <a:p>
             <a:fld id="{A16762DA-0EF7-46B5-B462-6D59499F3413}" type="datetimeFigureOut">
               <a:rPr lang="en-CA" smtClean="0"/>
-              <a:t>24/10/2016</a:t>
+              <a:t>28/10/2016</a:t>
             </a:fld>
             <a:endParaRPr lang="en-CA"/>
           </a:p>
@@ -2574,7 +2578,7 @@
           <a:p>
             <a:fld id="{A16762DA-0EF7-46B5-B462-6D59499F3413}" type="datetimeFigureOut">
               <a:rPr lang="en-CA" smtClean="0"/>
-              <a:t>24/10/2016</a:t>
+              <a:t>28/10/2016</a:t>
             </a:fld>
             <a:endParaRPr lang="en-CA"/>
           </a:p>
@@ -3129,25 +3133,118 @@
           </a:p>
           <a:p>
             <a:r>
-              <a:rPr lang="en-CA" dirty="0"/>
-              <a:t>To see past the details of life’s </a:t>
-            </a:r>
-            <a:r>
               <a:rPr lang="en-CA" dirty="0" smtClean="0"/>
-              <a:t>various implementations </a:t>
-            </a:r>
-            <a:r>
-              <a:rPr lang="en-CA" dirty="0"/>
-              <a:t>is to know </a:t>
-            </a:r>
-            <a:r>
+              <a:t>To know this, we must see </a:t>
+            </a:r>
+            <a:br>
               <a:rPr lang="en-CA" dirty="0" smtClean="0"/>
-              <a:t>this.</a:t>
+            </a:br>
+            <a:r>
+              <a:rPr lang="en-CA" dirty="0" smtClean="0"/>
+              <a:t>past the details of life’s </a:t>
+            </a:r>
+            <a:br>
+              <a:rPr lang="en-CA" dirty="0" smtClean="0"/>
+            </a:br>
+            <a:r>
+              <a:rPr lang="en-CA" dirty="0" smtClean="0"/>
+              <a:t>many implementations.</a:t>
             </a:r>
             <a:endParaRPr lang="en-CA" dirty="0"/>
           </a:p>
         </p:txBody>
       </p:sp>
+      <p:grpSp>
+        <p:nvGrpSpPr>
+          <p:cNvPr id="6" name="Group 5"/>
+          <p:cNvGrpSpPr/>
+          <p:nvPr/>
+        </p:nvGrpSpPr>
+        <p:grpSpPr>
+          <a:xfrm>
+            <a:off x="7545977" y="1262744"/>
+            <a:ext cx="2490651" cy="4066418"/>
+            <a:chOff x="7728857" y="905692"/>
+            <a:chExt cx="2490651" cy="4066418"/>
+          </a:xfrm>
+        </p:grpSpPr>
+        <p:pic>
+          <p:nvPicPr>
+            <p:cNvPr id="4" name="Picture 3"/>
+            <p:cNvPicPr>
+              <a:picLocks noChangeAspect="1"/>
+            </p:cNvPicPr>
+            <p:nvPr/>
+          </p:nvPicPr>
+          <p:blipFill rotWithShape="1">
+            <a:blip r:embed="rId2" cstate="print">
+              <a:extLst>
+                <a:ext uri="{BEBA8EAE-BF5A-486C-A8C5-ECC9F3942E4B}">
+                  <a14:imgProps xmlns:a14="http://schemas.microsoft.com/office/drawing/2010/main">
+                    <a14:imgLayer r:embed="rId3">
+                      <a14:imgEffect>
+                        <a14:backgroundRemoval t="9353" b="88921" l="27154" r="76462">
+                          <a14:backgroundMark x1="62077" y1="47554" x2="62077" y2="47554"/>
+                          <a14:backgroundMark x1="43385" y1="45108" x2="43385" y2="45108"/>
+                        </a14:backgroundRemoval>
+                      </a14:imgEffect>
+                    </a14:imgLayer>
+                  </a14:imgProps>
+                </a:ext>
+                <a:ext uri="{28A0092B-C50C-407E-A947-70E740481C1C}">
+                  <a14:useLocalDpi xmlns:a14="http://schemas.microsoft.com/office/drawing/2010/main" val="0"/>
+                </a:ext>
+              </a:extLst>
+            </a:blip>
+            <a:srcRect l="20989" t="6475" r="17253" b="6989"/>
+            <a:stretch/>
+          </p:blipFill>
+          <p:spPr>
+            <a:xfrm>
+              <a:off x="7750629" y="905692"/>
+              <a:ext cx="2447108" cy="3666308"/>
+            </a:xfrm>
+            <a:prstGeom prst="rect">
+              <a:avLst/>
+            </a:prstGeom>
+          </p:spPr>
+        </p:pic>
+        <p:sp>
+          <p:nvSpPr>
+            <p:cNvPr id="5" name="TextBox 4"/>
+            <p:cNvSpPr txBox="1"/>
+            <p:nvPr/>
+          </p:nvSpPr>
+          <p:spPr>
+            <a:xfrm>
+              <a:off x="7728857" y="4572000"/>
+              <a:ext cx="2490651" cy="400110"/>
+            </a:xfrm>
+            <a:prstGeom prst="rect">
+              <a:avLst/>
+            </a:prstGeom>
+            <a:noFill/>
+          </p:spPr>
+          <p:txBody>
+            <a:bodyPr wrap="square" rtlCol="0">
+              <a:spAutoFit/>
+            </a:bodyPr>
+            <a:lstStyle/>
+            <a:p>
+              <a:r>
+                <a:rPr lang="en-CA" sz="1000" dirty="0">
+                  <a:solidFill>
+                    <a:schemeClr val="bg1">
+                      <a:lumMod val="50000"/>
+                    </a:schemeClr>
+                  </a:solidFill>
+                </a:rPr>
+                <a:t>https://thumbs.dreamstime.com/z/thinking-robot-27761830.jpg</a:t>
+              </a:r>
+            </a:p>
+          </p:txBody>
+        </p:sp>
+      </p:grpSp>
     </p:spTree>
     <p:extLst>
       <p:ext uri="{BB962C8B-B14F-4D97-AF65-F5344CB8AC3E}">
@@ -3201,6 +3298,146 @@
           <a:lstStyle/>
           <a:p>
             <a:r>
+              <a:rPr lang="en-CA" dirty="0"/>
+              <a:t>Farmer and </a:t>
+            </a:r>
+            <a:r>
+              <a:rPr lang="en-CA" dirty="0" smtClean="0"/>
+              <a:t>Belin’s C</a:t>
+            </a:r>
+            <a:r>
+              <a:rPr lang="en-CA" dirty="0" smtClean="0"/>
+              <a:t>riteria </a:t>
+            </a:r>
+            <a:r>
+              <a:rPr lang="en-CA" dirty="0"/>
+              <a:t>for </a:t>
+            </a:r>
+            <a:r>
+              <a:rPr lang="en-CA" dirty="0" smtClean="0"/>
+              <a:t>life (1991)</a:t>
+            </a:r>
+            <a:endParaRPr lang="en-CA" dirty="0"/>
+          </a:p>
+        </p:txBody>
+      </p:sp>
+      <p:sp>
+        <p:nvSpPr>
+          <p:cNvPr id="3" name="Content Placeholder 2"/>
+          <p:cNvSpPr>
+            <a:spLocks noGrp="1"/>
+          </p:cNvSpPr>
+          <p:nvPr>
+            <p:ph idx="1"/>
+          </p:nvPr>
+        </p:nvSpPr>
+        <p:spPr/>
+        <p:txBody>
+          <a:bodyPr/>
+          <a:lstStyle/>
+          <a:p>
+            <a:r>
+              <a:rPr lang="en-CA" dirty="0"/>
+              <a:t>Life is a pattern, not an object</a:t>
+            </a:r>
+          </a:p>
+          <a:p>
+            <a:r>
+              <a:rPr lang="en-CA" dirty="0"/>
+              <a:t>Life involves self-reproduction</a:t>
+            </a:r>
+          </a:p>
+          <a:p>
+            <a:r>
+              <a:rPr lang="en-CA" dirty="0"/>
+              <a:t>Information storage of a self-representation</a:t>
+            </a:r>
+          </a:p>
+          <a:p>
+            <a:r>
+              <a:rPr lang="en-CA" dirty="0"/>
+              <a:t>Metabolism</a:t>
+            </a:r>
+          </a:p>
+          <a:p>
+            <a:r>
+              <a:rPr lang="en-CA" dirty="0"/>
+              <a:t>Interaction with the environment</a:t>
+            </a:r>
+          </a:p>
+          <a:p>
+            <a:r>
+              <a:rPr lang="en-CA" dirty="0"/>
+              <a:t>Interdependence of parts</a:t>
+            </a:r>
+          </a:p>
+          <a:p>
+            <a:r>
+              <a:rPr lang="en-CA" dirty="0"/>
+              <a:t>Stability under perturbation</a:t>
+            </a:r>
+          </a:p>
+          <a:p>
+            <a:r>
+              <a:rPr lang="en-CA" dirty="0"/>
+              <a:t>The ability to evolve</a:t>
+            </a:r>
+          </a:p>
+        </p:txBody>
+      </p:sp>
+    </p:spTree>
+    <p:extLst>
+      <p:ext uri="{BB962C8B-B14F-4D97-AF65-F5344CB8AC3E}">
+        <p14:creationId xmlns:p14="http://schemas.microsoft.com/office/powerpoint/2010/main" val="2266974575"/>
+      </p:ext>
+    </p:extLst>
+  </p:cSld>
+  <p:clrMapOvr>
+    <a:masterClrMapping/>
+  </p:clrMapOvr>
+  <p:timing>
+    <p:tnLst>
+      <p:par>
+        <p:cTn id="1" dur="indefinite" restart="never" nodeType="tmRoot"/>
+      </p:par>
+    </p:tnLst>
+  </p:timing>
+</p:sld>
+</file>
+
+<file path=ppt/slides/slide12.xml><?xml version="1.0" encoding="utf-8"?>
+<p:sld xmlns:a="http://schemas.openxmlformats.org/drawingml/2006/main" xmlns:r="http://schemas.openxmlformats.org/officeDocument/2006/relationships" xmlns:p="http://schemas.openxmlformats.org/presentationml/2006/main">
+  <p:cSld>
+    <p:spTree>
+      <p:nvGrpSpPr>
+        <p:cNvPr id="1" name=""/>
+        <p:cNvGrpSpPr/>
+        <p:nvPr/>
+      </p:nvGrpSpPr>
+      <p:grpSpPr>
+        <a:xfrm>
+          <a:off x="0" y="0"/>
+          <a:ext cx="0" cy="0"/>
+          <a:chOff x="0" y="0"/>
+          <a:chExt cx="0" cy="0"/>
+        </a:xfrm>
+      </p:grpSpPr>
+      <p:sp>
+        <p:nvSpPr>
+          <p:cNvPr id="2" name="Title 1"/>
+          <p:cNvSpPr>
+            <a:spLocks noGrp="1"/>
+          </p:cNvSpPr>
+          <p:nvPr>
+            <p:ph type="title"/>
+          </p:nvPr>
+        </p:nvSpPr>
+        <p:spPr/>
+        <p:txBody>
+          <a:bodyPr/>
+          <a:lstStyle/>
+          <a:p>
+            <a:r>
               <a:rPr lang="en-CA" dirty="0" smtClean="0"/>
               <a:t>Some case studies</a:t>
             </a:r>
@@ -3307,6 +3544,517 @@
     <p:extLst>
       <p:ext uri="{BB962C8B-B14F-4D97-AF65-F5344CB8AC3E}">
         <p14:creationId xmlns:p14="http://schemas.microsoft.com/office/powerpoint/2010/main" val="1781542368"/>
+      </p:ext>
+    </p:extLst>
+  </p:cSld>
+  <p:clrMapOvr>
+    <a:masterClrMapping/>
+  </p:clrMapOvr>
+  <p:timing>
+    <p:tnLst>
+      <p:par>
+        <p:cTn id="1" dur="indefinite" restart="never" nodeType="tmRoot"/>
+      </p:par>
+    </p:tnLst>
+  </p:timing>
+</p:sld>
+</file>
+
+<file path=ppt/slides/slide13.xml><?xml version="1.0" encoding="utf-8"?>
+<p:sld xmlns:a="http://schemas.openxmlformats.org/drawingml/2006/main" xmlns:r="http://schemas.openxmlformats.org/officeDocument/2006/relationships" xmlns:p="http://schemas.openxmlformats.org/presentationml/2006/main">
+  <p:cSld>
+    <p:spTree>
+      <p:nvGrpSpPr>
+        <p:cNvPr id="1" name=""/>
+        <p:cNvGrpSpPr/>
+        <p:nvPr/>
+      </p:nvGrpSpPr>
+      <p:grpSpPr>
+        <a:xfrm>
+          <a:off x="0" y="0"/>
+          <a:ext cx="0" cy="0"/>
+          <a:chOff x="0" y="0"/>
+          <a:chExt cx="0" cy="0"/>
+        </a:xfrm>
+      </p:grpSpPr>
+      <p:sp>
+        <p:nvSpPr>
+          <p:cNvPr id="2" name="Title 1"/>
+          <p:cNvSpPr>
+            <a:spLocks noGrp="1"/>
+          </p:cNvSpPr>
+          <p:nvPr>
+            <p:ph type="title"/>
+          </p:nvPr>
+        </p:nvSpPr>
+        <p:spPr/>
+        <p:txBody>
+          <a:bodyPr/>
+          <a:lstStyle/>
+          <a:p>
+            <a:r>
+              <a:rPr lang="en-CA" dirty="0"/>
+              <a:t>Reynolds’ </a:t>
+            </a:r>
+            <a:r>
+              <a:rPr lang="en-CA" dirty="0" err="1"/>
+              <a:t>Boids</a:t>
+            </a:r>
+            <a:endParaRPr lang="en-CA" dirty="0"/>
+          </a:p>
+        </p:txBody>
+      </p:sp>
+      <p:sp>
+        <p:nvSpPr>
+          <p:cNvPr id="3" name="Content Placeholder 2"/>
+          <p:cNvSpPr>
+            <a:spLocks noGrp="1"/>
+          </p:cNvSpPr>
+          <p:nvPr>
+            <p:ph idx="1"/>
+          </p:nvPr>
+        </p:nvSpPr>
+        <p:spPr/>
+        <p:txBody>
+          <a:bodyPr/>
+          <a:lstStyle/>
+          <a:p>
+            <a:r>
+              <a:rPr lang="en-CA" dirty="0" smtClean="0"/>
+              <a:t>Model of </a:t>
+            </a:r>
+            <a:r>
+              <a:rPr lang="en-CA" smtClean="0"/>
+              <a:t>flocking behaviour</a:t>
+            </a:r>
+            <a:endParaRPr lang="en-CA"/>
+          </a:p>
+        </p:txBody>
+      </p:sp>
+    </p:spTree>
+    <p:extLst>
+      <p:ext uri="{BB962C8B-B14F-4D97-AF65-F5344CB8AC3E}">
+        <p14:creationId xmlns:p14="http://schemas.microsoft.com/office/powerpoint/2010/main" val="2295656722"/>
+      </p:ext>
+    </p:extLst>
+  </p:cSld>
+  <p:clrMapOvr>
+    <a:masterClrMapping/>
+  </p:clrMapOvr>
+</p:sld>
+</file>
+
+<file path=ppt/slides/slide14.xml><?xml version="1.0" encoding="utf-8"?>
+<p:sld xmlns:a="http://schemas.openxmlformats.org/drawingml/2006/main" xmlns:r="http://schemas.openxmlformats.org/officeDocument/2006/relationships" xmlns:p="http://schemas.openxmlformats.org/presentationml/2006/main">
+  <p:cSld>
+    <p:spTree>
+      <p:nvGrpSpPr>
+        <p:cNvPr id="1" name=""/>
+        <p:cNvGrpSpPr/>
+        <p:nvPr/>
+      </p:nvGrpSpPr>
+      <p:grpSpPr>
+        <a:xfrm>
+          <a:off x="0" y="0"/>
+          <a:ext cx="0" cy="0"/>
+          <a:chOff x="0" y="0"/>
+          <a:chExt cx="0" cy="0"/>
+        </a:xfrm>
+      </p:grpSpPr>
+      <p:sp>
+        <p:nvSpPr>
+          <p:cNvPr id="2" name="Title 1"/>
+          <p:cNvSpPr>
+            <a:spLocks noGrp="1"/>
+          </p:cNvSpPr>
+          <p:nvPr>
+            <p:ph type="title"/>
+          </p:nvPr>
+        </p:nvSpPr>
+        <p:spPr/>
+        <p:txBody>
+          <a:bodyPr/>
+          <a:lstStyle/>
+          <a:p>
+            <a:r>
+              <a:rPr lang="en-CA" dirty="0" smtClean="0"/>
+              <a:t>Reynolds’ </a:t>
+            </a:r>
+            <a:r>
+              <a:rPr lang="en-CA" dirty="0" err="1" smtClean="0"/>
+              <a:t>Boids</a:t>
+            </a:r>
+            <a:endParaRPr lang="en-CA" dirty="0"/>
+          </a:p>
+        </p:txBody>
+      </p:sp>
+      <p:grpSp>
+        <p:nvGrpSpPr>
+          <p:cNvPr id="9" name="Group 8"/>
+          <p:cNvGrpSpPr/>
+          <p:nvPr/>
+        </p:nvGrpSpPr>
+        <p:grpSpPr>
+          <a:xfrm>
+            <a:off x="6450240" y="2771971"/>
+            <a:ext cx="2066925" cy="1756875"/>
+            <a:chOff x="6343648" y="918754"/>
+            <a:chExt cx="2066925" cy="1756875"/>
+          </a:xfrm>
+        </p:grpSpPr>
+        <p:pic>
+          <p:nvPicPr>
+            <p:cNvPr id="6" name="Picture 5"/>
+            <p:cNvPicPr>
+              <a:picLocks noChangeAspect="1"/>
+            </p:cNvPicPr>
+            <p:nvPr/>
+          </p:nvPicPr>
+          <p:blipFill>
+            <a:blip r:embed="rId2">
+              <a:extLst>
+                <a:ext uri="{28A0092B-C50C-407E-A947-70E740481C1C}">
+                  <a14:useLocalDpi xmlns:a14="http://schemas.microsoft.com/office/drawing/2010/main" val="0"/>
+                </a:ext>
+              </a:extLst>
+            </a:blip>
+            <a:stretch>
+              <a:fillRect/>
+            </a:stretch>
+          </p:blipFill>
+          <p:spPr>
+            <a:xfrm>
+              <a:off x="6343648" y="918754"/>
+              <a:ext cx="2066925" cy="1381125"/>
+            </a:xfrm>
+            <a:prstGeom prst="rect">
+              <a:avLst/>
+            </a:prstGeom>
+          </p:spPr>
+        </p:pic>
+        <p:sp>
+          <p:nvSpPr>
+            <p:cNvPr id="8" name="TextBox 7"/>
+            <p:cNvSpPr txBox="1"/>
+            <p:nvPr/>
+          </p:nvSpPr>
+          <p:spPr>
+            <a:xfrm>
+              <a:off x="6343648" y="2275519"/>
+              <a:ext cx="2066925" cy="400110"/>
+            </a:xfrm>
+            <a:prstGeom prst="rect">
+              <a:avLst/>
+            </a:prstGeom>
+            <a:noFill/>
+          </p:spPr>
+          <p:txBody>
+            <a:bodyPr wrap="square" rtlCol="0">
+              <a:spAutoFit/>
+            </a:bodyPr>
+            <a:lstStyle/>
+            <a:p>
+              <a:r>
+                <a:rPr lang="en-CA" sz="1000" dirty="0">
+                  <a:solidFill>
+                    <a:schemeClr val="bg1">
+                      <a:lumMod val="50000"/>
+                    </a:schemeClr>
+                  </a:solidFill>
+                </a:rPr>
+                <a:t>http://www.red3d.com/cwr/boids/images/alignment.gif</a:t>
+              </a:r>
+            </a:p>
+          </p:txBody>
+        </p:sp>
+      </p:grpSp>
+      <p:grpSp>
+        <p:nvGrpSpPr>
+          <p:cNvPr id="11" name="Group 10"/>
+          <p:cNvGrpSpPr/>
+          <p:nvPr/>
+        </p:nvGrpSpPr>
+        <p:grpSpPr>
+          <a:xfrm>
+            <a:off x="6450238" y="865921"/>
+            <a:ext cx="2066925" cy="1784472"/>
+            <a:chOff x="2872060" y="1487396"/>
+            <a:chExt cx="2066925" cy="1784472"/>
+          </a:xfrm>
+        </p:grpSpPr>
+        <p:pic>
+          <p:nvPicPr>
+            <p:cNvPr id="5" name="Picture 4"/>
+            <p:cNvPicPr>
+              <a:picLocks noChangeAspect="1"/>
+            </p:cNvPicPr>
+            <p:nvPr/>
+          </p:nvPicPr>
+          <p:blipFill>
+            <a:blip r:embed="rId3">
+              <a:extLst>
+                <a:ext uri="{28A0092B-C50C-407E-A947-70E740481C1C}">
+                  <a14:useLocalDpi xmlns:a14="http://schemas.microsoft.com/office/drawing/2010/main" val="0"/>
+                </a:ext>
+              </a:extLst>
+            </a:blip>
+            <a:stretch>
+              <a:fillRect/>
+            </a:stretch>
+          </p:blipFill>
+          <p:spPr>
+            <a:xfrm>
+              <a:off x="2872060" y="1487396"/>
+              <a:ext cx="2066925" cy="1381125"/>
+            </a:xfrm>
+            <a:prstGeom prst="rect">
+              <a:avLst/>
+            </a:prstGeom>
+          </p:spPr>
+        </p:pic>
+        <p:sp>
+          <p:nvSpPr>
+            <p:cNvPr id="10" name="TextBox 9"/>
+            <p:cNvSpPr txBox="1"/>
+            <p:nvPr/>
+          </p:nvSpPr>
+          <p:spPr>
+            <a:xfrm>
+              <a:off x="2883763" y="2871758"/>
+              <a:ext cx="2055222" cy="400110"/>
+            </a:xfrm>
+            <a:prstGeom prst="rect">
+              <a:avLst/>
+            </a:prstGeom>
+            <a:noFill/>
+          </p:spPr>
+          <p:txBody>
+            <a:bodyPr wrap="square" rtlCol="0">
+              <a:spAutoFit/>
+            </a:bodyPr>
+            <a:lstStyle/>
+            <a:p>
+              <a:r>
+                <a:rPr lang="en-CA" sz="1000" dirty="0">
+                  <a:solidFill>
+                    <a:schemeClr val="bg1">
+                      <a:lumMod val="50000"/>
+                    </a:schemeClr>
+                  </a:solidFill>
+                </a:rPr>
+                <a:t>http://www.red3d.com/cwr/boids/images/separation.gif</a:t>
+              </a:r>
+            </a:p>
+          </p:txBody>
+        </p:sp>
+      </p:grpSp>
+      <p:grpSp>
+        <p:nvGrpSpPr>
+          <p:cNvPr id="13" name="Group 12"/>
+          <p:cNvGrpSpPr/>
+          <p:nvPr/>
+        </p:nvGrpSpPr>
+        <p:grpSpPr>
+          <a:xfrm>
+            <a:off x="6438673" y="4839831"/>
+            <a:ext cx="2090057" cy="1781235"/>
+            <a:chOff x="3484516" y="3660571"/>
+            <a:chExt cx="2090057" cy="1781235"/>
+          </a:xfrm>
+        </p:grpSpPr>
+        <p:pic>
+          <p:nvPicPr>
+            <p:cNvPr id="7" name="Picture 6"/>
+            <p:cNvPicPr>
+              <a:picLocks noChangeAspect="1"/>
+            </p:cNvPicPr>
+            <p:nvPr/>
+          </p:nvPicPr>
+          <p:blipFill>
+            <a:blip r:embed="rId4">
+              <a:extLst>
+                <a:ext uri="{28A0092B-C50C-407E-A947-70E740481C1C}">
+                  <a14:useLocalDpi xmlns:a14="http://schemas.microsoft.com/office/drawing/2010/main" val="0"/>
+                </a:ext>
+              </a:extLst>
+            </a:blip>
+            <a:stretch>
+              <a:fillRect/>
+            </a:stretch>
+          </p:blipFill>
+          <p:spPr>
+            <a:xfrm>
+              <a:off x="3496083" y="3660571"/>
+              <a:ext cx="2066925" cy="1381125"/>
+            </a:xfrm>
+            <a:prstGeom prst="rect">
+              <a:avLst/>
+            </a:prstGeom>
+          </p:spPr>
+        </p:pic>
+        <p:sp>
+          <p:nvSpPr>
+            <p:cNvPr id="12" name="TextBox 11"/>
+            <p:cNvSpPr txBox="1"/>
+            <p:nvPr/>
+          </p:nvSpPr>
+          <p:spPr>
+            <a:xfrm>
+              <a:off x="3484516" y="5041696"/>
+              <a:ext cx="2090057" cy="400110"/>
+            </a:xfrm>
+            <a:prstGeom prst="rect">
+              <a:avLst/>
+            </a:prstGeom>
+            <a:noFill/>
+          </p:spPr>
+          <p:txBody>
+            <a:bodyPr wrap="square" rtlCol="0">
+              <a:spAutoFit/>
+            </a:bodyPr>
+            <a:lstStyle/>
+            <a:p>
+              <a:r>
+                <a:rPr lang="en-CA" sz="1000" dirty="0">
+                  <a:solidFill>
+                    <a:schemeClr val="bg1">
+                      <a:lumMod val="50000"/>
+                    </a:schemeClr>
+                  </a:solidFill>
+                </a:rPr>
+                <a:t>http://www.red3d.com/cwr/boids/images/cohesion.gif</a:t>
+              </a:r>
+            </a:p>
+          </p:txBody>
+        </p:sp>
+      </p:grpSp>
+      <p:sp>
+        <p:nvSpPr>
+          <p:cNvPr id="17" name="Content Placeholder 16"/>
+          <p:cNvSpPr>
+            <a:spLocks noGrp="1"/>
+          </p:cNvSpPr>
+          <p:nvPr>
+            <p:ph idx="1"/>
+          </p:nvPr>
+        </p:nvSpPr>
+        <p:spPr>
+          <a:xfrm>
+            <a:off x="838200" y="1825625"/>
+            <a:ext cx="3918527" cy="4351338"/>
+          </a:xfrm>
+        </p:spPr>
+        <p:txBody>
+          <a:bodyPr/>
+          <a:lstStyle/>
+          <a:p>
+            <a:endParaRPr lang="en-CA" dirty="0"/>
+          </a:p>
+        </p:txBody>
+      </p:sp>
+    </p:spTree>
+    <p:extLst>
+      <p:ext uri="{BB962C8B-B14F-4D97-AF65-F5344CB8AC3E}">
+        <p14:creationId xmlns:p14="http://schemas.microsoft.com/office/powerpoint/2010/main" val="2198591661"/>
+      </p:ext>
+    </p:extLst>
+  </p:cSld>
+  <p:clrMapOvr>
+    <a:masterClrMapping/>
+  </p:clrMapOvr>
+  <p:timing>
+    <p:tnLst>
+      <p:par>
+        <p:cTn id="1" dur="indefinite" restart="never" nodeType="tmRoot"/>
+      </p:par>
+    </p:tnLst>
+  </p:timing>
+</p:sld>
+</file>
+
+<file path=ppt/slides/slide15.xml><?xml version="1.0" encoding="utf-8"?>
+<p:sld xmlns:a="http://schemas.openxmlformats.org/drawingml/2006/main" xmlns:r="http://schemas.openxmlformats.org/officeDocument/2006/relationships" xmlns:p="http://schemas.openxmlformats.org/presentationml/2006/main">
+  <p:cSld>
+    <p:spTree>
+      <p:nvGrpSpPr>
+        <p:cNvPr id="1" name=""/>
+        <p:cNvGrpSpPr/>
+        <p:nvPr/>
+      </p:nvGrpSpPr>
+      <p:grpSpPr>
+        <a:xfrm>
+          <a:off x="0" y="0"/>
+          <a:ext cx="0" cy="0"/>
+          <a:chOff x="0" y="0"/>
+          <a:chExt cx="0" cy="0"/>
+        </a:xfrm>
+      </p:grpSpPr>
+      <p:sp>
+        <p:nvSpPr>
+          <p:cNvPr id="2" name="Title 1"/>
+          <p:cNvSpPr>
+            <a:spLocks noGrp="1"/>
+          </p:cNvSpPr>
+          <p:nvPr>
+            <p:ph type="title"/>
+          </p:nvPr>
+        </p:nvSpPr>
+        <p:spPr/>
+        <p:txBody>
+          <a:bodyPr/>
+          <a:lstStyle/>
+          <a:p>
+            <a:r>
+              <a:rPr lang="en-CA" dirty="0"/>
+              <a:t>Reynolds’ </a:t>
+            </a:r>
+            <a:r>
+              <a:rPr lang="en-CA" dirty="0" err="1"/>
+              <a:t>Boids</a:t>
+            </a:r>
+            <a:endParaRPr lang="en-CA" dirty="0"/>
+          </a:p>
+        </p:txBody>
+      </p:sp>
+      <p:sp>
+        <p:nvSpPr>
+          <p:cNvPr id="11" name="Content Placeholder 10"/>
+          <p:cNvSpPr>
+            <a:spLocks noGrp="1"/>
+          </p:cNvSpPr>
+          <p:nvPr>
+            <p:ph idx="1"/>
+          </p:nvPr>
+        </p:nvSpPr>
+        <p:spPr/>
+        <p:txBody>
+          <a:bodyPr/>
+          <a:lstStyle/>
+          <a:p>
+            <a:r>
+              <a:rPr lang="en-CA" dirty="0">
+                <a:hlinkClick r:id="rId2"/>
+              </a:rPr>
+              <a:t>https://</a:t>
+            </a:r>
+            <a:r>
+              <a:rPr lang="en-CA" dirty="0" smtClean="0">
+                <a:hlinkClick r:id="rId2"/>
+              </a:rPr>
+              <a:t>youtu.be/GUkjC-69vaw</a:t>
+            </a:r>
+            <a:r>
+              <a:rPr lang="en-CA" dirty="0" smtClean="0"/>
+              <a:t> </a:t>
+            </a:r>
+            <a:endParaRPr lang="en-CA" dirty="0"/>
+          </a:p>
+        </p:txBody>
+      </p:sp>
+    </p:spTree>
+    <p:extLst>
+      <p:ext uri="{BB962C8B-B14F-4D97-AF65-F5344CB8AC3E}">
+        <p14:creationId xmlns:p14="http://schemas.microsoft.com/office/powerpoint/2010/main" val="1224780065"/>
       </p:ext>
     </p:extLst>
   </p:cSld>
@@ -4829,10 +5577,10 @@
         </p:nvGrpSpPr>
         <p:grpSpPr>
           <a:xfrm>
-            <a:off x="397919" y="3029915"/>
-            <a:ext cx="5221332" cy="2646521"/>
-            <a:chOff x="4218758" y="1702514"/>
-            <a:chExt cx="5221332" cy="2646521"/>
+            <a:off x="1046164" y="3038662"/>
+            <a:ext cx="2667000" cy="3005117"/>
+            <a:chOff x="4867003" y="1711261"/>
+            <a:chExt cx="2667000" cy="3005117"/>
           </a:xfrm>
         </p:grpSpPr>
         <p:pic>
@@ -4857,7 +5605,7 @@
           </p:blipFill>
           <p:spPr>
             <a:xfrm>
-              <a:off x="5563688" y="1702514"/>
+              <a:off x="4867003" y="1711261"/>
               <a:ext cx="2667000" cy="2400300"/>
             </a:xfrm>
             <a:prstGeom prst="rect">
@@ -4873,8 +5621,8 @@
           </p:nvSpPr>
           <p:spPr>
             <a:xfrm>
-              <a:off x="4218758" y="4102814"/>
-              <a:ext cx="5221332" cy="246221"/>
+              <a:off x="5236868" y="4162380"/>
+              <a:ext cx="1927270" cy="553998"/>
             </a:xfrm>
             <a:prstGeom prst="rect">
               <a:avLst/>
@@ -5459,10 +6207,9 @@
           <a:lstStyle/>
           <a:p>
             <a:r>
-              <a:rPr lang="en-CA" dirty="0" smtClean="0"/>
-              <a:t>Life-as-it-is</a:t>
-            </a:r>
-            <a:endParaRPr lang="en-CA" dirty="0"/>
+              <a:rPr lang="en-CA" dirty="0"/>
+              <a:t>A few ideas behind AL</a:t>
+            </a:r>
           </a:p>
         </p:txBody>
       </p:sp>
@@ -5481,14 +6228,29 @@
           <a:bodyPr/>
           <a:lstStyle/>
           <a:p>
-            <a:endParaRPr lang="en-CA" dirty="0"/>
+            <a:r>
+              <a:rPr lang="en-CA" dirty="0"/>
+              <a:t>Life is a process</a:t>
+            </a:r>
+          </a:p>
+          <a:p>
+            <a:r>
+              <a:rPr lang="en-CA" dirty="0"/>
+              <a:t>Life can be explored constructively</a:t>
+            </a:r>
+          </a:p>
+          <a:p>
+            <a:r>
+              <a:rPr lang="en-CA" dirty="0"/>
+              <a:t>‘Life’ is independent of substrate</a:t>
+            </a:r>
           </a:p>
         </p:txBody>
       </p:sp>
     </p:spTree>
     <p:extLst>
       <p:ext uri="{BB962C8B-B14F-4D97-AF65-F5344CB8AC3E}">
-        <p14:creationId xmlns:p14="http://schemas.microsoft.com/office/powerpoint/2010/main" val="2279785290"/>
+        <p14:creationId xmlns:p14="http://schemas.microsoft.com/office/powerpoint/2010/main" val="198058602"/>
       </p:ext>
     </p:extLst>
   </p:cSld>
@@ -5538,9 +6300,10 @@
           <a:lstStyle/>
           <a:p>
             <a:r>
-              <a:rPr lang="en-CA" dirty="0"/>
-              <a:t>Life-as-it-could-be</a:t>
-            </a:r>
+              <a:rPr lang="en-CA" dirty="0" smtClean="0"/>
+              <a:t>Life-as-it-is</a:t>
+            </a:r>
+            <a:endParaRPr lang="en-CA" dirty="0"/>
           </a:p>
         </p:txBody>
       </p:sp>
@@ -5560,12 +6323,14 @@
           <a:lstStyle/>
           <a:p>
             <a:r>
-              <a:rPr lang="en-CA" dirty="0"/>
-              <a:t>The constructive nature of AL allows us to investigate novel forms of </a:t>
-            </a:r>
-            <a:r>
               <a:rPr lang="en-CA" dirty="0" smtClean="0"/>
-              <a:t>life.</a:t>
+              <a:t>AL contributes models to biological sciences</a:t>
+            </a:r>
+          </a:p>
+          <a:p>
+            <a:r>
+              <a:rPr lang="en-CA" dirty="0" smtClean="0"/>
+              <a:t>AL refines its models with contributions of biological sciences</a:t>
             </a:r>
             <a:endParaRPr lang="en-CA" dirty="0"/>
           </a:p>
@@ -5574,7 +6339,7 @@
     </p:spTree>
     <p:extLst>
       <p:ext uri="{BB962C8B-B14F-4D97-AF65-F5344CB8AC3E}">
-        <p14:creationId xmlns:p14="http://schemas.microsoft.com/office/powerpoint/2010/main" val="2241344431"/>
+        <p14:creationId xmlns:p14="http://schemas.microsoft.com/office/powerpoint/2010/main" val="2279785290"/>
       </p:ext>
     </p:extLst>
   </p:cSld>
@@ -5625,7 +6390,7 @@
           <a:p>
             <a:r>
               <a:rPr lang="en-CA" dirty="0"/>
-              <a:t>A few ideas behind AL</a:t>
+              <a:t>Life-as-it-could-be</a:t>
             </a:r>
           </a:p>
         </p:txBody>
@@ -5646,28 +6411,23 @@
           <a:lstStyle/>
           <a:p>
             <a:r>
-              <a:rPr lang="en-CA" dirty="0"/>
-              <a:t>Life is a process</a:t>
-            </a:r>
-          </a:p>
-          <a:p>
-            <a:r>
-              <a:rPr lang="en-CA" dirty="0"/>
-              <a:t>Life can be explored constructively</a:t>
-            </a:r>
-          </a:p>
-          <a:p>
-            <a:r>
-              <a:rPr lang="en-CA" dirty="0"/>
-              <a:t>‘Life’ is independent of substrate</a:t>
-            </a:r>
+              <a:rPr lang="en-CA" dirty="0" smtClean="0"/>
+              <a:t>Constructive approach allows exploration of novel forms of life</a:t>
+            </a:r>
+          </a:p>
+          <a:p>
+            <a:r>
+              <a:rPr lang="en-CA" dirty="0" smtClean="0"/>
+              <a:t>Low-level rules and agent interaction produce life-like complexity</a:t>
+            </a:r>
+            <a:endParaRPr lang="en-CA" dirty="0"/>
           </a:p>
         </p:txBody>
       </p:sp>
     </p:spTree>
     <p:extLst>
       <p:ext uri="{BB962C8B-B14F-4D97-AF65-F5344CB8AC3E}">
-        <p14:creationId xmlns:p14="http://schemas.microsoft.com/office/powerpoint/2010/main" val="198058602"/>
+        <p14:creationId xmlns:p14="http://schemas.microsoft.com/office/powerpoint/2010/main" val="2241344431"/>
       </p:ext>
     </p:extLst>
   </p:cSld>
@@ -5718,6 +6478,106 @@
           <a:p>
             <a:r>
               <a:rPr lang="en-CA" dirty="0" smtClean="0"/>
+              <a:t>Langton’s Features of AL Models (1988)</a:t>
+            </a:r>
+            <a:endParaRPr lang="en-CA" dirty="0"/>
+          </a:p>
+        </p:txBody>
+      </p:sp>
+      <p:sp>
+        <p:nvSpPr>
+          <p:cNvPr id="3" name="Content Placeholder 2"/>
+          <p:cNvSpPr>
+            <a:spLocks noGrp="1"/>
+          </p:cNvSpPr>
+          <p:nvPr>
+            <p:ph idx="1"/>
+          </p:nvPr>
+        </p:nvSpPr>
+        <p:spPr/>
+        <p:txBody>
+          <a:bodyPr/>
+          <a:lstStyle/>
+          <a:p>
+            <a:r>
+              <a:rPr lang="en-CA" dirty="0" smtClean="0"/>
+              <a:t>Ensembles, or ecosystems, of agents, or organisms, interacting</a:t>
+            </a:r>
+          </a:p>
+          <a:p>
+            <a:r>
+              <a:rPr lang="en-CA" dirty="0" smtClean="0"/>
+              <a:t>No privileged agents – No central control</a:t>
+            </a:r>
+          </a:p>
+          <a:p>
+            <a:r>
+              <a:rPr lang="en-CA" dirty="0" smtClean="0"/>
+              <a:t>Agents choose how to interact with agents and the environment</a:t>
+            </a:r>
+          </a:p>
+          <a:p>
+            <a:r>
+              <a:rPr lang="en-CA" dirty="0" smtClean="0"/>
+              <a:t>No global rules – Only individual rules</a:t>
+            </a:r>
+          </a:p>
+          <a:p>
+            <a:r>
+              <a:rPr lang="en-CA" dirty="0" smtClean="0"/>
+              <a:t>Emergent phenomena are patterns that transcend individuals</a:t>
+            </a:r>
+            <a:endParaRPr lang="en-CA" dirty="0"/>
+          </a:p>
+        </p:txBody>
+      </p:sp>
+    </p:spTree>
+    <p:extLst>
+      <p:ext uri="{BB962C8B-B14F-4D97-AF65-F5344CB8AC3E}">
+        <p14:creationId xmlns:p14="http://schemas.microsoft.com/office/powerpoint/2010/main" val="3015421867"/>
+      </p:ext>
+    </p:extLst>
+  </p:cSld>
+  <p:clrMapOvr>
+    <a:masterClrMapping/>
+  </p:clrMapOvr>
+</p:sld>
+</file>
+
+<file path=ppt/slides/slide9.xml><?xml version="1.0" encoding="utf-8"?>
+<p:sld xmlns:a="http://schemas.openxmlformats.org/drawingml/2006/main" xmlns:r="http://schemas.openxmlformats.org/officeDocument/2006/relationships" xmlns:p="http://schemas.openxmlformats.org/presentationml/2006/main">
+  <p:cSld>
+    <p:spTree>
+      <p:nvGrpSpPr>
+        <p:cNvPr id="1" name=""/>
+        <p:cNvGrpSpPr/>
+        <p:nvPr/>
+      </p:nvGrpSpPr>
+      <p:grpSpPr>
+        <a:xfrm>
+          <a:off x="0" y="0"/>
+          <a:ext cx="0" cy="0"/>
+          <a:chOff x="0" y="0"/>
+          <a:chExt cx="0" cy="0"/>
+        </a:xfrm>
+      </p:grpSpPr>
+      <p:sp>
+        <p:nvSpPr>
+          <p:cNvPr id="2" name="Title 1"/>
+          <p:cNvSpPr>
+            <a:spLocks noGrp="1"/>
+          </p:cNvSpPr>
+          <p:nvPr>
+            <p:ph type="title"/>
+          </p:nvPr>
+        </p:nvSpPr>
+        <p:spPr/>
+        <p:txBody>
+          <a:bodyPr/>
+          <a:lstStyle/>
+          <a:p>
+            <a:r>
+              <a:rPr lang="en-CA" dirty="0" smtClean="0"/>
               <a:t>Two categories of AL</a:t>
             </a:r>
             <a:endParaRPr lang="en-CA" dirty="0"/>
@@ -5800,10 +6660,10 @@
         </p:nvGrpSpPr>
         <p:grpSpPr>
           <a:xfrm>
-            <a:off x="2389414" y="3181239"/>
-            <a:ext cx="2677885" cy="3039653"/>
-            <a:chOff x="963386" y="3048000"/>
-            <a:chExt cx="2677885" cy="3039653"/>
+            <a:off x="2389414" y="3181240"/>
+            <a:ext cx="2677885" cy="3039652"/>
+            <a:chOff x="963386" y="3048001"/>
+            <a:chExt cx="2677885" cy="3039652"/>
           </a:xfrm>
         </p:grpSpPr>
         <p:pic>
@@ -5822,13 +6682,13 @@
                 </a:ext>
               </a:extLst>
             </a:blip>
-            <a:srcRect l="26304" t="18062" r="26095" b="14931"/>
+            <a:srcRect l="26304" t="18062" r="26095" b="16134"/>
             <a:stretch/>
           </p:blipFill>
           <p:spPr>
             <a:xfrm>
-              <a:off x="1066800" y="3048000"/>
-              <a:ext cx="2471058" cy="2329543"/>
+              <a:off x="1066800" y="3048001"/>
+              <a:ext cx="2471058" cy="2287744"/>
             </a:xfrm>
             <a:prstGeom prst="rect">
               <a:avLst/>
@@ -6307,129 +7167,6 @@
 </p:sld>
 </file>
 
-<file path=ppt/slides/slide9.xml><?xml version="1.0" encoding="utf-8"?>
-<p:sld xmlns:a="http://schemas.openxmlformats.org/drawingml/2006/main" xmlns:r="http://schemas.openxmlformats.org/officeDocument/2006/relationships" xmlns:p="http://schemas.openxmlformats.org/presentationml/2006/main">
-  <p:cSld>
-    <p:spTree>
-      <p:nvGrpSpPr>
-        <p:cNvPr id="1" name=""/>
-        <p:cNvGrpSpPr/>
-        <p:nvPr/>
-      </p:nvGrpSpPr>
-      <p:grpSpPr>
-        <a:xfrm>
-          <a:off x="0" y="0"/>
-          <a:ext cx="0" cy="0"/>
-          <a:chOff x="0" y="0"/>
-          <a:chExt cx="0" cy="0"/>
-        </a:xfrm>
-      </p:grpSpPr>
-      <p:sp>
-        <p:nvSpPr>
-          <p:cNvPr id="2" name="Title 1"/>
-          <p:cNvSpPr>
-            <a:spLocks noGrp="1"/>
-          </p:cNvSpPr>
-          <p:nvPr>
-            <p:ph type="title"/>
-          </p:nvPr>
-        </p:nvSpPr>
-        <p:spPr/>
-        <p:txBody>
-          <a:bodyPr/>
-          <a:lstStyle/>
-          <a:p>
-            <a:r>
-              <a:rPr lang="en-CA" dirty="0"/>
-              <a:t>Some criteria for life [Farmer and Belin, 1991]</a:t>
-            </a:r>
-          </a:p>
-        </p:txBody>
-      </p:sp>
-      <p:sp>
-        <p:nvSpPr>
-          <p:cNvPr id="3" name="Content Placeholder 2"/>
-          <p:cNvSpPr>
-            <a:spLocks noGrp="1"/>
-          </p:cNvSpPr>
-          <p:nvPr>
-            <p:ph idx="1"/>
-          </p:nvPr>
-        </p:nvSpPr>
-        <p:spPr/>
-        <p:txBody>
-          <a:bodyPr/>
-          <a:lstStyle/>
-          <a:p>
-            <a:r>
-              <a:rPr lang="en-CA" dirty="0"/>
-              <a:t>Life is a pattern, not an object</a:t>
-            </a:r>
-          </a:p>
-          <a:p>
-            <a:r>
-              <a:rPr lang="en-CA" dirty="0"/>
-              <a:t>Life involves self-reproduction</a:t>
-            </a:r>
-          </a:p>
-          <a:p>
-            <a:r>
-              <a:rPr lang="en-CA" dirty="0"/>
-              <a:t>Information storage of a self-representation</a:t>
-            </a:r>
-          </a:p>
-          <a:p>
-            <a:r>
-              <a:rPr lang="en-CA" dirty="0"/>
-              <a:t>Metabolism</a:t>
-            </a:r>
-          </a:p>
-          <a:p>
-            <a:r>
-              <a:rPr lang="en-CA" dirty="0"/>
-              <a:t>Interaction with the environment</a:t>
-            </a:r>
-          </a:p>
-          <a:p>
-            <a:r>
-              <a:rPr lang="en-CA" dirty="0"/>
-              <a:t>Interdependence of parts</a:t>
-            </a:r>
-          </a:p>
-          <a:p>
-            <a:r>
-              <a:rPr lang="en-CA" dirty="0"/>
-              <a:t>Stability under perturbation</a:t>
-            </a:r>
-          </a:p>
-          <a:p>
-            <a:r>
-              <a:rPr lang="en-CA" dirty="0"/>
-              <a:t>The ability to evolve</a:t>
-            </a:r>
-          </a:p>
-        </p:txBody>
-      </p:sp>
-    </p:spTree>
-    <p:extLst>
-      <p:ext uri="{BB962C8B-B14F-4D97-AF65-F5344CB8AC3E}">
-        <p14:creationId xmlns:p14="http://schemas.microsoft.com/office/powerpoint/2010/main" val="2266974575"/>
-      </p:ext>
-    </p:extLst>
-  </p:cSld>
-  <p:clrMapOvr>
-    <a:masterClrMapping/>
-  </p:clrMapOvr>
-  <p:timing>
-    <p:tnLst>
-      <p:par>
-        <p:cTn id="1" dur="indefinite" restart="never" nodeType="tmRoot"/>
-      </p:par>
-    </p:tnLst>
-  </p:timing>
-</p:sld>
-</file>
-
 <file path=ppt/theme/theme1.xml><?xml version="1.0" encoding="utf-8"?>
 <a:theme xmlns:a="http://schemas.openxmlformats.org/drawingml/2006/main" name="Office Theme">
   <a:themeElements>

</xml_diff>

<commit_message>
ISC 874 Project - Fixed normalization, now using max distance in any dimension, rather than in each
</commit_message>
<xml_diff>
--- a/CISC879/ChapterPresentation/LectureSlidesCh8.pptx
+++ b/CISC879/ChapterPresentation/LectureSlidesCh8.pptx
@@ -5,7 +5,7 @@
     <p:sldMasterId id="2147483660" r:id="rId1"/>
   </p:sldMasterIdLst>
   <p:notesMasterIdLst>
-    <p:notesMasterId r:id="rId44"/>
+    <p:notesMasterId r:id="rId43"/>
   </p:notesMasterIdLst>
   <p:sldIdLst>
     <p:sldId id="256" r:id="rId2"/>
@@ -49,7 +49,6 @@
     <p:sldId id="300" r:id="rId40"/>
     <p:sldId id="301" r:id="rId41"/>
     <p:sldId id="307" r:id="rId42"/>
-    <p:sldId id="302" r:id="rId43"/>
   </p:sldIdLst>
   <p:sldSz cx="12192000" cy="6858000"/>
   <p:notesSz cx="6858000" cy="9144000"/>
@@ -198,7 +197,6 @@
             <p14:sldId id="300"/>
             <p14:sldId id="301"/>
             <p14:sldId id="307"/>
-            <p14:sldId id="302"/>
           </p14:sldIdLst>
         </p14:section>
       </p14:sectionLst>
@@ -340,11 +338,11 @@
           <c:showPercent val="0"/>
           <c:showBubbleSize val="0"/>
         </c:dLbls>
-        <c:axId val="317610992"/>
-        <c:axId val="317614912"/>
+        <c:axId val="144310136"/>
+        <c:axId val="144311312"/>
       </c:radarChart>
       <c:catAx>
-        <c:axId val="317610992"/>
+        <c:axId val="144310136"/>
         <c:scaling>
           <c:orientation val="minMax"/>
         </c:scaling>
@@ -384,7 +382,7 @@
             <a:endParaRPr lang="en-US"/>
           </a:p>
         </c:txPr>
-        <c:crossAx val="317614912"/>
+        <c:crossAx val="144311312"/>
         <c:crosses val="autoZero"/>
         <c:auto val="1"/>
         <c:lblAlgn val="ctr"/>
@@ -392,7 +390,7 @@
         <c:noMultiLvlLbl val="0"/>
       </c:catAx>
       <c:valAx>
-        <c:axId val="317614912"/>
+        <c:axId val="144311312"/>
         <c:scaling>
           <c:orientation val="minMax"/>
           <c:max val="10"/>
@@ -414,7 +412,7 @@
         <c:majorTickMark val="none"/>
         <c:minorTickMark val="none"/>
         <c:tickLblPos val="nextTo"/>
-        <c:crossAx val="317610992"/>
+        <c:crossAx val="144310136"/>
         <c:crosses val="autoZero"/>
         <c:crossBetween val="between"/>
         <c:majorUnit val="2"/>
@@ -585,11 +583,11 @@
           <c:showPercent val="0"/>
           <c:showBubbleSize val="0"/>
         </c:dLbls>
-        <c:axId val="317610208"/>
-        <c:axId val="317615696"/>
+        <c:axId val="144311704"/>
+        <c:axId val="144312096"/>
       </c:radarChart>
       <c:catAx>
-        <c:axId val="317610208"/>
+        <c:axId val="144311704"/>
         <c:scaling>
           <c:orientation val="minMax"/>
         </c:scaling>
@@ -629,7 +627,7 @@
             <a:endParaRPr lang="en-US"/>
           </a:p>
         </c:txPr>
-        <c:crossAx val="317615696"/>
+        <c:crossAx val="144312096"/>
         <c:crosses val="autoZero"/>
         <c:auto val="1"/>
         <c:lblAlgn val="ctr"/>
@@ -637,7 +635,7 @@
         <c:noMultiLvlLbl val="0"/>
       </c:catAx>
       <c:valAx>
-        <c:axId val="317615696"/>
+        <c:axId val="144312096"/>
         <c:scaling>
           <c:orientation val="minMax"/>
           <c:max val="10"/>
@@ -659,7 +657,7 @@
         <c:majorTickMark val="none"/>
         <c:minorTickMark val="none"/>
         <c:tickLblPos val="nextTo"/>
-        <c:crossAx val="317610208"/>
+        <c:crossAx val="144311704"/>
         <c:crosses val="autoZero"/>
         <c:crossBetween val="between"/>
         <c:majorUnit val="2"/>
@@ -829,11 +827,11 @@
           <c:showPercent val="0"/>
           <c:showBubbleSize val="0"/>
         </c:dLbls>
-        <c:axId val="317616088"/>
-        <c:axId val="317609424"/>
+        <c:axId val="144309744"/>
+        <c:axId val="144313664"/>
       </c:radarChart>
       <c:catAx>
-        <c:axId val="317616088"/>
+        <c:axId val="144309744"/>
         <c:scaling>
           <c:orientation val="minMax"/>
         </c:scaling>
@@ -873,7 +871,7 @@
             <a:endParaRPr lang="en-US"/>
           </a:p>
         </c:txPr>
-        <c:crossAx val="317609424"/>
+        <c:crossAx val="144313664"/>
         <c:crosses val="autoZero"/>
         <c:auto val="1"/>
         <c:lblAlgn val="ctr"/>
@@ -881,7 +879,7 @@
         <c:noMultiLvlLbl val="0"/>
       </c:catAx>
       <c:valAx>
-        <c:axId val="317609424"/>
+        <c:axId val="144313664"/>
         <c:scaling>
           <c:orientation val="minMax"/>
         </c:scaling>
@@ -902,7 +900,7 @@
         <c:majorTickMark val="none"/>
         <c:minorTickMark val="none"/>
         <c:tickLblPos val="nextTo"/>
-        <c:crossAx val="317616088"/>
+        <c:crossAx val="144309744"/>
         <c:crosses val="autoZero"/>
         <c:crossBetween val="between"/>
         <c:majorUnit val="2"/>
@@ -1072,11 +1070,11 @@
           <c:showPercent val="0"/>
           <c:showBubbleSize val="0"/>
         </c:dLbls>
-        <c:axId val="317605896"/>
-        <c:axId val="317614128"/>
+        <c:axId val="144314056"/>
+        <c:axId val="144306608"/>
       </c:radarChart>
       <c:catAx>
-        <c:axId val="317605896"/>
+        <c:axId val="144314056"/>
         <c:scaling>
           <c:orientation val="minMax"/>
         </c:scaling>
@@ -1116,7 +1114,7 @@
             <a:endParaRPr lang="en-US"/>
           </a:p>
         </c:txPr>
-        <c:crossAx val="317614128"/>
+        <c:crossAx val="144306608"/>
         <c:crosses val="autoZero"/>
         <c:auto val="1"/>
         <c:lblAlgn val="ctr"/>
@@ -1124,7 +1122,7 @@
         <c:noMultiLvlLbl val="0"/>
       </c:catAx>
       <c:valAx>
-        <c:axId val="317614128"/>
+        <c:axId val="144306608"/>
         <c:scaling>
           <c:orientation val="minMax"/>
           <c:max val="10"/>
@@ -1146,7 +1144,7 @@
         <c:majorTickMark val="none"/>
         <c:minorTickMark val="none"/>
         <c:tickLblPos val="nextTo"/>
-        <c:crossAx val="317605896"/>
+        <c:crossAx val="144314056"/>
         <c:crosses val="autoZero"/>
         <c:crossBetween val="between"/>
         <c:majorUnit val="2"/>
@@ -38865,1223 +38863,6 @@
 </p:sld>
 </file>
 
-<file path=ppt/slides/slide42.xml><?xml version="1.0" encoding="utf-8"?>
-<p:sld xmlns:a="http://schemas.openxmlformats.org/drawingml/2006/main" xmlns:r="http://schemas.openxmlformats.org/officeDocument/2006/relationships" xmlns:p="http://schemas.openxmlformats.org/presentationml/2006/main">
-  <p:cSld>
-    <p:spTree>
-      <p:nvGrpSpPr>
-        <p:cNvPr id="1" name=""/>
-        <p:cNvGrpSpPr/>
-        <p:nvPr/>
-      </p:nvGrpSpPr>
-      <p:grpSpPr>
-        <a:xfrm>
-          <a:off x="0" y="0"/>
-          <a:ext cx="0" cy="0"/>
-          <a:chOff x="0" y="0"/>
-          <a:chExt cx="0" cy="0"/>
-        </a:xfrm>
-      </p:grpSpPr>
-      <p:sp>
-        <p:nvSpPr>
-          <p:cNvPr id="2" name="Title 1"/>
-          <p:cNvSpPr>
-            <a:spLocks noGrp="1"/>
-          </p:cNvSpPr>
-          <p:nvPr>
-            <p:ph type="title"/>
-          </p:nvPr>
-        </p:nvSpPr>
-        <p:spPr/>
-        <p:txBody>
-          <a:bodyPr/>
-          <a:lstStyle/>
-          <a:p>
-            <a:r>
-              <a:rPr lang="en-CA" dirty="0" smtClean="0"/>
-              <a:t>Farmer and Belin’s Criteria</a:t>
-            </a:r>
-            <a:endParaRPr lang="en-CA" dirty="0"/>
-          </a:p>
-        </p:txBody>
-      </p:sp>
-      <p:sp>
-        <p:nvSpPr>
-          <p:cNvPr id="3" name="Content Placeholder 2"/>
-          <p:cNvSpPr>
-            <a:spLocks noGrp="1"/>
-          </p:cNvSpPr>
-          <p:nvPr>
-            <p:ph idx="1"/>
-          </p:nvPr>
-        </p:nvSpPr>
-        <p:spPr>
-          <a:xfrm>
-            <a:off x="838199" y="1825625"/>
-            <a:ext cx="6866299" cy="4351338"/>
-          </a:xfrm>
-        </p:spPr>
-        <p:txBody>
-          <a:bodyPr>
-            <a:normAutofit/>
-          </a:bodyPr>
-          <a:lstStyle/>
-          <a:p>
-            <a:r>
-              <a:rPr lang="en-CA" dirty="0" smtClean="0"/>
-              <a:t>Pattern</a:t>
-            </a:r>
-            <a:r>
-              <a:rPr lang="en-CA" dirty="0"/>
-              <a:t>, not an object</a:t>
-            </a:r>
-          </a:p>
-          <a:p>
-            <a:r>
-              <a:rPr lang="en-CA" dirty="0" smtClean="0"/>
-              <a:t>Self-reproduction</a:t>
-            </a:r>
-            <a:endParaRPr lang="en-CA" dirty="0"/>
-          </a:p>
-          <a:p>
-            <a:r>
-              <a:rPr lang="en-CA" dirty="0"/>
-              <a:t>Information storage of a self-representation</a:t>
-            </a:r>
-          </a:p>
-          <a:p>
-            <a:r>
-              <a:rPr lang="en-CA" dirty="0"/>
-              <a:t>Metabolism</a:t>
-            </a:r>
-          </a:p>
-          <a:p>
-            <a:r>
-              <a:rPr lang="en-CA" dirty="0"/>
-              <a:t>Interaction with the environment</a:t>
-            </a:r>
-          </a:p>
-          <a:p>
-            <a:r>
-              <a:rPr lang="en-CA" dirty="0"/>
-              <a:t>Interdependence of parts</a:t>
-            </a:r>
-          </a:p>
-          <a:p>
-            <a:r>
-              <a:rPr lang="en-CA" dirty="0"/>
-              <a:t>Stability under perturbation</a:t>
-            </a:r>
-          </a:p>
-          <a:p>
-            <a:r>
-              <a:rPr lang="en-CA" dirty="0"/>
-              <a:t>The ability to evolve</a:t>
-            </a:r>
-          </a:p>
-          <a:p>
-            <a:endParaRPr lang="en-CA" dirty="0"/>
-          </a:p>
-        </p:txBody>
-      </p:sp>
-      <p:grpSp>
-        <p:nvGrpSpPr>
-          <p:cNvPr id="11" name="Group 10"/>
-          <p:cNvGrpSpPr/>
-          <p:nvPr/>
-        </p:nvGrpSpPr>
-        <p:grpSpPr>
-          <a:xfrm>
-            <a:off x="8148120" y="1627317"/>
-            <a:ext cx="903941" cy="657256"/>
-            <a:chOff x="8166226" y="1699741"/>
-            <a:chExt cx="903941" cy="657256"/>
-          </a:xfrm>
-        </p:grpSpPr>
-        <p:sp>
-          <p:nvSpPr>
-            <p:cNvPr id="4" name="Rectangle 3"/>
-            <p:cNvSpPr/>
-            <p:nvPr/>
-          </p:nvSpPr>
-          <p:spPr>
-            <a:xfrm>
-              <a:off x="8274859" y="1888997"/>
-              <a:ext cx="468000" cy="468000"/>
-            </a:xfrm>
-            <a:prstGeom prst="rect">
-              <a:avLst/>
-            </a:prstGeom>
-            <a:noFill/>
-            <a:ln w="28575">
-              <a:solidFill>
-                <a:schemeClr val="tx1"/>
-              </a:solidFill>
-            </a:ln>
-          </p:spPr>
-          <p:style>
-            <a:lnRef idx="2">
-              <a:schemeClr val="accent1">
-                <a:shade val="50000"/>
-              </a:schemeClr>
-            </a:lnRef>
-            <a:fillRef idx="1">
-              <a:schemeClr val="accent1"/>
-            </a:fillRef>
-            <a:effectRef idx="0">
-              <a:schemeClr val="accent1"/>
-            </a:effectRef>
-            <a:fontRef idx="minor">
-              <a:schemeClr val="lt1"/>
-            </a:fontRef>
-          </p:style>
-          <p:txBody>
-            <a:bodyPr rtlCol="0" anchor="ctr"/>
-            <a:lstStyle/>
-            <a:p>
-              <a:pPr algn="ctr"/>
-              <a:endParaRPr lang="en-CA"/>
-            </a:p>
-          </p:txBody>
-        </p:sp>
-        <p:cxnSp>
-          <p:nvCxnSpPr>
-            <p:cNvPr id="6" name="Straight Connector 5"/>
-            <p:cNvCxnSpPr/>
-            <p:nvPr/>
-          </p:nvCxnSpPr>
-          <p:spPr>
-            <a:xfrm>
-              <a:off x="8166226" y="2018923"/>
-              <a:ext cx="342633" cy="283756"/>
-            </a:xfrm>
-            <a:prstGeom prst="line">
-              <a:avLst/>
-            </a:prstGeom>
-            <a:ln w="57150">
-              <a:solidFill>
-                <a:schemeClr val="tx1"/>
-              </a:solidFill>
-            </a:ln>
-          </p:spPr>
-          <p:style>
-            <a:lnRef idx="1">
-              <a:schemeClr val="accent1"/>
-            </a:lnRef>
-            <a:fillRef idx="0">
-              <a:schemeClr val="accent1"/>
-            </a:fillRef>
-            <a:effectRef idx="0">
-              <a:schemeClr val="accent1"/>
-            </a:effectRef>
-            <a:fontRef idx="minor">
-              <a:schemeClr val="tx1"/>
-            </a:fontRef>
-          </p:style>
-        </p:cxnSp>
-        <p:cxnSp>
-          <p:nvCxnSpPr>
-            <p:cNvPr id="8" name="Straight Connector 7"/>
-            <p:cNvCxnSpPr/>
-            <p:nvPr/>
-          </p:nvCxnSpPr>
-          <p:spPr>
-            <a:xfrm flipV="1">
-              <a:off x="8499806" y="1699741"/>
-              <a:ext cx="570361" cy="630097"/>
-            </a:xfrm>
-            <a:prstGeom prst="line">
-              <a:avLst/>
-            </a:prstGeom>
-            <a:ln w="57150">
-              <a:solidFill>
-                <a:schemeClr val="tx1"/>
-              </a:solidFill>
-            </a:ln>
-          </p:spPr>
-          <p:style>
-            <a:lnRef idx="1">
-              <a:schemeClr val="accent1"/>
-            </a:lnRef>
-            <a:fillRef idx="0">
-              <a:schemeClr val="accent1"/>
-            </a:fillRef>
-            <a:effectRef idx="0">
-              <a:schemeClr val="accent1"/>
-            </a:effectRef>
-            <a:fontRef idx="minor">
-              <a:schemeClr val="tx1"/>
-            </a:fontRef>
-          </p:style>
-        </p:cxnSp>
-      </p:grpSp>
-      <p:grpSp>
-        <p:nvGrpSpPr>
-          <p:cNvPr id="12" name="Group 11"/>
-          <p:cNvGrpSpPr/>
-          <p:nvPr/>
-        </p:nvGrpSpPr>
-        <p:grpSpPr>
-          <a:xfrm>
-            <a:off x="8155767" y="3173949"/>
-            <a:ext cx="903941" cy="657256"/>
-            <a:chOff x="8166226" y="1699741"/>
-            <a:chExt cx="903941" cy="657256"/>
-          </a:xfrm>
-        </p:grpSpPr>
-        <p:sp>
-          <p:nvSpPr>
-            <p:cNvPr id="13" name="Rectangle 12"/>
-            <p:cNvSpPr/>
-            <p:nvPr/>
-          </p:nvSpPr>
-          <p:spPr>
-            <a:xfrm>
-              <a:off x="8274859" y="1888997"/>
-              <a:ext cx="468000" cy="468000"/>
-            </a:xfrm>
-            <a:prstGeom prst="rect">
-              <a:avLst/>
-            </a:prstGeom>
-            <a:noFill/>
-            <a:ln w="28575">
-              <a:solidFill>
-                <a:schemeClr val="tx1"/>
-              </a:solidFill>
-            </a:ln>
-          </p:spPr>
-          <p:style>
-            <a:lnRef idx="2">
-              <a:schemeClr val="accent1">
-                <a:shade val="50000"/>
-              </a:schemeClr>
-            </a:lnRef>
-            <a:fillRef idx="1">
-              <a:schemeClr val="accent1"/>
-            </a:fillRef>
-            <a:effectRef idx="0">
-              <a:schemeClr val="accent1"/>
-            </a:effectRef>
-            <a:fontRef idx="minor">
-              <a:schemeClr val="lt1"/>
-            </a:fontRef>
-          </p:style>
-          <p:txBody>
-            <a:bodyPr rtlCol="0" anchor="ctr"/>
-            <a:lstStyle/>
-            <a:p>
-              <a:pPr algn="ctr"/>
-              <a:endParaRPr lang="en-CA"/>
-            </a:p>
-          </p:txBody>
-        </p:sp>
-        <p:cxnSp>
-          <p:nvCxnSpPr>
-            <p:cNvPr id="14" name="Straight Connector 13"/>
-            <p:cNvCxnSpPr/>
-            <p:nvPr/>
-          </p:nvCxnSpPr>
-          <p:spPr>
-            <a:xfrm>
-              <a:off x="8166226" y="2018923"/>
-              <a:ext cx="342633" cy="283756"/>
-            </a:xfrm>
-            <a:prstGeom prst="line">
-              <a:avLst/>
-            </a:prstGeom>
-            <a:ln w="57150">
-              <a:solidFill>
-                <a:schemeClr val="tx1"/>
-              </a:solidFill>
-            </a:ln>
-          </p:spPr>
-          <p:style>
-            <a:lnRef idx="1">
-              <a:schemeClr val="accent1"/>
-            </a:lnRef>
-            <a:fillRef idx="0">
-              <a:schemeClr val="accent1"/>
-            </a:fillRef>
-            <a:effectRef idx="0">
-              <a:schemeClr val="accent1"/>
-            </a:effectRef>
-            <a:fontRef idx="minor">
-              <a:schemeClr val="tx1"/>
-            </a:fontRef>
-          </p:style>
-        </p:cxnSp>
-        <p:cxnSp>
-          <p:nvCxnSpPr>
-            <p:cNvPr id="15" name="Straight Connector 14"/>
-            <p:cNvCxnSpPr/>
-            <p:nvPr/>
-          </p:nvCxnSpPr>
-          <p:spPr>
-            <a:xfrm flipV="1">
-              <a:off x="8499806" y="1699741"/>
-              <a:ext cx="570361" cy="630097"/>
-            </a:xfrm>
-            <a:prstGeom prst="line">
-              <a:avLst/>
-            </a:prstGeom>
-            <a:ln w="57150">
-              <a:solidFill>
-                <a:schemeClr val="tx1"/>
-              </a:solidFill>
-            </a:ln>
-          </p:spPr>
-          <p:style>
-            <a:lnRef idx="1">
-              <a:schemeClr val="accent1"/>
-            </a:lnRef>
-            <a:fillRef idx="0">
-              <a:schemeClr val="accent1"/>
-            </a:fillRef>
-            <a:effectRef idx="0">
-              <a:schemeClr val="accent1"/>
-            </a:effectRef>
-            <a:fontRef idx="minor">
-              <a:schemeClr val="tx1"/>
-            </a:fontRef>
-          </p:style>
-        </p:cxnSp>
-      </p:grpSp>
-      <p:grpSp>
-        <p:nvGrpSpPr>
-          <p:cNvPr id="28" name="Group 27"/>
-          <p:cNvGrpSpPr/>
-          <p:nvPr/>
-        </p:nvGrpSpPr>
-        <p:grpSpPr>
-          <a:xfrm>
-            <a:off x="8154261" y="4201953"/>
-            <a:ext cx="903941" cy="657256"/>
-            <a:chOff x="8166226" y="1699741"/>
-            <a:chExt cx="903941" cy="657256"/>
-          </a:xfrm>
-        </p:grpSpPr>
-        <p:sp>
-          <p:nvSpPr>
-            <p:cNvPr id="29" name="Rectangle 28"/>
-            <p:cNvSpPr/>
-            <p:nvPr/>
-          </p:nvSpPr>
-          <p:spPr>
-            <a:xfrm>
-              <a:off x="8274859" y="1888997"/>
-              <a:ext cx="468000" cy="468000"/>
-            </a:xfrm>
-            <a:prstGeom prst="rect">
-              <a:avLst/>
-            </a:prstGeom>
-            <a:noFill/>
-            <a:ln w="28575">
-              <a:solidFill>
-                <a:schemeClr val="tx1"/>
-              </a:solidFill>
-            </a:ln>
-          </p:spPr>
-          <p:style>
-            <a:lnRef idx="2">
-              <a:schemeClr val="accent1">
-                <a:shade val="50000"/>
-              </a:schemeClr>
-            </a:lnRef>
-            <a:fillRef idx="1">
-              <a:schemeClr val="accent1"/>
-            </a:fillRef>
-            <a:effectRef idx="0">
-              <a:schemeClr val="accent1"/>
-            </a:effectRef>
-            <a:fontRef idx="minor">
-              <a:schemeClr val="lt1"/>
-            </a:fontRef>
-          </p:style>
-          <p:txBody>
-            <a:bodyPr rtlCol="0" anchor="ctr"/>
-            <a:lstStyle/>
-            <a:p>
-              <a:pPr algn="ctr"/>
-              <a:endParaRPr lang="en-CA"/>
-            </a:p>
-          </p:txBody>
-        </p:sp>
-        <p:cxnSp>
-          <p:nvCxnSpPr>
-            <p:cNvPr id="30" name="Straight Connector 29"/>
-            <p:cNvCxnSpPr/>
-            <p:nvPr/>
-          </p:nvCxnSpPr>
-          <p:spPr>
-            <a:xfrm>
-              <a:off x="8166226" y="2018923"/>
-              <a:ext cx="342633" cy="283756"/>
-            </a:xfrm>
-            <a:prstGeom prst="line">
-              <a:avLst/>
-            </a:prstGeom>
-            <a:ln w="57150">
-              <a:solidFill>
-                <a:schemeClr val="tx1"/>
-              </a:solidFill>
-            </a:ln>
-          </p:spPr>
-          <p:style>
-            <a:lnRef idx="1">
-              <a:schemeClr val="accent1"/>
-            </a:lnRef>
-            <a:fillRef idx="0">
-              <a:schemeClr val="accent1"/>
-            </a:fillRef>
-            <a:effectRef idx="0">
-              <a:schemeClr val="accent1"/>
-            </a:effectRef>
-            <a:fontRef idx="minor">
-              <a:schemeClr val="tx1"/>
-            </a:fontRef>
-          </p:style>
-        </p:cxnSp>
-        <p:cxnSp>
-          <p:nvCxnSpPr>
-            <p:cNvPr id="31" name="Straight Connector 30"/>
-            <p:cNvCxnSpPr/>
-            <p:nvPr/>
-          </p:nvCxnSpPr>
-          <p:spPr>
-            <a:xfrm flipV="1">
-              <a:off x="8499806" y="1699741"/>
-              <a:ext cx="570361" cy="630097"/>
-            </a:xfrm>
-            <a:prstGeom prst="line">
-              <a:avLst/>
-            </a:prstGeom>
-            <a:ln w="57150">
-              <a:solidFill>
-                <a:schemeClr val="tx1"/>
-              </a:solidFill>
-            </a:ln>
-          </p:spPr>
-          <p:style>
-            <a:lnRef idx="1">
-              <a:schemeClr val="accent1"/>
-            </a:lnRef>
-            <a:fillRef idx="0">
-              <a:schemeClr val="accent1"/>
-            </a:fillRef>
-            <a:effectRef idx="0">
-              <a:schemeClr val="accent1"/>
-            </a:effectRef>
-            <a:fontRef idx="minor">
-              <a:schemeClr val="tx1"/>
-            </a:fontRef>
-          </p:style>
-        </p:cxnSp>
-      </p:grpSp>
-      <p:grpSp>
-        <p:nvGrpSpPr>
-          <p:cNvPr id="39" name="Group 38"/>
-          <p:cNvGrpSpPr/>
-          <p:nvPr/>
-        </p:nvGrpSpPr>
-        <p:grpSpPr>
-          <a:xfrm>
-            <a:off x="8232154" y="2832889"/>
-            <a:ext cx="486808" cy="475203"/>
-            <a:chOff x="8244087" y="5392054"/>
-            <a:chExt cx="486808" cy="475203"/>
-          </a:xfrm>
-        </p:grpSpPr>
-        <p:grpSp>
-          <p:nvGrpSpPr>
-            <p:cNvPr id="40" name="Group 39"/>
-            <p:cNvGrpSpPr/>
-            <p:nvPr/>
-          </p:nvGrpSpPr>
-          <p:grpSpPr>
-            <a:xfrm>
-              <a:off x="8244087" y="5392054"/>
-              <a:ext cx="486807" cy="475203"/>
-              <a:chOff x="8256052" y="1888997"/>
-              <a:chExt cx="486807" cy="475203"/>
-            </a:xfrm>
-          </p:grpSpPr>
-          <p:sp>
-            <p:nvSpPr>
-              <p:cNvPr id="43" name="Rectangle 42"/>
-              <p:cNvSpPr/>
-              <p:nvPr/>
-            </p:nvSpPr>
-            <p:spPr>
-              <a:xfrm>
-                <a:off x="8274859" y="1888997"/>
-                <a:ext cx="468000" cy="468000"/>
-              </a:xfrm>
-              <a:prstGeom prst="rect">
-                <a:avLst/>
-              </a:prstGeom>
-              <a:noFill/>
-              <a:ln w="28575">
-                <a:solidFill>
-                  <a:schemeClr val="tx1"/>
-                </a:solidFill>
-              </a:ln>
-            </p:spPr>
-            <p:style>
-              <a:lnRef idx="2">
-                <a:schemeClr val="accent1">
-                  <a:shade val="50000"/>
-                </a:schemeClr>
-              </a:lnRef>
-              <a:fillRef idx="1">
-                <a:schemeClr val="accent1"/>
-              </a:fillRef>
-              <a:effectRef idx="0">
-                <a:schemeClr val="accent1"/>
-              </a:effectRef>
-              <a:fontRef idx="minor">
-                <a:schemeClr val="lt1"/>
-              </a:fontRef>
-            </p:style>
-            <p:txBody>
-              <a:bodyPr rtlCol="0" anchor="ctr"/>
-              <a:lstStyle/>
-              <a:p>
-                <a:pPr algn="ctr"/>
-                <a:endParaRPr lang="en-CA"/>
-              </a:p>
-            </p:txBody>
-          </p:sp>
-          <p:cxnSp>
-            <p:nvCxnSpPr>
-              <p:cNvPr id="54" name="Straight Connector 53"/>
-              <p:cNvCxnSpPr/>
-              <p:nvPr/>
-            </p:nvCxnSpPr>
-            <p:spPr>
-              <a:xfrm>
-                <a:off x="8256052" y="1898852"/>
-                <a:ext cx="486807" cy="465348"/>
-              </a:xfrm>
-              <a:prstGeom prst="line">
-                <a:avLst/>
-              </a:prstGeom>
-              <a:ln w="57150">
-                <a:solidFill>
-                  <a:schemeClr val="tx1"/>
-                </a:solidFill>
-              </a:ln>
-            </p:spPr>
-            <p:style>
-              <a:lnRef idx="1">
-                <a:schemeClr val="accent1"/>
-              </a:lnRef>
-              <a:fillRef idx="0">
-                <a:schemeClr val="accent1"/>
-              </a:fillRef>
-              <a:effectRef idx="0">
-                <a:schemeClr val="accent1"/>
-              </a:effectRef>
-              <a:fontRef idx="minor">
-                <a:schemeClr val="tx1"/>
-              </a:fontRef>
-            </p:style>
-          </p:cxnSp>
-        </p:grpSp>
-        <p:cxnSp>
-          <p:nvCxnSpPr>
-            <p:cNvPr id="41" name="Straight Connector 40"/>
-            <p:cNvCxnSpPr/>
-            <p:nvPr/>
-          </p:nvCxnSpPr>
-          <p:spPr>
-            <a:xfrm flipH="1">
-              <a:off x="8262894" y="5399257"/>
-              <a:ext cx="468001" cy="460797"/>
-            </a:xfrm>
-            <a:prstGeom prst="line">
-              <a:avLst/>
-            </a:prstGeom>
-            <a:ln w="57150">
-              <a:solidFill>
-                <a:schemeClr val="tx1"/>
-              </a:solidFill>
-            </a:ln>
-          </p:spPr>
-          <p:style>
-            <a:lnRef idx="1">
-              <a:schemeClr val="accent1"/>
-            </a:lnRef>
-            <a:fillRef idx="0">
-              <a:schemeClr val="accent1"/>
-            </a:fillRef>
-            <a:effectRef idx="0">
-              <a:schemeClr val="accent1"/>
-            </a:effectRef>
-            <a:fontRef idx="minor">
-              <a:schemeClr val="tx1"/>
-            </a:fontRef>
-          </p:style>
-        </p:cxnSp>
-      </p:grpSp>
-      <p:grpSp>
-        <p:nvGrpSpPr>
-          <p:cNvPr id="60" name="Group 59"/>
-          <p:cNvGrpSpPr/>
-          <p:nvPr/>
-        </p:nvGrpSpPr>
-        <p:grpSpPr>
-          <a:xfrm>
-            <a:off x="8260364" y="5427391"/>
-            <a:ext cx="486808" cy="475203"/>
-            <a:chOff x="8244087" y="5392054"/>
-            <a:chExt cx="486808" cy="475203"/>
-          </a:xfrm>
-        </p:grpSpPr>
-        <p:grpSp>
-          <p:nvGrpSpPr>
-            <p:cNvPr id="61" name="Group 60"/>
-            <p:cNvGrpSpPr/>
-            <p:nvPr/>
-          </p:nvGrpSpPr>
-          <p:grpSpPr>
-            <a:xfrm>
-              <a:off x="8244087" y="5392054"/>
-              <a:ext cx="486807" cy="475203"/>
-              <a:chOff x="8256052" y="1888997"/>
-              <a:chExt cx="486807" cy="475203"/>
-            </a:xfrm>
-          </p:grpSpPr>
-          <p:sp>
-            <p:nvSpPr>
-              <p:cNvPr id="63" name="Rectangle 62"/>
-              <p:cNvSpPr/>
-              <p:nvPr/>
-            </p:nvSpPr>
-            <p:spPr>
-              <a:xfrm>
-                <a:off x="8274859" y="1888997"/>
-                <a:ext cx="468000" cy="468000"/>
-              </a:xfrm>
-              <a:prstGeom prst="rect">
-                <a:avLst/>
-              </a:prstGeom>
-              <a:noFill/>
-              <a:ln w="28575">
-                <a:solidFill>
-                  <a:schemeClr val="tx1"/>
-                </a:solidFill>
-              </a:ln>
-            </p:spPr>
-            <p:style>
-              <a:lnRef idx="2">
-                <a:schemeClr val="accent1">
-                  <a:shade val="50000"/>
-                </a:schemeClr>
-              </a:lnRef>
-              <a:fillRef idx="1">
-                <a:schemeClr val="accent1"/>
-              </a:fillRef>
-              <a:effectRef idx="0">
-                <a:schemeClr val="accent1"/>
-              </a:effectRef>
-              <a:fontRef idx="minor">
-                <a:schemeClr val="lt1"/>
-              </a:fontRef>
-            </p:style>
-            <p:txBody>
-              <a:bodyPr rtlCol="0" anchor="ctr"/>
-              <a:lstStyle/>
-              <a:p>
-                <a:pPr algn="ctr"/>
-                <a:endParaRPr lang="en-CA"/>
-              </a:p>
-            </p:txBody>
-          </p:sp>
-          <p:cxnSp>
-            <p:nvCxnSpPr>
-              <p:cNvPr id="64" name="Straight Connector 63"/>
-              <p:cNvCxnSpPr/>
-              <p:nvPr/>
-            </p:nvCxnSpPr>
-            <p:spPr>
-              <a:xfrm>
-                <a:off x="8256052" y="1898852"/>
-                <a:ext cx="486807" cy="465348"/>
-              </a:xfrm>
-              <a:prstGeom prst="line">
-                <a:avLst/>
-              </a:prstGeom>
-              <a:ln w="57150">
-                <a:solidFill>
-                  <a:schemeClr val="tx1"/>
-                </a:solidFill>
-              </a:ln>
-            </p:spPr>
-            <p:style>
-              <a:lnRef idx="1">
-                <a:schemeClr val="accent1"/>
-              </a:lnRef>
-              <a:fillRef idx="0">
-                <a:schemeClr val="accent1"/>
-              </a:fillRef>
-              <a:effectRef idx="0">
-                <a:schemeClr val="accent1"/>
-              </a:effectRef>
-              <a:fontRef idx="minor">
-                <a:schemeClr val="tx1"/>
-              </a:fontRef>
-            </p:style>
-          </p:cxnSp>
-        </p:grpSp>
-        <p:cxnSp>
-          <p:nvCxnSpPr>
-            <p:cNvPr id="62" name="Straight Connector 61"/>
-            <p:cNvCxnSpPr/>
-            <p:nvPr/>
-          </p:nvCxnSpPr>
-          <p:spPr>
-            <a:xfrm flipH="1">
-              <a:off x="8262894" y="5399257"/>
-              <a:ext cx="468001" cy="460797"/>
-            </a:xfrm>
-            <a:prstGeom prst="line">
-              <a:avLst/>
-            </a:prstGeom>
-            <a:ln w="57150">
-              <a:solidFill>
-                <a:schemeClr val="tx1"/>
-              </a:solidFill>
-            </a:ln>
-          </p:spPr>
-          <p:style>
-            <a:lnRef idx="1">
-              <a:schemeClr val="accent1"/>
-            </a:lnRef>
-            <a:fillRef idx="0">
-              <a:schemeClr val="accent1"/>
-            </a:fillRef>
-            <a:effectRef idx="0">
-              <a:schemeClr val="accent1"/>
-            </a:effectRef>
-            <a:fontRef idx="minor">
-              <a:schemeClr val="tx1"/>
-            </a:fontRef>
-          </p:style>
-        </p:cxnSp>
-      </p:grpSp>
-      <p:grpSp>
-        <p:nvGrpSpPr>
-          <p:cNvPr id="44" name="Group 43"/>
-          <p:cNvGrpSpPr/>
-          <p:nvPr/>
-        </p:nvGrpSpPr>
-        <p:grpSpPr>
-          <a:xfrm>
-            <a:off x="8148120" y="3687813"/>
-            <a:ext cx="903941" cy="657256"/>
-            <a:chOff x="8166226" y="1699741"/>
-            <a:chExt cx="903941" cy="657256"/>
-          </a:xfrm>
-        </p:grpSpPr>
-        <p:sp>
-          <p:nvSpPr>
-            <p:cNvPr id="45" name="Rectangle 44"/>
-            <p:cNvSpPr/>
-            <p:nvPr/>
-          </p:nvSpPr>
-          <p:spPr>
-            <a:xfrm>
-              <a:off x="8274859" y="1888997"/>
-              <a:ext cx="468000" cy="468000"/>
-            </a:xfrm>
-            <a:prstGeom prst="rect">
-              <a:avLst/>
-            </a:prstGeom>
-            <a:noFill/>
-            <a:ln w="28575">
-              <a:solidFill>
-                <a:schemeClr val="tx1"/>
-              </a:solidFill>
-            </a:ln>
-          </p:spPr>
-          <p:style>
-            <a:lnRef idx="2">
-              <a:schemeClr val="accent1">
-                <a:shade val="50000"/>
-              </a:schemeClr>
-            </a:lnRef>
-            <a:fillRef idx="1">
-              <a:schemeClr val="accent1"/>
-            </a:fillRef>
-            <a:effectRef idx="0">
-              <a:schemeClr val="accent1"/>
-            </a:effectRef>
-            <a:fontRef idx="minor">
-              <a:schemeClr val="lt1"/>
-            </a:fontRef>
-          </p:style>
-          <p:txBody>
-            <a:bodyPr rtlCol="0" anchor="ctr"/>
-            <a:lstStyle/>
-            <a:p>
-              <a:pPr algn="ctr"/>
-              <a:endParaRPr lang="en-CA"/>
-            </a:p>
-          </p:txBody>
-        </p:sp>
-        <p:cxnSp>
-          <p:nvCxnSpPr>
-            <p:cNvPr id="46" name="Straight Connector 45"/>
-            <p:cNvCxnSpPr/>
-            <p:nvPr/>
-          </p:nvCxnSpPr>
-          <p:spPr>
-            <a:xfrm>
-              <a:off x="8166226" y="2018923"/>
-              <a:ext cx="342633" cy="283756"/>
-            </a:xfrm>
-            <a:prstGeom prst="line">
-              <a:avLst/>
-            </a:prstGeom>
-            <a:ln w="57150">
-              <a:solidFill>
-                <a:schemeClr val="tx1"/>
-              </a:solidFill>
-            </a:ln>
-          </p:spPr>
-          <p:style>
-            <a:lnRef idx="1">
-              <a:schemeClr val="accent1"/>
-            </a:lnRef>
-            <a:fillRef idx="0">
-              <a:schemeClr val="accent1"/>
-            </a:fillRef>
-            <a:effectRef idx="0">
-              <a:schemeClr val="accent1"/>
-            </a:effectRef>
-            <a:fontRef idx="minor">
-              <a:schemeClr val="tx1"/>
-            </a:fontRef>
-          </p:style>
-        </p:cxnSp>
-        <p:cxnSp>
-          <p:nvCxnSpPr>
-            <p:cNvPr id="47" name="Straight Connector 46"/>
-            <p:cNvCxnSpPr/>
-            <p:nvPr/>
-          </p:nvCxnSpPr>
-          <p:spPr>
-            <a:xfrm flipV="1">
-              <a:off x="8499806" y="1699741"/>
-              <a:ext cx="570361" cy="630097"/>
-            </a:xfrm>
-            <a:prstGeom prst="line">
-              <a:avLst/>
-            </a:prstGeom>
-            <a:ln w="57150">
-              <a:solidFill>
-                <a:schemeClr val="tx1"/>
-              </a:solidFill>
-            </a:ln>
-          </p:spPr>
-          <p:style>
-            <a:lnRef idx="1">
-              <a:schemeClr val="accent1"/>
-            </a:lnRef>
-            <a:fillRef idx="0">
-              <a:schemeClr val="accent1"/>
-            </a:fillRef>
-            <a:effectRef idx="0">
-              <a:schemeClr val="accent1"/>
-            </a:effectRef>
-            <a:fontRef idx="minor">
-              <a:schemeClr val="tx1"/>
-            </a:fontRef>
-          </p:style>
-        </p:cxnSp>
-      </p:grpSp>
-      <p:grpSp>
-        <p:nvGrpSpPr>
-          <p:cNvPr id="55" name="Group 54"/>
-          <p:cNvGrpSpPr/>
-          <p:nvPr/>
-        </p:nvGrpSpPr>
-        <p:grpSpPr>
-          <a:xfrm>
-            <a:off x="8155767" y="2134117"/>
-            <a:ext cx="903941" cy="657256"/>
-            <a:chOff x="8166226" y="1699741"/>
-            <a:chExt cx="903941" cy="657256"/>
-          </a:xfrm>
-        </p:grpSpPr>
-        <p:sp>
-          <p:nvSpPr>
-            <p:cNvPr id="56" name="Rectangle 55"/>
-            <p:cNvSpPr/>
-            <p:nvPr/>
-          </p:nvSpPr>
-          <p:spPr>
-            <a:xfrm>
-              <a:off x="8274859" y="1888997"/>
-              <a:ext cx="468000" cy="468000"/>
-            </a:xfrm>
-            <a:prstGeom prst="rect">
-              <a:avLst/>
-            </a:prstGeom>
-            <a:noFill/>
-            <a:ln w="28575">
-              <a:solidFill>
-                <a:schemeClr val="tx1"/>
-              </a:solidFill>
-            </a:ln>
-          </p:spPr>
-          <p:style>
-            <a:lnRef idx="2">
-              <a:schemeClr val="accent1">
-                <a:shade val="50000"/>
-              </a:schemeClr>
-            </a:lnRef>
-            <a:fillRef idx="1">
-              <a:schemeClr val="accent1"/>
-            </a:fillRef>
-            <a:effectRef idx="0">
-              <a:schemeClr val="accent1"/>
-            </a:effectRef>
-            <a:fontRef idx="minor">
-              <a:schemeClr val="lt1"/>
-            </a:fontRef>
-          </p:style>
-          <p:txBody>
-            <a:bodyPr rtlCol="0" anchor="ctr"/>
-            <a:lstStyle/>
-            <a:p>
-              <a:pPr algn="ctr"/>
-              <a:endParaRPr lang="en-CA"/>
-            </a:p>
-          </p:txBody>
-        </p:sp>
-        <p:cxnSp>
-          <p:nvCxnSpPr>
-            <p:cNvPr id="57" name="Straight Connector 56"/>
-            <p:cNvCxnSpPr/>
-            <p:nvPr/>
-          </p:nvCxnSpPr>
-          <p:spPr>
-            <a:xfrm>
-              <a:off x="8166226" y="2018923"/>
-              <a:ext cx="342633" cy="283756"/>
-            </a:xfrm>
-            <a:prstGeom prst="line">
-              <a:avLst/>
-            </a:prstGeom>
-            <a:ln w="57150">
-              <a:solidFill>
-                <a:schemeClr val="tx1"/>
-              </a:solidFill>
-            </a:ln>
-          </p:spPr>
-          <p:style>
-            <a:lnRef idx="1">
-              <a:schemeClr val="accent1"/>
-            </a:lnRef>
-            <a:fillRef idx="0">
-              <a:schemeClr val="accent1"/>
-            </a:fillRef>
-            <a:effectRef idx="0">
-              <a:schemeClr val="accent1"/>
-            </a:effectRef>
-            <a:fontRef idx="minor">
-              <a:schemeClr val="tx1"/>
-            </a:fontRef>
-          </p:style>
-        </p:cxnSp>
-        <p:cxnSp>
-          <p:nvCxnSpPr>
-            <p:cNvPr id="58" name="Straight Connector 57"/>
-            <p:cNvCxnSpPr/>
-            <p:nvPr/>
-          </p:nvCxnSpPr>
-          <p:spPr>
-            <a:xfrm flipV="1">
-              <a:off x="8499806" y="1699741"/>
-              <a:ext cx="570361" cy="630097"/>
-            </a:xfrm>
-            <a:prstGeom prst="line">
-              <a:avLst/>
-            </a:prstGeom>
-            <a:ln w="57150">
-              <a:solidFill>
-                <a:schemeClr val="tx1"/>
-              </a:solidFill>
-            </a:ln>
-          </p:spPr>
-          <p:style>
-            <a:lnRef idx="1">
-              <a:schemeClr val="accent1"/>
-            </a:lnRef>
-            <a:fillRef idx="0">
-              <a:schemeClr val="accent1"/>
-            </a:fillRef>
-            <a:effectRef idx="0">
-              <a:schemeClr val="accent1"/>
-            </a:effectRef>
-            <a:fontRef idx="minor">
-              <a:schemeClr val="tx1"/>
-            </a:fontRef>
-          </p:style>
-        </p:cxnSp>
-      </p:grpSp>
-      <p:grpSp>
-        <p:nvGrpSpPr>
-          <p:cNvPr id="59" name="Group 58"/>
-          <p:cNvGrpSpPr/>
-          <p:nvPr/>
-        </p:nvGrpSpPr>
-        <p:grpSpPr>
-          <a:xfrm>
-            <a:off x="8155767" y="4728894"/>
-            <a:ext cx="903941" cy="657256"/>
-            <a:chOff x="8166226" y="1699741"/>
-            <a:chExt cx="903941" cy="657256"/>
-          </a:xfrm>
-        </p:grpSpPr>
-        <p:sp>
-          <p:nvSpPr>
-            <p:cNvPr id="65" name="Rectangle 64"/>
-            <p:cNvSpPr/>
-            <p:nvPr/>
-          </p:nvSpPr>
-          <p:spPr>
-            <a:xfrm>
-              <a:off x="8274859" y="1888997"/>
-              <a:ext cx="468000" cy="468000"/>
-            </a:xfrm>
-            <a:prstGeom prst="rect">
-              <a:avLst/>
-            </a:prstGeom>
-            <a:noFill/>
-            <a:ln w="28575">
-              <a:solidFill>
-                <a:schemeClr val="tx1"/>
-              </a:solidFill>
-            </a:ln>
-          </p:spPr>
-          <p:style>
-            <a:lnRef idx="2">
-              <a:schemeClr val="accent1">
-                <a:shade val="50000"/>
-              </a:schemeClr>
-            </a:lnRef>
-            <a:fillRef idx="1">
-              <a:schemeClr val="accent1"/>
-            </a:fillRef>
-            <a:effectRef idx="0">
-              <a:schemeClr val="accent1"/>
-            </a:effectRef>
-            <a:fontRef idx="minor">
-              <a:schemeClr val="lt1"/>
-            </a:fontRef>
-          </p:style>
-          <p:txBody>
-            <a:bodyPr rtlCol="0" anchor="ctr"/>
-            <a:lstStyle/>
-            <a:p>
-              <a:pPr algn="ctr"/>
-              <a:endParaRPr lang="en-CA"/>
-            </a:p>
-          </p:txBody>
-        </p:sp>
-        <p:cxnSp>
-          <p:nvCxnSpPr>
-            <p:cNvPr id="66" name="Straight Connector 65"/>
-            <p:cNvCxnSpPr/>
-            <p:nvPr/>
-          </p:nvCxnSpPr>
-          <p:spPr>
-            <a:xfrm>
-              <a:off x="8166226" y="2018923"/>
-              <a:ext cx="342633" cy="283756"/>
-            </a:xfrm>
-            <a:prstGeom prst="line">
-              <a:avLst/>
-            </a:prstGeom>
-            <a:ln w="57150">
-              <a:solidFill>
-                <a:schemeClr val="tx1"/>
-              </a:solidFill>
-            </a:ln>
-          </p:spPr>
-          <p:style>
-            <a:lnRef idx="1">
-              <a:schemeClr val="accent1"/>
-            </a:lnRef>
-            <a:fillRef idx="0">
-              <a:schemeClr val="accent1"/>
-            </a:fillRef>
-            <a:effectRef idx="0">
-              <a:schemeClr val="accent1"/>
-            </a:effectRef>
-            <a:fontRef idx="minor">
-              <a:schemeClr val="tx1"/>
-            </a:fontRef>
-          </p:style>
-        </p:cxnSp>
-        <p:cxnSp>
-          <p:nvCxnSpPr>
-            <p:cNvPr id="67" name="Straight Connector 66"/>
-            <p:cNvCxnSpPr/>
-            <p:nvPr/>
-          </p:nvCxnSpPr>
-          <p:spPr>
-            <a:xfrm flipV="1">
-              <a:off x="8499806" y="1699741"/>
-              <a:ext cx="570361" cy="630097"/>
-            </a:xfrm>
-            <a:prstGeom prst="line">
-              <a:avLst/>
-            </a:prstGeom>
-            <a:ln w="57150">
-              <a:solidFill>
-                <a:schemeClr val="tx1"/>
-              </a:solidFill>
-            </a:ln>
-          </p:spPr>
-          <p:style>
-            <a:lnRef idx="1">
-              <a:schemeClr val="accent1"/>
-            </a:lnRef>
-            <a:fillRef idx="0">
-              <a:schemeClr val="accent1"/>
-            </a:fillRef>
-            <a:effectRef idx="0">
-              <a:schemeClr val="accent1"/>
-            </a:effectRef>
-            <a:fontRef idx="minor">
-              <a:schemeClr val="tx1"/>
-            </a:fontRef>
-          </p:style>
-        </p:cxnSp>
-      </p:grpSp>
-    </p:spTree>
-    <p:extLst>
-      <p:ext uri="{BB962C8B-B14F-4D97-AF65-F5344CB8AC3E}">
-        <p14:creationId xmlns:p14="http://schemas.microsoft.com/office/powerpoint/2010/main" val="945404705"/>
-      </p:ext>
-    </p:extLst>
-  </p:cSld>
-  <p:clrMapOvr>
-    <a:masterClrMapping/>
-  </p:clrMapOvr>
-  <p:timing>
-    <p:tnLst>
-      <p:par>
-        <p:cTn id="1" dur="indefinite" restart="never" nodeType="tmRoot"/>
-      </p:par>
-    </p:tnLst>
-  </p:timing>
-</p:sld>
-</file>
-
 <file path=ppt/slides/slide5.xml><?xml version="1.0" encoding="utf-8"?>
 <p:sld xmlns:a="http://schemas.openxmlformats.org/drawingml/2006/main" xmlns:r="http://schemas.openxmlformats.org/officeDocument/2006/relationships" xmlns:p="http://schemas.openxmlformats.org/presentationml/2006/main">
   <p:cSld>

</xml_diff>